<commit_message>
chnages for next steps
</commit_message>
<xml_diff>
--- a/infinispan-embedded-tutorial/Infinispan.pptx
+++ b/infinispan-embedded-tutorial/Infinispan.pptx
@@ -5,20 +5,24 @@
     <p:sldMasterId id="2147483733" r:id="rId4"/>
   </p:sldMasterIdLst>
   <p:notesMasterIdLst>
-    <p:notesMasterId r:id="rId13"/>
+    <p:notesMasterId r:id="rId17"/>
   </p:notesMasterIdLst>
   <p:handoutMasterIdLst>
-    <p:handoutMasterId r:id="rId14"/>
+    <p:handoutMasterId r:id="rId18"/>
   </p:handoutMasterIdLst>
   <p:sldIdLst>
     <p:sldId id="256" r:id="rId5"/>
     <p:sldId id="257" r:id="rId6"/>
     <p:sldId id="258" r:id="rId7"/>
-    <p:sldId id="259" r:id="rId8"/>
-    <p:sldId id="260" r:id="rId9"/>
-    <p:sldId id="261" r:id="rId10"/>
-    <p:sldId id="262" r:id="rId11"/>
-    <p:sldId id="263" r:id="rId12"/>
+    <p:sldId id="264" r:id="rId8"/>
+    <p:sldId id="265" r:id="rId9"/>
+    <p:sldId id="269" r:id="rId10"/>
+    <p:sldId id="266" r:id="rId11"/>
+    <p:sldId id="268" r:id="rId12"/>
+    <p:sldId id="267" r:id="rId13"/>
+    <p:sldId id="259" r:id="rId14"/>
+    <p:sldId id="260" r:id="rId15"/>
+    <p:sldId id="261" r:id="rId16"/>
   </p:sldIdLst>
   <p:sldSz cx="9144000" cy="6858000" type="screen4x3"/>
   <p:notesSz cx="6669088" cy="9872663"/>
@@ -238,7 +242,7 @@
             <a:fld id="{AB771C5C-997B-4FBD-B8F3-A0A3C30CDBE5}" type="datetimeFigureOut">
               <a:rPr lang="en-GB" smtClean="0"/>
               <a:pPr/>
-              <a:t>11/06/2015</a:t>
+              <a:t>17/06/2015</a:t>
             </a:fld>
             <a:endParaRPr lang="en-GB"/>
           </a:p>
@@ -1732,7 +1736,7 @@
               <a:pPr>
                 <a:defRPr/>
               </a:pPr>
-              <a:t>11 June 2015</a:t>
+              <a:t>17 June 2015</a:t>
             </a:fld>
             <a:endParaRPr lang="en-US" dirty="0"/>
           </a:p>
@@ -1923,7 +1927,7 @@
               <a:pPr>
                 <a:defRPr/>
               </a:pPr>
-              <a:t>11 June 2015</a:t>
+              <a:t>17 June 2015</a:t>
             </a:fld>
             <a:endParaRPr lang="en-US" dirty="0"/>
           </a:p>
@@ -2200,7 +2204,7 @@
               <a:pPr>
                 <a:defRPr/>
               </a:pPr>
-              <a:t>11 June 2015</a:t>
+              <a:t>17 June 2015</a:t>
             </a:fld>
             <a:endParaRPr lang="en-US" dirty="0"/>
           </a:p>
@@ -2393,7 +2397,7 @@
               <a:pPr>
                 <a:defRPr/>
               </a:pPr>
-              <a:t>11 June 2015</a:t>
+              <a:t>17 June 2015</a:t>
             </a:fld>
             <a:endParaRPr lang="en-US" dirty="0"/>
           </a:p>
@@ -2767,7 +2771,7 @@
               <a:pPr>
                 <a:defRPr/>
               </a:pPr>
-              <a:t>11 June 2015</a:t>
+              <a:t>17 June 2015</a:t>
             </a:fld>
             <a:endParaRPr lang="en-US" dirty="0"/>
           </a:p>
@@ -3271,7 +3275,7 @@
               <a:pPr>
                 <a:defRPr/>
               </a:pPr>
-              <a:t>11 June 2015</a:t>
+              <a:t>17 June 2015</a:t>
             </a:fld>
             <a:endParaRPr lang="en-US" dirty="0"/>
           </a:p>
@@ -3475,7 +3479,7 @@
               <a:pPr>
                 <a:defRPr/>
               </a:pPr>
-              <a:t>11 June 2015</a:t>
+              <a:t>17 June 2015</a:t>
             </a:fld>
             <a:endParaRPr lang="en-US" dirty="0"/>
           </a:p>
@@ -3679,7 +3683,7 @@
               <a:pPr>
                 <a:defRPr/>
               </a:pPr>
-              <a:t>11 June 2015</a:t>
+              <a:t>17 June 2015</a:t>
             </a:fld>
             <a:endParaRPr lang="en-US" dirty="0"/>
           </a:p>
@@ -3967,7 +3971,7 @@
               <a:pPr>
                 <a:defRPr/>
               </a:pPr>
-              <a:t>11 June 2015</a:t>
+              <a:t>17 June 2015</a:t>
             </a:fld>
             <a:endParaRPr lang="en-US" dirty="0"/>
           </a:p>
@@ -4236,7 +4240,7 @@
               <a:pPr>
                 <a:defRPr/>
               </a:pPr>
-              <a:t>11 June 2015</a:t>
+              <a:t>17 June 2015</a:t>
             </a:fld>
             <a:endParaRPr lang="en-US" dirty="0"/>
           </a:p>
@@ -4440,7 +4444,7 @@
               <a:pPr>
                 <a:defRPr/>
               </a:pPr>
-              <a:t>11 June 2015</a:t>
+              <a:t>17 June 2015</a:t>
             </a:fld>
             <a:endParaRPr lang="en-US" dirty="0"/>
           </a:p>
@@ -5328,6 +5332,622 @@
 </p:sld>
 </file>
 
+<file path=ppt/slides/slide10.xml><?xml version="1.0" encoding="utf-8"?>
+<p:sld xmlns:a="http://schemas.openxmlformats.org/drawingml/2006/main" xmlns:r="http://schemas.openxmlformats.org/officeDocument/2006/relationships" xmlns:p="http://schemas.openxmlformats.org/presentationml/2006/main">
+  <p:cSld>
+    <p:spTree>
+      <p:nvGrpSpPr>
+        <p:cNvPr id="1" name=""/>
+        <p:cNvGrpSpPr/>
+        <p:nvPr/>
+      </p:nvGrpSpPr>
+      <p:grpSpPr>
+        <a:xfrm>
+          <a:off x="0" y="0"/>
+          <a:ext cx="0" cy="0"/>
+          <a:chOff x="0" y="0"/>
+          <a:chExt cx="0" cy="0"/>
+        </a:xfrm>
+      </p:grpSpPr>
+      <p:sp>
+        <p:nvSpPr>
+          <p:cNvPr id="2" name="Title 1"/>
+          <p:cNvSpPr>
+            <a:spLocks noGrp="1"/>
+          </p:cNvSpPr>
+          <p:nvPr>
+            <p:ph type="title"/>
+          </p:nvPr>
+        </p:nvSpPr>
+        <p:spPr/>
+        <p:txBody>
+          <a:bodyPr/>
+          <a:lstStyle/>
+          <a:p>
+            <a:r>
+              <a:rPr lang="en-GB" dirty="0" smtClean="0"/>
+              <a:t>Features</a:t>
+            </a:r>
+            <a:endParaRPr lang="en-GB" dirty="0"/>
+          </a:p>
+        </p:txBody>
+      </p:sp>
+      <p:sp>
+        <p:nvSpPr>
+          <p:cNvPr id="3" name="Content Placeholder 2"/>
+          <p:cNvSpPr>
+            <a:spLocks noGrp="1"/>
+          </p:cNvSpPr>
+          <p:nvPr>
+            <p:ph idx="1"/>
+          </p:nvPr>
+        </p:nvSpPr>
+        <p:spPr/>
+        <p:txBody>
+          <a:bodyPr/>
+          <a:lstStyle/>
+          <a:p>
+            <a:r>
+              <a:rPr lang="en-GB" dirty="0"/>
+              <a:t>In-memory local and clustered cache</a:t>
+            </a:r>
+          </a:p>
+          <a:p>
+            <a:r>
+              <a:rPr lang="en-GB" dirty="0"/>
+              <a:t>Clustering</a:t>
+            </a:r>
+          </a:p>
+          <a:p>
+            <a:r>
+              <a:rPr lang="en-GB" dirty="0"/>
+              <a:t>Transactions</a:t>
+            </a:r>
+          </a:p>
+          <a:p>
+            <a:r>
+              <a:rPr lang="en-GB" dirty="0"/>
+              <a:t>Persistence</a:t>
+            </a:r>
+          </a:p>
+          <a:p>
+            <a:r>
+              <a:rPr lang="en-GB" dirty="0"/>
+              <a:t>Configuration / Development</a:t>
+            </a:r>
+          </a:p>
+          <a:p>
+            <a:r>
+              <a:rPr lang="en-GB" dirty="0"/>
+              <a:t>Integrations</a:t>
+            </a:r>
+          </a:p>
+          <a:p>
+            <a:endParaRPr lang="en-GB" dirty="0"/>
+          </a:p>
+        </p:txBody>
+      </p:sp>
+      <p:sp>
+        <p:nvSpPr>
+          <p:cNvPr id="4" name="Text Placeholder 3"/>
+          <p:cNvSpPr>
+            <a:spLocks noGrp="1"/>
+          </p:cNvSpPr>
+          <p:nvPr>
+            <p:ph type="body" sz="quarter" idx="13"/>
+          </p:nvPr>
+        </p:nvSpPr>
+        <p:spPr/>
+        <p:txBody>
+          <a:bodyPr/>
+          <a:lstStyle/>
+          <a:p>
+            <a:endParaRPr lang="en-GB"/>
+          </a:p>
+        </p:txBody>
+      </p:sp>
+      <p:sp>
+        <p:nvSpPr>
+          <p:cNvPr id="5" name="Date Placeholder 4"/>
+          <p:cNvSpPr>
+            <a:spLocks noGrp="1"/>
+          </p:cNvSpPr>
+          <p:nvPr>
+            <p:ph type="dt" sz="half" idx="14"/>
+          </p:nvPr>
+        </p:nvSpPr>
+        <p:spPr/>
+        <p:txBody>
+          <a:bodyPr/>
+          <a:lstStyle/>
+          <a:p>
+            <a:pPr>
+              <a:defRPr/>
+            </a:pPr>
+            <a:fld id="{D95CFEC9-DCDE-483F-9C62-EBF9D31C73AA}" type="datetime3">
+              <a:rPr lang="en-US" smtClean="0"/>
+              <a:pPr>
+                <a:defRPr/>
+              </a:pPr>
+              <a:t>17 June 2015</a:t>
+            </a:fld>
+            <a:endParaRPr lang="en-US" dirty="0"/>
+          </a:p>
+        </p:txBody>
+      </p:sp>
+      <p:sp>
+        <p:nvSpPr>
+          <p:cNvPr id="6" name="Slide Number Placeholder 5"/>
+          <p:cNvSpPr>
+            <a:spLocks noGrp="1"/>
+          </p:cNvSpPr>
+          <p:nvPr>
+            <p:ph type="sldNum" sz="quarter" idx="15"/>
+          </p:nvPr>
+        </p:nvSpPr>
+        <p:spPr/>
+        <p:txBody>
+          <a:bodyPr/>
+          <a:lstStyle/>
+          <a:p>
+            <a:pPr>
+              <a:defRPr/>
+            </a:pPr>
+            <a:fld id="{90600ADF-17AC-4085-9C50-2A0435A05455}" type="slidenum">
+              <a:rPr lang="en-US" smtClean="0"/>
+              <a:pPr>
+                <a:defRPr/>
+              </a:pPr>
+              <a:t>9</a:t>
+            </a:fld>
+            <a:endParaRPr lang="en-US" dirty="0"/>
+          </a:p>
+        </p:txBody>
+      </p:sp>
+    </p:spTree>
+    <p:extLst>
+      <p:ext uri="{BB962C8B-B14F-4D97-AF65-F5344CB8AC3E}">
+        <p14:creationId xmlns:p14="http://schemas.microsoft.com/office/powerpoint/2010/main" val="1007208415"/>
+      </p:ext>
+    </p:extLst>
+  </p:cSld>
+  <p:clrMapOvr>
+    <a:masterClrMapping/>
+  </p:clrMapOvr>
+  <p:timing>
+    <p:tnLst>
+      <p:par>
+        <p:cTn id="1" dur="indefinite" restart="never" nodeType="tmRoot"/>
+      </p:par>
+    </p:tnLst>
+  </p:timing>
+</p:sld>
+</file>
+
+<file path=ppt/slides/slide11.xml><?xml version="1.0" encoding="utf-8"?>
+<p:sld xmlns:a="http://schemas.openxmlformats.org/drawingml/2006/main" xmlns:r="http://schemas.openxmlformats.org/officeDocument/2006/relationships" xmlns:p="http://schemas.openxmlformats.org/presentationml/2006/main">
+  <p:cSld>
+    <p:spTree>
+      <p:nvGrpSpPr>
+        <p:cNvPr id="1" name=""/>
+        <p:cNvGrpSpPr/>
+        <p:nvPr/>
+      </p:nvGrpSpPr>
+      <p:grpSpPr>
+        <a:xfrm>
+          <a:off x="0" y="0"/>
+          <a:ext cx="0" cy="0"/>
+          <a:chOff x="0" y="0"/>
+          <a:chExt cx="0" cy="0"/>
+        </a:xfrm>
+      </p:grpSpPr>
+      <p:sp>
+        <p:nvSpPr>
+          <p:cNvPr id="2" name="Title 1"/>
+          <p:cNvSpPr>
+            <a:spLocks noGrp="1"/>
+          </p:cNvSpPr>
+          <p:nvPr>
+            <p:ph type="title"/>
+          </p:nvPr>
+        </p:nvSpPr>
+        <p:spPr/>
+        <p:txBody>
+          <a:bodyPr/>
+          <a:lstStyle/>
+          <a:p>
+            <a:r>
+              <a:rPr lang="en-GB" dirty="0"/>
+              <a:t>Persistence</a:t>
+            </a:r>
+            <a:endParaRPr lang="en-GB" dirty="0"/>
+          </a:p>
+        </p:txBody>
+      </p:sp>
+      <p:sp>
+        <p:nvSpPr>
+          <p:cNvPr id="3" name="Content Placeholder 2"/>
+          <p:cNvSpPr>
+            <a:spLocks noGrp="1"/>
+          </p:cNvSpPr>
+          <p:nvPr>
+            <p:ph idx="1"/>
+          </p:nvPr>
+        </p:nvSpPr>
+        <p:spPr/>
+        <p:txBody>
+          <a:bodyPr/>
+          <a:lstStyle/>
+          <a:p>
+            <a:r>
+              <a:rPr lang="en-GB" dirty="0"/>
+              <a:t>U</a:t>
+            </a:r>
+            <a:r>
+              <a:rPr lang="en-GB" smtClean="0"/>
+              <a:t>se </a:t>
+            </a:r>
+            <a:r>
+              <a:rPr lang="en-GB" dirty="0"/>
+              <a:t>a </a:t>
+            </a:r>
+            <a:r>
+              <a:rPr lang="en-GB" dirty="0" err="1"/>
+              <a:t>CacheLoader</a:t>
+            </a:r>
+            <a:r>
+              <a:rPr lang="en-GB" dirty="0"/>
+              <a:t> interface to save the in-memory cache data to a persistent cache </a:t>
+            </a:r>
+            <a:r>
+              <a:rPr lang="en-GB" dirty="0" smtClean="0"/>
+              <a:t>store</a:t>
+            </a:r>
+          </a:p>
+          <a:p>
+            <a:r>
+              <a:rPr lang="en-GB" dirty="0"/>
+              <a:t>An external persistent storage might be useful </a:t>
+            </a:r>
+            <a:r>
+              <a:rPr lang="en-GB" dirty="0" smtClean="0"/>
+              <a:t>for:</a:t>
+            </a:r>
+          </a:p>
+          <a:p>
+            <a:pPr lvl="1"/>
+            <a:r>
+              <a:rPr lang="en-GB" dirty="0"/>
+              <a:t>Increased </a:t>
+            </a:r>
+            <a:r>
+              <a:rPr lang="en-GB" dirty="0" smtClean="0"/>
+              <a:t>Durability</a:t>
+            </a:r>
+          </a:p>
+          <a:p>
+            <a:pPr lvl="1"/>
+            <a:r>
+              <a:rPr lang="en-GB" dirty="0" smtClean="0"/>
+              <a:t>Write-through</a:t>
+            </a:r>
+          </a:p>
+          <a:p>
+            <a:pPr lvl="1"/>
+            <a:r>
+              <a:rPr lang="en-GB" dirty="0"/>
+              <a:t>Overflow </a:t>
+            </a:r>
+            <a:r>
+              <a:rPr lang="en-GB" dirty="0" smtClean="0"/>
+              <a:t>Data</a:t>
+            </a:r>
+          </a:p>
+          <a:p>
+            <a:pPr lvl="1"/>
+            <a:endParaRPr lang="en-GB" dirty="0"/>
+          </a:p>
+        </p:txBody>
+      </p:sp>
+      <p:sp>
+        <p:nvSpPr>
+          <p:cNvPr id="4" name="Text Placeholder 3"/>
+          <p:cNvSpPr>
+            <a:spLocks noGrp="1"/>
+          </p:cNvSpPr>
+          <p:nvPr>
+            <p:ph type="body" sz="quarter" idx="13"/>
+          </p:nvPr>
+        </p:nvSpPr>
+        <p:spPr/>
+        <p:txBody>
+          <a:bodyPr/>
+          <a:lstStyle/>
+          <a:p>
+            <a:endParaRPr lang="en-GB"/>
+          </a:p>
+        </p:txBody>
+      </p:sp>
+      <p:sp>
+        <p:nvSpPr>
+          <p:cNvPr id="5" name="Date Placeholder 4"/>
+          <p:cNvSpPr>
+            <a:spLocks noGrp="1"/>
+          </p:cNvSpPr>
+          <p:nvPr>
+            <p:ph type="dt" sz="half" idx="14"/>
+          </p:nvPr>
+        </p:nvSpPr>
+        <p:spPr/>
+        <p:txBody>
+          <a:bodyPr/>
+          <a:lstStyle/>
+          <a:p>
+            <a:pPr>
+              <a:defRPr/>
+            </a:pPr>
+            <a:fld id="{D95CFEC9-DCDE-483F-9C62-EBF9D31C73AA}" type="datetime3">
+              <a:rPr lang="en-US" smtClean="0"/>
+              <a:pPr>
+                <a:defRPr/>
+              </a:pPr>
+              <a:t>17 June 2015</a:t>
+            </a:fld>
+            <a:endParaRPr lang="en-US" dirty="0"/>
+          </a:p>
+        </p:txBody>
+      </p:sp>
+      <p:sp>
+        <p:nvSpPr>
+          <p:cNvPr id="6" name="Slide Number Placeholder 5"/>
+          <p:cNvSpPr>
+            <a:spLocks noGrp="1"/>
+          </p:cNvSpPr>
+          <p:nvPr>
+            <p:ph type="sldNum" sz="quarter" idx="15"/>
+          </p:nvPr>
+        </p:nvSpPr>
+        <p:spPr/>
+        <p:txBody>
+          <a:bodyPr/>
+          <a:lstStyle/>
+          <a:p>
+            <a:pPr>
+              <a:defRPr/>
+            </a:pPr>
+            <a:fld id="{90600ADF-17AC-4085-9C50-2A0435A05455}" type="slidenum">
+              <a:rPr lang="en-US" smtClean="0"/>
+              <a:pPr>
+                <a:defRPr/>
+              </a:pPr>
+              <a:t>10</a:t>
+            </a:fld>
+            <a:endParaRPr lang="en-US" dirty="0"/>
+          </a:p>
+        </p:txBody>
+      </p:sp>
+      <p:pic>
+        <p:nvPicPr>
+          <p:cNvPr id="3074" name="Picture 2"/>
+          <p:cNvPicPr>
+            <a:picLocks noChangeAspect="1" noChangeArrowheads="1"/>
+          </p:cNvPicPr>
+          <p:nvPr/>
+        </p:nvPicPr>
+        <p:blipFill>
+          <a:blip r:embed="rId2">
+            <a:extLst>
+              <a:ext uri="{28A0092B-C50C-407E-A947-70E740481C1C}">
+                <a14:useLocalDpi xmlns:a14="http://schemas.microsoft.com/office/drawing/2010/main" val="0"/>
+              </a:ext>
+            </a:extLst>
+          </a:blip>
+          <a:srcRect/>
+          <a:stretch>
+            <a:fillRect/>
+          </a:stretch>
+        </p:blipFill>
+        <p:spPr bwMode="auto">
+          <a:xfrm>
+            <a:off x="5822340" y="2545685"/>
+            <a:ext cx="2476500" cy="3733800"/>
+          </a:xfrm>
+          <a:prstGeom prst="rect">
+            <a:avLst/>
+          </a:prstGeom>
+          <a:noFill/>
+          <a:ln>
+            <a:noFill/>
+          </a:ln>
+          <a:extLst>
+            <a:ext uri="{909E8E84-426E-40DD-AFC4-6F175D3DCCD1}">
+              <a14:hiddenFill xmlns:a14="http://schemas.microsoft.com/office/drawing/2010/main">
+                <a:solidFill>
+                  <a:schemeClr val="accent1"/>
+                </a:solidFill>
+              </a14:hiddenFill>
+            </a:ext>
+            <a:ext uri="{91240B29-F687-4F45-9708-019B960494DF}">
+              <a14:hiddenLine xmlns:a14="http://schemas.microsoft.com/office/drawing/2010/main" w="9525">
+                <a:solidFill>
+                  <a:schemeClr val="tx1"/>
+                </a:solidFill>
+                <a:miter lim="800000"/>
+                <a:headEnd/>
+                <a:tailEnd/>
+              </a14:hiddenLine>
+            </a:ext>
+          </a:extLst>
+        </p:spPr>
+      </p:pic>
+    </p:spTree>
+    <p:extLst>
+      <p:ext uri="{BB962C8B-B14F-4D97-AF65-F5344CB8AC3E}">
+        <p14:creationId xmlns:p14="http://schemas.microsoft.com/office/powerpoint/2010/main" val="479859234"/>
+      </p:ext>
+    </p:extLst>
+  </p:cSld>
+  <p:clrMapOvr>
+    <a:masterClrMapping/>
+  </p:clrMapOvr>
+  <p:timing>
+    <p:tnLst>
+      <p:par>
+        <p:cTn id="1" dur="indefinite" restart="never" nodeType="tmRoot"/>
+      </p:par>
+    </p:tnLst>
+  </p:timing>
+</p:sld>
+</file>
+
+<file path=ppt/slides/slide12.xml><?xml version="1.0" encoding="utf-8"?>
+<p:sld xmlns:a="http://schemas.openxmlformats.org/drawingml/2006/main" xmlns:r="http://schemas.openxmlformats.org/officeDocument/2006/relationships" xmlns:p="http://schemas.openxmlformats.org/presentationml/2006/main">
+  <p:cSld>
+    <p:spTree>
+      <p:nvGrpSpPr>
+        <p:cNvPr id="1" name=""/>
+        <p:cNvGrpSpPr/>
+        <p:nvPr/>
+      </p:nvGrpSpPr>
+      <p:grpSpPr>
+        <a:xfrm>
+          <a:off x="0" y="0"/>
+          <a:ext cx="0" cy="0"/>
+          <a:chOff x="0" y="0"/>
+          <a:chExt cx="0" cy="0"/>
+        </a:xfrm>
+      </p:grpSpPr>
+      <p:sp>
+        <p:nvSpPr>
+          <p:cNvPr id="2" name="Title 1"/>
+          <p:cNvSpPr>
+            <a:spLocks noGrp="1"/>
+          </p:cNvSpPr>
+          <p:nvPr>
+            <p:ph type="title"/>
+          </p:nvPr>
+        </p:nvSpPr>
+        <p:spPr/>
+        <p:txBody>
+          <a:bodyPr/>
+          <a:lstStyle/>
+          <a:p>
+            <a:r>
+              <a:rPr lang="en-GB" dirty="0"/>
+              <a:t>Clustering</a:t>
+            </a:r>
+          </a:p>
+        </p:txBody>
+      </p:sp>
+      <p:sp>
+        <p:nvSpPr>
+          <p:cNvPr id="3" name="Content Placeholder 2"/>
+          <p:cNvSpPr>
+            <a:spLocks noGrp="1"/>
+          </p:cNvSpPr>
+          <p:nvPr>
+            <p:ph idx="1"/>
+          </p:nvPr>
+        </p:nvSpPr>
+        <p:spPr/>
+        <p:txBody>
+          <a:bodyPr/>
+          <a:lstStyle/>
+          <a:p>
+            <a:endParaRPr lang="en-GB" dirty="0"/>
+          </a:p>
+        </p:txBody>
+      </p:sp>
+      <p:sp>
+        <p:nvSpPr>
+          <p:cNvPr id="4" name="Text Placeholder 3"/>
+          <p:cNvSpPr>
+            <a:spLocks noGrp="1"/>
+          </p:cNvSpPr>
+          <p:nvPr>
+            <p:ph type="body" sz="quarter" idx="13"/>
+          </p:nvPr>
+        </p:nvSpPr>
+        <p:spPr/>
+        <p:txBody>
+          <a:bodyPr/>
+          <a:lstStyle/>
+          <a:p>
+            <a:endParaRPr lang="en-GB"/>
+          </a:p>
+        </p:txBody>
+      </p:sp>
+      <p:sp>
+        <p:nvSpPr>
+          <p:cNvPr id="5" name="Date Placeholder 4"/>
+          <p:cNvSpPr>
+            <a:spLocks noGrp="1"/>
+          </p:cNvSpPr>
+          <p:nvPr>
+            <p:ph type="dt" sz="half" idx="14"/>
+          </p:nvPr>
+        </p:nvSpPr>
+        <p:spPr/>
+        <p:txBody>
+          <a:bodyPr/>
+          <a:lstStyle/>
+          <a:p>
+            <a:pPr>
+              <a:defRPr/>
+            </a:pPr>
+            <a:fld id="{D95CFEC9-DCDE-483F-9C62-EBF9D31C73AA}" type="datetime3">
+              <a:rPr lang="en-US" smtClean="0"/>
+              <a:pPr>
+                <a:defRPr/>
+              </a:pPr>
+              <a:t>17 June 2015</a:t>
+            </a:fld>
+            <a:endParaRPr lang="en-US" dirty="0"/>
+          </a:p>
+        </p:txBody>
+      </p:sp>
+      <p:sp>
+        <p:nvSpPr>
+          <p:cNvPr id="6" name="Slide Number Placeholder 5"/>
+          <p:cNvSpPr>
+            <a:spLocks noGrp="1"/>
+          </p:cNvSpPr>
+          <p:nvPr>
+            <p:ph type="sldNum" sz="quarter" idx="15"/>
+          </p:nvPr>
+        </p:nvSpPr>
+        <p:spPr/>
+        <p:txBody>
+          <a:bodyPr/>
+          <a:lstStyle/>
+          <a:p>
+            <a:pPr>
+              <a:defRPr/>
+            </a:pPr>
+            <a:fld id="{90600ADF-17AC-4085-9C50-2A0435A05455}" type="slidenum">
+              <a:rPr lang="en-US" smtClean="0"/>
+              <a:pPr>
+                <a:defRPr/>
+              </a:pPr>
+              <a:t>11</a:t>
+            </a:fld>
+            <a:endParaRPr lang="en-US" dirty="0"/>
+          </a:p>
+        </p:txBody>
+      </p:sp>
+    </p:spTree>
+    <p:extLst>
+      <p:ext uri="{BB962C8B-B14F-4D97-AF65-F5344CB8AC3E}">
+        <p14:creationId xmlns:p14="http://schemas.microsoft.com/office/powerpoint/2010/main" val="3515555941"/>
+      </p:ext>
+    </p:extLst>
+  </p:cSld>
+  <p:clrMapOvr>
+    <a:masterClrMapping/>
+  </p:clrMapOvr>
+</p:sld>
+</file>
+
 <file path=ppt/slides/slide2.xml><?xml version="1.0" encoding="utf-8"?>
 <p:sld xmlns:a="http://schemas.openxmlformats.org/drawingml/2006/main" xmlns:r="http://schemas.openxmlformats.org/officeDocument/2006/relationships" xmlns:p="http://schemas.openxmlformats.org/presentationml/2006/main">
   <p:cSld>
@@ -5398,6 +6018,23 @@
           </a:p>
           <a:p>
             <a:r>
+              <a:rPr lang="en-GB" dirty="0"/>
+              <a:t>Interacting with </a:t>
+            </a:r>
+            <a:r>
+              <a:rPr lang="en-GB" dirty="0" err="1" smtClean="0"/>
+              <a:t>Infinispan</a:t>
+            </a:r>
+            <a:endParaRPr lang="en-GB" dirty="0" smtClean="0"/>
+          </a:p>
+          <a:p>
+            <a:r>
+              <a:rPr lang="en-GB" dirty="0" smtClean="0"/>
+              <a:t>Modes</a:t>
+            </a:r>
+          </a:p>
+          <a:p>
+            <a:r>
               <a:rPr lang="en-GB" dirty="0" smtClean="0"/>
               <a:t>Features</a:t>
             </a:r>
@@ -5447,7 +6084,7 @@
               <a:pPr>
                 <a:defRPr/>
               </a:pPr>
-              <a:t>11 June 2015</a:t>
+              <a:t>17 June 2015</a:t>
             </a:fld>
             <a:endParaRPr lang="en-US" dirty="0"/>
           </a:p>
@@ -5564,35 +6201,66 @@
           <a:lstStyle/>
           <a:p>
             <a:r>
+              <a:rPr lang="en-GB" dirty="0" smtClean="0"/>
+              <a:t>Data Grid Platform</a:t>
+            </a:r>
+          </a:p>
+          <a:p>
+            <a:pPr lvl="1"/>
+            <a:r>
+              <a:rPr lang="en-GB" dirty="0" smtClean="0"/>
+              <a:t>Distributed Cache</a:t>
+            </a:r>
+          </a:p>
+          <a:p>
+            <a:pPr lvl="1"/>
+            <a:r>
               <a:rPr lang="en-GB" dirty="0"/>
-              <a:t>E</a:t>
+              <a:t>NoSQL key/value </a:t>
             </a:r>
             <a:r>
               <a:rPr lang="en-GB" dirty="0" smtClean="0"/>
-              <a:t>xtremely </a:t>
-            </a:r>
+              <a:t>store</a:t>
+            </a:r>
+          </a:p>
+          <a:p>
+            <a:pPr lvl="1"/>
             <a:r>
               <a:rPr lang="en-GB" dirty="0"/>
-              <a:t>scalable, highly available key/value data store and data grid platform</a:t>
+              <a:t>Extremely </a:t>
             </a:r>
             <a:r>
               <a:rPr lang="en-GB" dirty="0" smtClean="0"/>
-              <a:t>.</a:t>
-            </a:r>
-          </a:p>
-          <a:p>
-            <a:r>
-              <a:rPr lang="en-GB" dirty="0"/>
-              <a:t>O</a:t>
-            </a:r>
+              <a:t>scalable</a:t>
+            </a:r>
+          </a:p>
+          <a:p>
+            <a:pPr lvl="1"/>
             <a:r>
               <a:rPr lang="en-GB" dirty="0" smtClean="0"/>
-              <a:t>ften </a:t>
-            </a:r>
-            <a:r>
-              <a:rPr lang="en-GB" dirty="0"/>
-              <a:t>used as a distributed cache, but also as a NoSQL key/value store or object database.</a:t>
-            </a:r>
+              <a:t>In-memory cache</a:t>
+            </a:r>
+          </a:p>
+          <a:p>
+            <a:pPr lvl="1"/>
+            <a:r>
+              <a:rPr lang="en-GB" dirty="0" smtClean="0"/>
+              <a:t>Open Source</a:t>
+            </a:r>
+          </a:p>
+          <a:p>
+            <a:pPr lvl="1"/>
+            <a:r>
+              <a:rPr lang="en-GB" dirty="0" smtClean="0"/>
+              <a:t>Highly available</a:t>
+            </a:r>
+            <a:endParaRPr lang="en-GB" dirty="0"/>
+          </a:p>
+          <a:p>
+            <a:pPr marL="0" indent="0">
+              <a:buNone/>
+            </a:pPr>
+            <a:endParaRPr lang="en-GB" baseline="30000" dirty="0" smtClean="0"/>
           </a:p>
         </p:txBody>
       </p:sp>
@@ -5638,7 +6306,7 @@
               <a:pPr>
                 <a:defRPr/>
               </a:pPr>
-              <a:t>11 June 2015</a:t>
+              <a:t>17 June 2015</a:t>
             </a:fld>
             <a:endParaRPr lang="en-US" dirty="0"/>
           </a:p>
@@ -5712,12 +6380,12 @@
       </p:grpSpPr>
       <p:sp>
         <p:nvSpPr>
-          <p:cNvPr id="2" name="Title 1"/>
-          <p:cNvSpPr>
-            <a:spLocks noGrp="1"/>
-          </p:cNvSpPr>
-          <p:nvPr>
-            <p:ph type="title"/>
+          <p:cNvPr id="3" name="Content Placeholder 2"/>
+          <p:cNvSpPr>
+            <a:spLocks noGrp="1"/>
+          </p:cNvSpPr>
+          <p:nvPr>
+            <p:ph sz="half" idx="1"/>
           </p:nvPr>
         </p:nvSpPr>
         <p:spPr/>
@@ -5726,71 +6394,204 @@
           <a:lstStyle/>
           <a:p>
             <a:r>
+              <a:rPr lang="en-GB" i="1" dirty="0"/>
+              <a:t>Embedded</a:t>
+            </a:r>
+            <a:r>
+              <a:rPr lang="en-GB" dirty="0"/>
+              <a:t> </a:t>
+            </a:r>
+            <a:r>
               <a:rPr lang="en-GB" dirty="0" smtClean="0"/>
-              <a:t>Features</a:t>
-            </a:r>
+              <a:t>(P2P)</a:t>
+            </a:r>
+          </a:p>
+          <a:p>
+            <a:pPr lvl="1"/>
+            <a:r>
+              <a:rPr lang="en-GB" sz="2000" dirty="0" smtClean="0"/>
+              <a:t>into </a:t>
+            </a:r>
+            <a:r>
+              <a:rPr lang="en-GB" sz="2000" dirty="0"/>
+              <a:t>your application </a:t>
+            </a:r>
+            <a:r>
+              <a:rPr lang="en-GB" sz="2000" dirty="0" smtClean="0"/>
+              <a:t>code</a:t>
+            </a:r>
+          </a:p>
+          <a:p>
+            <a:pPr lvl="1"/>
+            <a:r>
+              <a:rPr lang="en-GB" sz="2000" dirty="0"/>
+              <a:t>Libraries exist in same JVM as application code.</a:t>
+            </a:r>
+          </a:p>
+          <a:p>
+            <a:pPr lvl="1"/>
+            <a:r>
+              <a:rPr lang="en-GB" sz="2000" dirty="0"/>
+              <a:t>Data grid is easily scalable.</a:t>
+            </a:r>
+          </a:p>
+          <a:p>
+            <a:pPr lvl="1"/>
+            <a:r>
+              <a:rPr lang="en-GB" sz="2000" dirty="0"/>
+              <a:t>Peer to Peer </a:t>
+            </a:r>
+            <a:r>
+              <a:rPr lang="en-GB" sz="2000" dirty="0"/>
+              <a:t>deployments are simpler than </a:t>
+            </a:r>
+            <a:r>
+              <a:rPr lang="en-GB" sz="2000" dirty="0"/>
+              <a:t>client-server.</a:t>
+            </a:r>
+          </a:p>
+          <a:p>
+            <a:pPr lvl="1"/>
+            <a:r>
+              <a:rPr lang="en-GB" sz="2000" dirty="0"/>
+              <a:t>Used when:</a:t>
+            </a:r>
+            <a:endParaRPr lang="en-GB" sz="2000" dirty="0"/>
+          </a:p>
+          <a:p>
+            <a:pPr lvl="2">
+              <a:buClrTx/>
+              <a:buFont typeface="Wingdings" panose="05000000000000000000" pitchFamily="2" charset="2"/>
+              <a:buChar char="§"/>
+            </a:pPr>
+            <a:r>
+              <a:rPr lang="en-GB" sz="1800" dirty="0"/>
+              <a:t>application or a framework that needs to be </a:t>
+            </a:r>
+            <a:r>
+              <a:rPr lang="en-GB" sz="1800" dirty="0" smtClean="0"/>
+              <a:t>cluster-aware</a:t>
+            </a:r>
+            <a:endParaRPr lang="en-GB" sz="1800" dirty="0"/>
+          </a:p>
+          <a:p>
+            <a:pPr lvl="2">
+              <a:buClrTx/>
+              <a:buFont typeface="Wingdings" panose="05000000000000000000" pitchFamily="2" charset="2"/>
+              <a:buChar char="§"/>
+            </a:pPr>
+            <a:r>
+              <a:rPr lang="en-GB" sz="1800" dirty="0"/>
+              <a:t>need an in-memory distributed cache to front a database or some other expensive data source</a:t>
+            </a:r>
+          </a:p>
+          <a:p>
+            <a:pPr marL="571500" lvl="1" indent="0">
+              <a:buNone/>
+            </a:pPr>
             <a:endParaRPr lang="en-GB" dirty="0"/>
           </a:p>
-        </p:txBody>
-      </p:sp>
-      <p:sp>
-        <p:nvSpPr>
-          <p:cNvPr id="3" name="Content Placeholder 2"/>
-          <p:cNvSpPr>
-            <a:spLocks noGrp="1"/>
-          </p:cNvSpPr>
-          <p:nvPr>
-            <p:ph idx="1"/>
-          </p:nvPr>
-        </p:nvSpPr>
-        <p:spPr/>
+          <a:p>
+            <a:endParaRPr lang="en-GB" dirty="0"/>
+          </a:p>
+        </p:txBody>
+      </p:sp>
+      <p:pic>
+        <p:nvPicPr>
+          <p:cNvPr id="1026" name="Picture 2"/>
+          <p:cNvPicPr>
+            <a:picLocks noGrp="1" noChangeAspect="1" noChangeArrowheads="1"/>
+          </p:cNvPicPr>
+          <p:nvPr>
+            <p:ph sz="half" idx="2"/>
+          </p:nvPr>
+        </p:nvPicPr>
+        <p:blipFill>
+          <a:blip r:embed="rId2">
+            <a:extLst>
+              <a:ext uri="{28A0092B-C50C-407E-A947-70E740481C1C}">
+                <a14:useLocalDpi xmlns:a14="http://schemas.microsoft.com/office/drawing/2010/main" val="0"/>
+              </a:ext>
+            </a:extLst>
+          </a:blip>
+          <a:stretch>
+            <a:fillRect/>
+          </a:stretch>
+        </p:blipFill>
+        <p:spPr bwMode="auto">
+          <a:xfrm>
+            <a:off x="4648200" y="2698644"/>
+            <a:ext cx="4065588" cy="2229063"/>
+          </a:xfrm>
+          <a:prstGeom prst="rect">
+            <a:avLst/>
+          </a:prstGeom>
+          <a:noFill/>
+          <a:ln>
+            <a:noFill/>
+          </a:ln>
+          <a:extLst>
+            <a:ext uri="{909E8E84-426E-40DD-AFC4-6F175D3DCCD1}">
+              <a14:hiddenFill xmlns:a14="http://schemas.microsoft.com/office/drawing/2010/main">
+                <a:solidFill>
+                  <a:schemeClr val="accent1"/>
+                </a:solidFill>
+              </a14:hiddenFill>
+            </a:ext>
+            <a:ext uri="{91240B29-F687-4F45-9708-019B960494DF}">
+              <a14:hiddenLine xmlns:a14="http://schemas.microsoft.com/office/drawing/2010/main" w="9525">
+                <a:solidFill>
+                  <a:schemeClr val="tx1"/>
+                </a:solidFill>
+                <a:miter lim="800000"/>
+                <a:headEnd/>
+                <a:tailEnd/>
+              </a14:hiddenLine>
+            </a:ext>
+          </a:extLst>
+        </p:spPr>
+      </p:pic>
+      <p:sp>
+        <p:nvSpPr>
+          <p:cNvPr id="2" name="Title 1"/>
+          <p:cNvSpPr>
+            <a:spLocks noGrp="1"/>
+          </p:cNvSpPr>
+          <p:nvPr>
+            <p:ph type="title"/>
+          </p:nvPr>
+        </p:nvSpPr>
+        <p:spPr>
+          <a:prstGeom prst="rect">
+            <a:avLst/>
+          </a:prstGeom>
+        </p:spPr>
         <p:txBody>
           <a:bodyPr/>
           <a:lstStyle/>
           <a:p>
             <a:r>
               <a:rPr lang="en-GB" dirty="0"/>
-              <a:t>In-memory local and clustered cache</a:t>
-            </a:r>
-          </a:p>
-          <a:p>
+              <a:t>Interacting with </a:t>
+            </a:r>
+            <a:r>
+              <a:rPr lang="en-GB" dirty="0" err="1"/>
+              <a:t>Infinispan</a:t>
+            </a:r>
             <a:r>
               <a:rPr lang="en-GB" dirty="0"/>
-              <a:t>Clustering</a:t>
-            </a:r>
-          </a:p>
-          <a:p>
-            <a:r>
+              <a:t/>
+            </a:r>
+            <a:br>
               <a:rPr lang="en-GB" dirty="0"/>
-              <a:t>Transactions</a:t>
-            </a:r>
-          </a:p>
-          <a:p>
-            <a:r>
-              <a:rPr lang="en-GB" dirty="0"/>
-              <a:t>Persistence</a:t>
-            </a:r>
-          </a:p>
-          <a:p>
-            <a:r>
-              <a:rPr lang="en-GB" dirty="0"/>
-              <a:t>Configuration / Development</a:t>
-            </a:r>
-          </a:p>
-          <a:p>
-            <a:r>
-              <a:rPr lang="en-GB" dirty="0"/>
-              <a:t>Integrations</a:t>
-            </a:r>
-          </a:p>
-          <a:p>
+            </a:br>
             <a:endParaRPr lang="en-GB" dirty="0"/>
           </a:p>
         </p:txBody>
       </p:sp>
       <p:sp>
         <p:nvSpPr>
-          <p:cNvPr id="4" name="Text Placeholder 3"/>
+          <p:cNvPr id="9" name="Text Placeholder 8"/>
           <p:cNvSpPr>
             <a:spLocks noGrp="1"/>
           </p:cNvSpPr>
@@ -5814,7 +6615,7 @@
             <a:spLocks noGrp="1"/>
           </p:cNvSpPr>
           <p:nvPr>
-            <p:ph type="dt" sz="half" idx="14"/>
+            <p:ph type="dt" sz="half" idx="10"/>
           </p:nvPr>
         </p:nvSpPr>
         <p:spPr/>
@@ -5830,7 +6631,7 @@
               <a:pPr>
                 <a:defRPr/>
               </a:pPr>
-              <a:t>11 June 2015</a:t>
+              <a:t>17 June 2015</a:t>
             </a:fld>
             <a:endParaRPr lang="en-US" dirty="0"/>
           </a:p>
@@ -5843,7 +6644,7 @@
             <a:spLocks noGrp="1"/>
           </p:cNvSpPr>
           <p:nvPr>
-            <p:ph type="sldNum" sz="quarter" idx="15"/>
+            <p:ph type="sldNum" sz="quarter" idx="12"/>
           </p:nvPr>
         </p:nvSpPr>
         <p:spPr/>
@@ -5868,13 +6669,20 @@
     </p:spTree>
     <p:extLst>
       <p:ext uri="{BB962C8B-B14F-4D97-AF65-F5344CB8AC3E}">
-        <p14:creationId xmlns:p14="http://schemas.microsoft.com/office/powerpoint/2010/main" val="1007208415"/>
+        <p14:creationId xmlns:p14="http://schemas.microsoft.com/office/powerpoint/2010/main" val="12587641"/>
       </p:ext>
     </p:extLst>
   </p:cSld>
   <p:clrMapOvr>
     <a:masterClrMapping/>
   </p:clrMapOvr>
+  <p:timing>
+    <p:tnLst>
+      <p:par>
+        <p:cTn id="1" dur="indefinite" restart="never" nodeType="tmRoot"/>
+      </p:par>
+    </p:tnLst>
+  </p:timing>
 </p:sld>
 </file>
 
@@ -5910,7 +6718,15 @@
           <a:bodyPr/>
           <a:lstStyle/>
           <a:p>
-            <a:endParaRPr lang="en-GB"/>
+            <a:r>
+              <a:rPr lang="en-GB" dirty="0"/>
+              <a:t>Interacting with </a:t>
+            </a:r>
+            <a:r>
+              <a:rPr lang="en-GB" dirty="0" err="1"/>
+              <a:t>Infinispan</a:t>
+            </a:r>
+            <a:endParaRPr lang="en-GB" dirty="0"/>
           </a:p>
         </p:txBody>
       </p:sp>
@@ -5929,7 +6745,193 @@
           <a:bodyPr/>
           <a:lstStyle/>
           <a:p>
-            <a:endParaRPr lang="en-GB"/>
+            <a:r>
+              <a:rPr lang="en-GB" dirty="0"/>
+              <a:t>As a </a:t>
+            </a:r>
+            <a:r>
+              <a:rPr lang="en-GB" i="1" dirty="0"/>
+              <a:t>Remote</a:t>
+            </a:r>
+            <a:r>
+              <a:rPr lang="en-GB" dirty="0"/>
+              <a:t> server : supported protocols </a:t>
+            </a:r>
+          </a:p>
+          <a:p>
+            <a:pPr lvl="1"/>
+            <a:r>
+              <a:rPr lang="en-GB" dirty="0"/>
+              <a:t>accessed by a client</a:t>
+            </a:r>
+          </a:p>
+          <a:p>
+            <a:pPr lvl="1"/>
+            <a:r>
+              <a:rPr lang="en-GB" dirty="0"/>
+              <a:t>supported protocols are:</a:t>
+            </a:r>
+          </a:p>
+          <a:p>
+            <a:pPr lvl="2">
+              <a:buClrTx/>
+              <a:buFont typeface="Wingdings" panose="05000000000000000000" pitchFamily="2" charset="2"/>
+              <a:buChar char="§"/>
+            </a:pPr>
+            <a:r>
+              <a:rPr lang="en-GB" dirty="0"/>
+              <a:t>REST</a:t>
+            </a:r>
+          </a:p>
+          <a:p>
+            <a:pPr lvl="2">
+              <a:buClrTx/>
+              <a:buFont typeface="Wingdings" panose="05000000000000000000" pitchFamily="2" charset="2"/>
+              <a:buChar char="§"/>
+            </a:pPr>
+            <a:r>
+              <a:rPr lang="en-GB" dirty="0" err="1"/>
+              <a:t>Memcached</a:t>
+            </a:r>
+            <a:endParaRPr lang="en-GB" dirty="0"/>
+          </a:p>
+          <a:p>
+            <a:pPr lvl="2">
+              <a:buClrTx/>
+              <a:buFont typeface="Wingdings" panose="05000000000000000000" pitchFamily="2" charset="2"/>
+              <a:buChar char="§"/>
+            </a:pPr>
+            <a:r>
+              <a:rPr lang="en-GB" dirty="0"/>
+              <a:t>Hot </a:t>
+            </a:r>
+            <a:r>
+              <a:rPr lang="en-GB" dirty="0" smtClean="0"/>
+              <a:t>Rod</a:t>
+            </a:r>
+          </a:p>
+          <a:p>
+            <a:pPr lvl="1"/>
+            <a:r>
+              <a:rPr lang="en-GB" dirty="0" err="1"/>
+              <a:t>Infinispan</a:t>
+            </a:r>
+            <a:r>
+              <a:rPr lang="en-GB" dirty="0"/>
+              <a:t> provides client components to access data </a:t>
+            </a:r>
+            <a:r>
+              <a:rPr lang="en-GB" dirty="0" smtClean="0"/>
+              <a:t>grid </a:t>
+            </a:r>
+            <a:r>
+              <a:rPr lang="en-GB" dirty="0"/>
+              <a:t>using these protocols.</a:t>
+            </a:r>
+          </a:p>
+          <a:p>
+            <a:pPr lvl="1"/>
+            <a:r>
+              <a:rPr lang="en-GB" dirty="0"/>
+              <a:t>Used when :</a:t>
+            </a:r>
+          </a:p>
+          <a:p>
+            <a:pPr lvl="2">
+              <a:buClrTx/>
+              <a:buFont typeface="Wingdings" panose="05000000000000000000" pitchFamily="2" charset="2"/>
+              <a:buChar char="§"/>
+            </a:pPr>
+            <a:r>
+              <a:rPr lang="en-GB" dirty="0"/>
+              <a:t>n</a:t>
+            </a:r>
+            <a:r>
+              <a:rPr lang="en-GB" dirty="0" smtClean="0"/>
+              <a:t>eed to provide external access to data grid.</a:t>
+            </a:r>
+          </a:p>
+          <a:p>
+            <a:pPr lvl="2">
+              <a:buClrTx/>
+              <a:buFont typeface="Wingdings" panose="05000000000000000000" pitchFamily="2" charset="2"/>
+              <a:buChar char="§"/>
+            </a:pPr>
+            <a:r>
+              <a:rPr lang="en-GB" dirty="0" smtClean="0"/>
+              <a:t>accessing </a:t>
+            </a:r>
+            <a:r>
+              <a:rPr lang="en-GB" dirty="0" err="1"/>
+              <a:t>Infinispan</a:t>
+            </a:r>
+            <a:r>
+              <a:rPr lang="en-GB" dirty="0"/>
+              <a:t> from a non-JVM </a:t>
+            </a:r>
+            <a:r>
+              <a:rPr lang="en-GB" dirty="0" smtClean="0"/>
+              <a:t>environment</a:t>
+            </a:r>
+            <a:endParaRPr lang="en-GB" dirty="0"/>
+          </a:p>
+          <a:p>
+            <a:pPr lvl="2">
+              <a:buClrTx/>
+              <a:buFont typeface="Wingdings" panose="05000000000000000000" pitchFamily="2" charset="2"/>
+              <a:buChar char="§"/>
+            </a:pPr>
+            <a:r>
+              <a:rPr lang="en-GB" dirty="0"/>
+              <a:t>multiple applications </a:t>
+            </a:r>
+            <a:r>
+              <a:rPr lang="en-GB" dirty="0" smtClean="0"/>
+              <a:t>need </a:t>
+            </a:r>
+            <a:r>
+              <a:rPr lang="en-GB" dirty="0"/>
+              <a:t>access to data </a:t>
+            </a:r>
+            <a:r>
+              <a:rPr lang="en-GB" dirty="0" smtClean="0"/>
+              <a:t>storage, </a:t>
+            </a:r>
+            <a:r>
+              <a:rPr lang="en-GB" dirty="0"/>
+              <a:t>deploy </a:t>
+            </a:r>
+            <a:r>
+              <a:rPr lang="en-GB" dirty="0" err="1"/>
+              <a:t>Infinispan</a:t>
+            </a:r>
+            <a:r>
+              <a:rPr lang="en-GB" dirty="0"/>
+              <a:t> in client-server mode keeping a pool of </a:t>
+            </a:r>
+            <a:r>
+              <a:rPr lang="en-GB" dirty="0" err="1"/>
+              <a:t>Infinispan</a:t>
+            </a:r>
+            <a:r>
+              <a:rPr lang="en-GB" dirty="0"/>
+              <a:t> data grid nodes acting as a shared storage tier for your applications</a:t>
+            </a:r>
+            <a:r>
+              <a:rPr lang="en-GB" dirty="0" smtClean="0"/>
+              <a:t>.</a:t>
+            </a:r>
+          </a:p>
+          <a:p>
+            <a:pPr lvl="2">
+              <a:buClrTx/>
+              <a:buFont typeface="Wingdings" panose="05000000000000000000" pitchFamily="2" charset="2"/>
+              <a:buChar char="§"/>
+            </a:pPr>
+            <a:endParaRPr lang="en-GB" dirty="0"/>
+          </a:p>
+          <a:p>
+            <a:endParaRPr lang="en-GB" dirty="0"/>
           </a:p>
         </p:txBody>
       </p:sp>
@@ -5975,7 +6977,7 @@
               <a:pPr>
                 <a:defRPr/>
               </a:pPr>
-              <a:t>11 June 2015</a:t>
+              <a:t>17 June 2015</a:t>
             </a:fld>
             <a:endParaRPr lang="en-US" dirty="0"/>
           </a:p>
@@ -6013,13 +7015,20 @@
     </p:spTree>
     <p:extLst>
       <p:ext uri="{BB962C8B-B14F-4D97-AF65-F5344CB8AC3E}">
-        <p14:creationId xmlns:p14="http://schemas.microsoft.com/office/powerpoint/2010/main" val="479859234"/>
+        <p14:creationId xmlns:p14="http://schemas.microsoft.com/office/powerpoint/2010/main" val="3297347341"/>
       </p:ext>
     </p:extLst>
   </p:cSld>
   <p:clrMapOvr>
     <a:masterClrMapping/>
   </p:clrMapOvr>
+  <p:timing>
+    <p:tnLst>
+      <p:par>
+        <p:cTn id="1" dur="indefinite" restart="never" nodeType="tmRoot"/>
+      </p:par>
+    </p:tnLst>
+  </p:timing>
 </p:sld>
 </file>
 
@@ -6055,10 +7064,7 @@
           <a:bodyPr/>
           <a:lstStyle/>
           <a:p>
-            <a:r>
-              <a:rPr lang="en-GB" dirty="0"/>
-              <a:t>Clustering</a:t>
-            </a:r>
+            <a:endParaRPr lang="en-GB"/>
           </a:p>
         </p:txBody>
       </p:sp>
@@ -6123,7 +7129,7 @@
               <a:pPr>
                 <a:defRPr/>
               </a:pPr>
-              <a:t>11 June 2015</a:t>
+              <a:t>17 June 2015</a:t>
             </a:fld>
             <a:endParaRPr lang="en-US" dirty="0"/>
           </a:p>
@@ -6158,10 +7164,51 @@
           </a:p>
         </p:txBody>
       </p:sp>
+      <p:pic>
+        <p:nvPicPr>
+          <p:cNvPr id="2050" name="Picture 2" descr="https://www.safaribooksonline.com/library/view/infinispan-data-grid/9781782169970/graphics/9970_03_04.jpg"/>
+          <p:cNvPicPr>
+            <a:picLocks noChangeAspect="1" noChangeArrowheads="1"/>
+          </p:cNvPicPr>
+          <p:nvPr/>
+        </p:nvPicPr>
+        <p:blipFill>
+          <a:blip r:embed="rId2">
+            <a:extLst>
+              <a:ext uri="{28A0092B-C50C-407E-A947-70E740481C1C}">
+                <a14:useLocalDpi xmlns:a14="http://schemas.microsoft.com/office/drawing/2010/main" val="0"/>
+              </a:ext>
+            </a:extLst>
+          </a:blip>
+          <a:srcRect/>
+          <a:stretch>
+            <a:fillRect/>
+          </a:stretch>
+        </p:blipFill>
+        <p:spPr bwMode="auto">
+          <a:xfrm>
+            <a:off x="2536535" y="2123230"/>
+            <a:ext cx="3243072" cy="2657856"/>
+          </a:xfrm>
+          <a:prstGeom prst="rect">
+            <a:avLst/>
+          </a:prstGeom>
+          <a:noFill/>
+          <a:extLst>
+            <a:ext uri="{909E8E84-426E-40DD-AFC4-6F175D3DCCD1}">
+              <a14:hiddenFill xmlns:a14="http://schemas.microsoft.com/office/drawing/2010/main">
+                <a:solidFill>
+                  <a:srgbClr val="FFFFFF"/>
+                </a:solidFill>
+              </a14:hiddenFill>
+            </a:ext>
+          </a:extLst>
+        </p:spPr>
+      </p:pic>
     </p:spTree>
     <p:extLst>
       <p:ext uri="{BB962C8B-B14F-4D97-AF65-F5344CB8AC3E}">
-        <p14:creationId xmlns:p14="http://schemas.microsoft.com/office/powerpoint/2010/main" val="3515555941"/>
+        <p14:creationId xmlns:p14="http://schemas.microsoft.com/office/powerpoint/2010/main" val="3606687161"/>
       </p:ext>
     </p:extLst>
   </p:cSld>
@@ -6212,8 +7259,8 @@
         </p:blipFill>
         <p:spPr bwMode="auto">
           <a:xfrm>
-            <a:off x="4802430" y="1278320"/>
-            <a:ext cx="4064000" cy="2790208"/>
+            <a:off x="4840835" y="1777585"/>
+            <a:ext cx="4064000" cy="3302830"/>
           </a:xfrm>
           <a:prstGeom prst="rect">
             <a:avLst/>
@@ -6264,85 +7311,85 @@
           <a:lstStyle/>
           <a:p>
             <a:r>
-              <a:rPr lang="en-GB" sz="1400" dirty="0"/>
+              <a:rPr lang="en-GB" sz="1800" dirty="0"/>
               <a:t>automatically discover </a:t>
             </a:r>
             <a:r>
-              <a:rPr lang="en-GB" sz="1400" dirty="0" err="1"/>
+              <a:rPr lang="en-GB" sz="1800" dirty="0" err="1"/>
               <a:t>neighboring</a:t>
             </a:r>
             <a:r>
-              <a:rPr lang="en-GB" sz="1400" dirty="0"/>
+              <a:rPr lang="en-GB" sz="1800" dirty="0"/>
               <a:t> instances on other JVMs on the same local network, and form a </a:t>
             </a:r>
             <a:r>
-              <a:rPr lang="en-GB" sz="1400" dirty="0" smtClean="0"/>
+              <a:rPr lang="en-GB" sz="1800" dirty="0" smtClean="0"/>
               <a:t>cluster</a:t>
             </a:r>
           </a:p>
           <a:p>
             <a:r>
-              <a:rPr lang="en-GB" sz="1400" dirty="0"/>
+              <a:rPr lang="en-GB" sz="1800" dirty="0"/>
               <a:t>Entries added to any of these cache instances will be replicated to all other cache instances in the </a:t>
             </a:r>
             <a:r>
-              <a:rPr lang="en-GB" sz="1400" dirty="0" smtClean="0"/>
+              <a:rPr lang="en-GB" sz="1800" dirty="0" smtClean="0"/>
               <a:t>cluster</a:t>
             </a:r>
           </a:p>
           <a:p>
             <a:r>
-              <a:rPr lang="en-GB" sz="1400" dirty="0"/>
+              <a:rPr lang="en-GB" sz="1800" dirty="0"/>
               <a:t>Replication can be synchronous or asynchronous</a:t>
             </a:r>
             <a:r>
-              <a:rPr lang="en-GB" sz="1400" dirty="0" smtClean="0"/>
+              <a:rPr lang="en-GB" sz="1800" dirty="0" smtClean="0"/>
               <a:t>.</a:t>
             </a:r>
           </a:p>
           <a:p>
             <a:r>
-              <a:rPr lang="en-GB" sz="1400" dirty="0"/>
+              <a:rPr lang="en-GB" sz="1800" dirty="0"/>
               <a:t>synchronous replication requires acknowledgments from all nodes in a </a:t>
             </a:r>
             <a:r>
-              <a:rPr lang="en-GB" sz="1400" dirty="0" smtClean="0"/>
+              <a:rPr lang="en-GB" sz="1800" dirty="0" smtClean="0"/>
               <a:t>cluster</a:t>
             </a:r>
           </a:p>
           <a:p>
             <a:r>
-              <a:rPr lang="en-GB" sz="1400" dirty="0" smtClean="0"/>
+              <a:rPr lang="en-GB" sz="1800" dirty="0" smtClean="0"/>
               <a:t>Asynchronous </a:t>
             </a:r>
             <a:r>
-              <a:rPr lang="en-GB" sz="1400" dirty="0"/>
+              <a:rPr lang="en-GB" sz="1800" dirty="0"/>
               <a:t>replication </a:t>
             </a:r>
             <a:r>
-              <a:rPr lang="en-GB" sz="1400" dirty="0" smtClean="0"/>
+              <a:rPr lang="en-GB" sz="1800" dirty="0" smtClean="0"/>
               <a:t>works </a:t>
             </a:r>
             <a:r>
-              <a:rPr lang="en-GB" sz="1400" dirty="0"/>
+              <a:rPr lang="en-GB" sz="1800" dirty="0"/>
               <a:t>in a </a:t>
             </a:r>
             <a:r>
-              <a:rPr lang="en-GB" sz="1400" i="1" dirty="0"/>
+              <a:rPr lang="en-GB" sz="1800" i="1" dirty="0"/>
               <a:t>fire-and-forget</a:t>
             </a:r>
             <a:r>
-              <a:rPr lang="en-GB" sz="1400" dirty="0"/>
+              <a:rPr lang="en-GB" sz="1800" dirty="0"/>
               <a:t> mode</a:t>
             </a:r>
             <a:r>
-              <a:rPr lang="en-GB" sz="1400" dirty="0" smtClean="0"/>
+              <a:rPr lang="en-GB" sz="1800" dirty="0" smtClean="0"/>
               <a:t>.</a:t>
             </a:r>
           </a:p>
           <a:p>
             <a:r>
-              <a:rPr lang="en-GB" sz="1400" dirty="0"/>
+              <a:rPr lang="en-GB" sz="1800" dirty="0"/>
               <a:t>replication practically only performs well in small clusters (under 10 nodes)</a:t>
             </a:r>
           </a:p>
@@ -6416,7 +7463,7 @@
               <a:pPr>
                 <a:defRPr/>
               </a:pPr>
-              <a:t>11 June 2015</a:t>
+              <a:t>17 June 2015</a:t>
             </a:fld>
             <a:endParaRPr lang="en-US" dirty="0"/>
           </a:p>
@@ -6454,7 +7501,211 @@
     </p:spTree>
     <p:extLst>
       <p:ext uri="{BB962C8B-B14F-4D97-AF65-F5344CB8AC3E}">
-        <p14:creationId xmlns:p14="http://schemas.microsoft.com/office/powerpoint/2010/main" val="1915182414"/>
+        <p14:creationId xmlns:p14="http://schemas.microsoft.com/office/powerpoint/2010/main" val="1749713803"/>
+      </p:ext>
+    </p:extLst>
+  </p:cSld>
+  <p:clrMapOvr>
+    <a:masterClrMapping/>
+  </p:clrMapOvr>
+  <p:timing>
+    <p:tnLst>
+      <p:par>
+        <p:cTn id="1" dur="indefinite" restart="never" nodeType="tmRoot"/>
+      </p:par>
+    </p:tnLst>
+  </p:timing>
+</p:sld>
+</file>
+
+<file path=ppt/slides/slide8.xml><?xml version="1.0" encoding="utf-8"?>
+<p:sld xmlns:a="http://schemas.openxmlformats.org/drawingml/2006/main" xmlns:r="http://schemas.openxmlformats.org/officeDocument/2006/relationships" xmlns:p="http://schemas.openxmlformats.org/presentationml/2006/main">
+  <p:cSld>
+    <p:spTree>
+      <p:nvGrpSpPr>
+        <p:cNvPr id="1" name=""/>
+        <p:cNvGrpSpPr/>
+        <p:nvPr/>
+      </p:nvGrpSpPr>
+      <p:grpSpPr>
+        <a:xfrm>
+          <a:off x="0" y="0"/>
+          <a:ext cx="0" cy="0"/>
+          <a:chOff x="0" y="0"/>
+          <a:chExt cx="0" cy="0"/>
+        </a:xfrm>
+      </p:grpSpPr>
+      <p:sp>
+        <p:nvSpPr>
+          <p:cNvPr id="14" name="Title 13"/>
+          <p:cNvSpPr>
+            <a:spLocks noGrp="1"/>
+          </p:cNvSpPr>
+          <p:nvPr>
+            <p:ph type="title"/>
+          </p:nvPr>
+        </p:nvSpPr>
+        <p:spPr/>
+        <p:txBody>
+          <a:bodyPr/>
+          <a:lstStyle/>
+          <a:p>
+            <a:r>
+              <a:rPr lang="en-GB" dirty="0" smtClean="0"/>
+              <a:t>Modes</a:t>
+            </a:r>
+            <a:endParaRPr lang="en-GB" dirty="0"/>
+          </a:p>
+        </p:txBody>
+      </p:sp>
+      <p:sp>
+        <p:nvSpPr>
+          <p:cNvPr id="15" name="Content Placeholder 14"/>
+          <p:cNvSpPr>
+            <a:spLocks noGrp="1"/>
+          </p:cNvSpPr>
+          <p:nvPr>
+            <p:ph idx="1"/>
+          </p:nvPr>
+        </p:nvSpPr>
+        <p:spPr/>
+        <p:txBody>
+          <a:bodyPr/>
+          <a:lstStyle/>
+          <a:p>
+            <a:r>
+              <a:rPr lang="en-GB" dirty="0" smtClean="0"/>
+              <a:t>Local </a:t>
+            </a:r>
+          </a:p>
+          <a:p>
+            <a:pPr lvl="1"/>
+            <a:r>
+              <a:rPr lang="en-GB" dirty="0"/>
+              <a:t>entries are stored on the local node </a:t>
+            </a:r>
+            <a:r>
+              <a:rPr lang="en-GB" dirty="0" smtClean="0"/>
+              <a:t>only</a:t>
+            </a:r>
+          </a:p>
+          <a:p>
+            <a:pPr lvl="1"/>
+            <a:r>
+              <a:rPr lang="en-GB" dirty="0" err="1"/>
+              <a:t>Infinispan</a:t>
+            </a:r>
+            <a:r>
+              <a:rPr lang="en-GB" dirty="0"/>
+              <a:t> is typically operating as a local cache</a:t>
+            </a:r>
+            <a:endParaRPr lang="en-GB" dirty="0" smtClean="0"/>
+          </a:p>
+          <a:p>
+            <a:r>
+              <a:rPr lang="en-GB" i="1" dirty="0"/>
+              <a:t>Invalidation</a:t>
+            </a:r>
+            <a:r>
+              <a:rPr lang="en-GB" dirty="0"/>
+              <a:t> </a:t>
+            </a:r>
+            <a:endParaRPr lang="en-GB" dirty="0" smtClean="0"/>
+          </a:p>
+          <a:p>
+            <a:r>
+              <a:rPr lang="en-GB" i="1" dirty="0"/>
+              <a:t>Replication</a:t>
+            </a:r>
+            <a:r>
+              <a:rPr lang="en-GB" dirty="0"/>
+              <a:t> </a:t>
+            </a:r>
+            <a:endParaRPr lang="en-GB" dirty="0" smtClean="0"/>
+          </a:p>
+          <a:p>
+            <a:r>
+              <a:rPr lang="en-GB" i="1" dirty="0"/>
+              <a:t>Distribution</a:t>
+            </a:r>
+            <a:r>
+              <a:rPr lang="en-GB" dirty="0"/>
+              <a:t> </a:t>
+            </a:r>
+          </a:p>
+        </p:txBody>
+      </p:sp>
+      <p:sp>
+        <p:nvSpPr>
+          <p:cNvPr id="16" name="Text Placeholder 15"/>
+          <p:cNvSpPr>
+            <a:spLocks noGrp="1"/>
+          </p:cNvSpPr>
+          <p:nvPr>
+            <p:ph type="body" sz="quarter" idx="13"/>
+          </p:nvPr>
+        </p:nvSpPr>
+        <p:spPr/>
+        <p:txBody>
+          <a:bodyPr/>
+          <a:lstStyle/>
+          <a:p>
+            <a:endParaRPr lang="en-GB"/>
+          </a:p>
+        </p:txBody>
+      </p:sp>
+      <p:sp>
+        <p:nvSpPr>
+          <p:cNvPr id="6" name="Date Placeholder 5"/>
+          <p:cNvSpPr>
+            <a:spLocks noGrp="1"/>
+          </p:cNvSpPr>
+          <p:nvPr>
+            <p:ph type="dt" sz="half" idx="14"/>
+          </p:nvPr>
+        </p:nvSpPr>
+        <p:spPr/>
+        <p:txBody>
+          <a:bodyPr/>
+          <a:lstStyle/>
+          <a:p>
+            <a:fld id="{262EFB65-E16C-451A-8365-0EA1441EB5B7}" type="datetime3">
+              <a:rPr lang="en-US" smtClean="0"/>
+              <a:pPr/>
+              <a:t>17 June 2015</a:t>
+            </a:fld>
+            <a:endParaRPr lang="en-US" dirty="0"/>
+          </a:p>
+        </p:txBody>
+      </p:sp>
+      <p:sp>
+        <p:nvSpPr>
+          <p:cNvPr id="7" name="Slide Number Placeholder 6"/>
+          <p:cNvSpPr>
+            <a:spLocks noGrp="1"/>
+          </p:cNvSpPr>
+          <p:nvPr>
+            <p:ph type="sldNum" sz="quarter" idx="15"/>
+          </p:nvPr>
+        </p:nvSpPr>
+        <p:spPr/>
+        <p:txBody>
+          <a:bodyPr/>
+          <a:lstStyle/>
+          <a:p>
+            <a:fld id="{62FEDF8E-5B0F-4A65-9F05-A41FA81134FA}" type="slidenum">
+              <a:rPr lang="en-US" smtClean="0"/>
+              <a:pPr/>
+              <a:t>7</a:t>
+            </a:fld>
+            <a:endParaRPr lang="en-US"/>
+          </a:p>
+        </p:txBody>
+      </p:sp>
+    </p:spTree>
+    <p:extLst>
+      <p:ext uri="{BB962C8B-B14F-4D97-AF65-F5344CB8AC3E}">
+        <p14:creationId xmlns:p14="http://schemas.microsoft.com/office/powerpoint/2010/main" val="1562823553"/>
       </p:ext>
     </p:extLst>
   </p:cSld>
@@ -6464,7 +7715,7 @@
 </p:sld>
 </file>
 
-<file path=ppt/slides/slide8.xml><?xml version="1.0" encoding="utf-8"?>
+<file path=ppt/slides/slide9.xml><?xml version="1.0" encoding="utf-8"?>
 <p:sld xmlns:a="http://schemas.openxmlformats.org/drawingml/2006/main" xmlns:r="http://schemas.openxmlformats.org/officeDocument/2006/relationships" xmlns:p="http://schemas.openxmlformats.org/presentationml/2006/main">
   <p:cSld>
     <p:spTree>
@@ -6628,7 +7879,7 @@
               <a:pPr>
                 <a:defRPr/>
               </a:pPr>
-              <a:t>11 June 2015</a:t>
+              <a:t>17 June 2015</a:t>
             </a:fld>
             <a:endParaRPr lang="en-US" dirty="0"/>
           </a:p>
@@ -6657,7 +7908,7 @@
               <a:pPr>
                 <a:defRPr/>
               </a:pPr>
-              <a:t>7</a:t>
+              <a:t>8</a:t>
             </a:fld>
             <a:endParaRPr lang="en-US" dirty="0"/>
           </a:p>
@@ -6666,7 +7917,7 @@
     </p:spTree>
     <p:extLst>
       <p:ext uri="{BB962C8B-B14F-4D97-AF65-F5344CB8AC3E}">
-        <p14:creationId xmlns:p14="http://schemas.microsoft.com/office/powerpoint/2010/main" val="2307780363"/>
+        <p14:creationId xmlns:p14="http://schemas.microsoft.com/office/powerpoint/2010/main" val="2089670844"/>
       </p:ext>
     </p:extLst>
   </p:cSld>

</xml_diff>

<commit_message>
PPT changed and File Store Cache/ Listener example
</commit_message>
<xml_diff>
--- a/infinispan-embedded-tutorial/Infinispan.pptx
+++ b/infinispan-embedded-tutorial/Infinispan.pptx
@@ -5,10 +5,10 @@
     <p:sldMasterId id="2147483733" r:id="rId4"/>
   </p:sldMasterIdLst>
   <p:notesMasterIdLst>
-    <p:notesMasterId r:id="rId18"/>
+    <p:notesMasterId r:id="rId19"/>
   </p:notesMasterIdLst>
   <p:handoutMasterIdLst>
-    <p:handoutMasterId r:id="rId19"/>
+    <p:handoutMasterId r:id="rId20"/>
   </p:handoutMasterIdLst>
   <p:sldIdLst>
     <p:sldId id="256" r:id="rId5"/>
@@ -16,14 +16,15 @@
     <p:sldId id="258" r:id="rId7"/>
     <p:sldId id="264" r:id="rId8"/>
     <p:sldId id="265" r:id="rId9"/>
-    <p:sldId id="268" r:id="rId10"/>
-    <p:sldId id="266" r:id="rId11"/>
-    <p:sldId id="269" r:id="rId12"/>
+    <p:sldId id="274" r:id="rId10"/>
+    <p:sldId id="269" r:id="rId11"/>
+    <p:sldId id="266" r:id="rId12"/>
     <p:sldId id="267" r:id="rId13"/>
     <p:sldId id="270" r:id="rId14"/>
-    <p:sldId id="259" r:id="rId15"/>
-    <p:sldId id="260" r:id="rId16"/>
-    <p:sldId id="261" r:id="rId17"/>
+    <p:sldId id="272" r:id="rId15"/>
+    <p:sldId id="259" r:id="rId16"/>
+    <p:sldId id="260" r:id="rId17"/>
+    <p:sldId id="273" r:id="rId18"/>
   </p:sldIdLst>
   <p:sldSz cx="9144000" cy="6858000" type="screen4x3"/>
   <p:notesSz cx="6669088" cy="9872663"/>
@@ -157,6 +158,34 @@
       </a:defRPr>
     </a:lvl9pPr>
   </p:defaultTextStyle>
+  <p:extLst>
+    <p:ext uri="{521415D9-36F7-43E2-AB2F-B90AF26B5E84}">
+      <p14:sectionLst xmlns:p14="http://schemas.microsoft.com/office/powerpoint/2010/main">
+        <p14:section name="Default Section" id="{7646ED15-4D97-4F1A-8D5E-683D581EADE9}">
+          <p14:sldIdLst>
+            <p14:sldId id="256"/>
+            <p14:sldId id="257"/>
+            <p14:sldId id="258"/>
+            <p14:sldId id="264"/>
+            <p14:sldId id="265"/>
+            <p14:sldId id="274"/>
+            <p14:sldId id="269"/>
+            <p14:sldId id="266"/>
+            <p14:sldId id="267"/>
+            <p14:sldId id="270"/>
+          </p14:sldIdLst>
+        </p14:section>
+        <p14:section name="Untitled Section" id="{FCA8E30B-4624-4390-AA21-5108CAC0652F}">
+          <p14:sldIdLst>
+            <p14:sldId id="272"/>
+            <p14:sldId id="259"/>
+            <p14:sldId id="260"/>
+            <p14:sldId id="273"/>
+          </p14:sldIdLst>
+        </p14:section>
+      </p14:sectionLst>
+    </p:ext>
+  </p:extLst>
 </p:presentation>
 </file>
 
@@ -243,7 +272,7 @@
             <a:fld id="{AB771C5C-997B-4FBD-B8F3-A0A3C30CDBE5}" type="datetimeFigureOut">
               <a:rPr lang="en-GB" smtClean="0"/>
               <a:pPr/>
-              <a:t>16/07/2015</a:t>
+              <a:t>24/07/2015</a:t>
             </a:fld>
             <a:endParaRPr lang="en-GB"/>
           </a:p>
@@ -1737,7 +1766,7 @@
               <a:pPr>
                 <a:defRPr/>
               </a:pPr>
-              <a:t>16 July 2015</a:t>
+              <a:t>24 July 2015</a:t>
             </a:fld>
             <a:endParaRPr lang="en-US" dirty="0"/>
           </a:p>
@@ -1928,7 +1957,7 @@
               <a:pPr>
                 <a:defRPr/>
               </a:pPr>
-              <a:t>16 July 2015</a:t>
+              <a:t>24 July 2015</a:t>
             </a:fld>
             <a:endParaRPr lang="en-US" dirty="0"/>
           </a:p>
@@ -2205,7 +2234,7 @@
               <a:pPr>
                 <a:defRPr/>
               </a:pPr>
-              <a:t>16 July 2015</a:t>
+              <a:t>24 July 2015</a:t>
             </a:fld>
             <a:endParaRPr lang="en-US" dirty="0"/>
           </a:p>
@@ -2398,7 +2427,7 @@
               <a:pPr>
                 <a:defRPr/>
               </a:pPr>
-              <a:t>16 July 2015</a:t>
+              <a:t>24 July 2015</a:t>
             </a:fld>
             <a:endParaRPr lang="en-US" dirty="0"/>
           </a:p>
@@ -2772,7 +2801,7 @@
               <a:pPr>
                 <a:defRPr/>
               </a:pPr>
-              <a:t>16 July 2015</a:t>
+              <a:t>24 July 2015</a:t>
             </a:fld>
             <a:endParaRPr lang="en-US" dirty="0"/>
           </a:p>
@@ -3276,7 +3305,7 @@
               <a:pPr>
                 <a:defRPr/>
               </a:pPr>
-              <a:t>16 July 2015</a:t>
+              <a:t>24 July 2015</a:t>
             </a:fld>
             <a:endParaRPr lang="en-US" dirty="0"/>
           </a:p>
@@ -3480,7 +3509,7 @@
               <a:pPr>
                 <a:defRPr/>
               </a:pPr>
-              <a:t>16 July 2015</a:t>
+              <a:t>24 July 2015</a:t>
             </a:fld>
             <a:endParaRPr lang="en-US" dirty="0"/>
           </a:p>
@@ -3684,7 +3713,7 @@
               <a:pPr>
                 <a:defRPr/>
               </a:pPr>
-              <a:t>16 July 2015</a:t>
+              <a:t>24 July 2015</a:t>
             </a:fld>
             <a:endParaRPr lang="en-US" dirty="0"/>
           </a:p>
@@ -3972,7 +4001,7 @@
               <a:pPr>
                 <a:defRPr/>
               </a:pPr>
-              <a:t>16 July 2015</a:t>
+              <a:t>24 July 2015</a:t>
             </a:fld>
             <a:endParaRPr lang="en-US" dirty="0"/>
           </a:p>
@@ -4241,7 +4270,7 @@
               <a:pPr>
                 <a:defRPr/>
               </a:pPr>
-              <a:t>16 July 2015</a:t>
+              <a:t>24 July 2015</a:t>
             </a:fld>
             <a:endParaRPr lang="en-US" dirty="0"/>
           </a:p>
@@ -4445,7 +4474,7 @@
               <a:pPr>
                 <a:defRPr/>
               </a:pPr>
-              <a:t>16 July 2015</a:t>
+              <a:t>24 July 2015</a:t>
             </a:fld>
             <a:endParaRPr lang="en-US" dirty="0"/>
           </a:p>
@@ -5422,7 +5451,7 @@
               <a:pPr>
                 <a:defRPr/>
               </a:pPr>
-              <a:t>16 July 2015</a:t>
+              <a:t>24 July 2015</a:t>
             </a:fld>
             <a:endParaRPr lang="en-US" dirty="0"/>
           </a:p>
@@ -5579,6 +5608,13 @@
   <p:clrMapOvr>
     <a:masterClrMapping/>
   </p:clrMapOvr>
+  <p:timing>
+    <p:tnLst>
+      <p:par>
+        <p:cTn id="1" dur="indefinite" restart="never" nodeType="tmRoot"/>
+      </p:par>
+    </p:tnLst>
+  </p:timing>
 </p:sld>
 </file>
 
@@ -5599,37 +5635,352 @@
           <a:chExt cx="0" cy="0"/>
         </a:xfrm>
       </p:grpSpPr>
-      <p:sp>
-        <p:nvSpPr>
-          <p:cNvPr id="2" name="Title 1"/>
+      <p:graphicFrame>
+        <p:nvGraphicFramePr>
+          <p:cNvPr id="13" name="Content Placeholder 12"/>
+          <p:cNvGraphicFramePr>
+            <a:graphicFrameLocks noGrp="1"/>
+          </p:cNvGraphicFramePr>
+          <p:nvPr>
+            <p:ph sz="half" idx="1"/>
+            <p:extLst>
+              <p:ext uri="{D42A27DB-BD31-4B8C-83A1-F6EECF244321}">
+                <p14:modId xmlns:p14="http://schemas.microsoft.com/office/powerpoint/2010/main" val="1365375473"/>
+              </p:ext>
+            </p:extLst>
+          </p:nvPr>
+        </p:nvGraphicFramePr>
+        <p:xfrm>
+          <a:off x="462665" y="2008016"/>
+          <a:ext cx="8218670" cy="4070930"/>
+        </p:xfrm>
+        <a:graphic>
+          <a:graphicData uri="http://schemas.openxmlformats.org/drawingml/2006/table">
+            <a:tbl>
+              <a:tblPr firstRow="1" bandRow="1">
+                <a:tableStyleId>{5C22544A-7EE6-4342-B048-85BDC9FD1C3A}</a:tableStyleId>
+              </a:tblPr>
+              <a:tblGrid>
+                <a:gridCol w="4109335"/>
+                <a:gridCol w="4109335"/>
+              </a:tblGrid>
+              <a:tr h="381119">
+                <a:tc>
+                  <a:txBody>
+                    <a:bodyPr/>
+                    <a:lstStyle/>
+                    <a:p>
+                      <a:r>
+                        <a:rPr lang="en-GB" dirty="0" smtClean="0"/>
+                        <a:t>Eviction</a:t>
+                      </a:r>
+                      <a:endParaRPr lang="en-GB" dirty="0"/>
+                    </a:p>
+                  </a:txBody>
+                  <a:tcPr marL="44870" marR="44870"/>
+                </a:tc>
+                <a:tc>
+                  <a:txBody>
+                    <a:bodyPr/>
+                    <a:lstStyle/>
+                    <a:p>
+                      <a:r>
+                        <a:rPr lang="en-GB" dirty="0" smtClean="0"/>
+                        <a:t>Expiration</a:t>
+                      </a:r>
+                      <a:endParaRPr lang="en-GB" dirty="0"/>
+                    </a:p>
+                  </a:txBody>
+                  <a:tcPr marL="44870" marR="44870"/>
+                </a:tc>
+              </a:tr>
+              <a:tr h="1238637">
+                <a:tc>
+                  <a:txBody>
+                    <a:bodyPr/>
+                    <a:lstStyle/>
+                    <a:p>
+                      <a:pPr marL="0" marR="0" indent="0" algn="l" defTabSz="914400" rtl="0" eaLnBrk="1" fontAlgn="auto" latinLnBrk="0" hangingPunct="1">
+                        <a:lnSpc>
+                          <a:spcPct val="100000"/>
+                        </a:lnSpc>
+                        <a:spcBef>
+                          <a:spcPts val="0"/>
+                        </a:spcBef>
+                        <a:spcAft>
+                          <a:spcPts val="0"/>
+                        </a:spcAft>
+                        <a:buClrTx/>
+                        <a:buSzTx/>
+                        <a:buFontTx/>
+                        <a:buNone/>
+                        <a:tabLst/>
+                        <a:defRPr/>
+                      </a:pPr>
+                      <a:r>
+                        <a:rPr lang="en-GB" dirty="0" smtClean="0"/>
+                        <a:t>Remove entries from cache when cache is exceeded from max no of entries.</a:t>
+                      </a:r>
+                    </a:p>
+                  </a:txBody>
+                  <a:tcPr marL="44870" marR="44870"/>
+                </a:tc>
+                <a:tc>
+                  <a:txBody>
+                    <a:bodyPr/>
+                    <a:lstStyle/>
+                    <a:p>
+                      <a:pPr marL="0" marR="0" indent="0" algn="l" defTabSz="914400" rtl="0" eaLnBrk="1" fontAlgn="auto" latinLnBrk="0" hangingPunct="1">
+                        <a:lnSpc>
+                          <a:spcPct val="100000"/>
+                        </a:lnSpc>
+                        <a:spcBef>
+                          <a:spcPts val="0"/>
+                        </a:spcBef>
+                        <a:spcAft>
+                          <a:spcPts val="0"/>
+                        </a:spcAft>
+                        <a:buClrTx/>
+                        <a:buSzTx/>
+                        <a:buFontTx/>
+                        <a:buNone/>
+                        <a:tabLst/>
+                        <a:defRPr/>
+                      </a:pPr>
+                      <a:r>
+                        <a:rPr lang="en-GB" dirty="0" smtClean="0"/>
+                        <a:t>Remove entries from cache but after specified period of time.</a:t>
+                      </a:r>
+                    </a:p>
+                  </a:txBody>
+                  <a:tcPr marL="44870" marR="44870"/>
+                </a:tc>
+              </a:tr>
+              <a:tr h="1212537">
+                <a:tc>
+                  <a:txBody>
+                    <a:bodyPr/>
+                    <a:lstStyle/>
+                    <a:p>
+                      <a:pPr marL="0" marR="0" indent="0" algn="l" defTabSz="914400" rtl="0" eaLnBrk="1" fontAlgn="auto" latinLnBrk="0" hangingPunct="1">
+                        <a:lnSpc>
+                          <a:spcPct val="100000"/>
+                        </a:lnSpc>
+                        <a:spcBef>
+                          <a:spcPts val="0"/>
+                        </a:spcBef>
+                        <a:spcAft>
+                          <a:spcPts val="0"/>
+                        </a:spcAft>
+                        <a:buClrTx/>
+                        <a:buSzTx/>
+                        <a:buFontTx/>
+                        <a:buNone/>
+                        <a:tabLst/>
+                        <a:defRPr/>
+                      </a:pPr>
+                      <a:r>
+                        <a:rPr lang="en-GB" dirty="0" smtClean="0"/>
+                        <a:t>Uses eviction policy (LRU, LIRS) and </a:t>
+                      </a:r>
+                      <a:r>
+                        <a:rPr lang="en-GB" sz="1800" b="0" i="0" kern="1200" dirty="0" err="1" smtClean="0">
+                          <a:solidFill>
+                            <a:schemeClr val="dk1"/>
+                          </a:solidFill>
+                          <a:effectLst/>
+                          <a:latin typeface="+mn-lt"/>
+                          <a:ea typeface="+mn-ea"/>
+                          <a:cs typeface="+mn-cs"/>
+                        </a:rPr>
+                        <a:t>maxEntries</a:t>
+                      </a:r>
+                      <a:r>
+                        <a:rPr lang="en-GB" sz="1800" b="0" i="0" kern="1200" dirty="0" smtClean="0">
+                          <a:solidFill>
+                            <a:schemeClr val="dk1"/>
+                          </a:solidFill>
+                          <a:effectLst/>
+                          <a:latin typeface="+mn-lt"/>
+                          <a:ea typeface="+mn-ea"/>
+                          <a:cs typeface="+mn-cs"/>
+                        </a:rPr>
+                        <a:t> </a:t>
+                      </a:r>
+                      <a:r>
+                        <a:rPr lang="en-GB" dirty="0" smtClean="0"/>
+                        <a:t>to evict entries.</a:t>
+                      </a:r>
+                    </a:p>
+                  </a:txBody>
+                  <a:tcPr marL="44870" marR="44870"/>
+                </a:tc>
+                <a:tc>
+                  <a:txBody>
+                    <a:bodyPr/>
+                    <a:lstStyle/>
+                    <a:p>
+                      <a:pPr marL="0" marR="0" indent="0" algn="l" defTabSz="914400" rtl="0" eaLnBrk="1" fontAlgn="auto" latinLnBrk="0" hangingPunct="1">
+                        <a:lnSpc>
+                          <a:spcPct val="100000"/>
+                        </a:lnSpc>
+                        <a:spcBef>
+                          <a:spcPts val="0"/>
+                        </a:spcBef>
+                        <a:spcAft>
+                          <a:spcPts val="0"/>
+                        </a:spcAft>
+                        <a:buClrTx/>
+                        <a:buSzTx/>
+                        <a:buFontTx/>
+                        <a:buNone/>
+                        <a:tabLst/>
+                        <a:defRPr/>
+                      </a:pPr>
+                      <a:r>
+                        <a:rPr lang="en-GB" dirty="0" smtClean="0"/>
+                        <a:t>Uses lifespan and </a:t>
+                      </a:r>
+                      <a:r>
+                        <a:rPr lang="en-GB" dirty="0" err="1" smtClean="0"/>
+                        <a:t>maxIdle</a:t>
+                      </a:r>
+                      <a:r>
+                        <a:rPr lang="en-GB" dirty="0" smtClean="0"/>
+                        <a:t> </a:t>
+                      </a:r>
+                      <a:r>
+                        <a:rPr lang="en-GB" dirty="0" err="1" smtClean="0"/>
+                        <a:t>attribues</a:t>
+                      </a:r>
+                      <a:r>
+                        <a:rPr lang="en-GB" baseline="0" dirty="0" smtClean="0"/>
+                        <a:t> to expire entries</a:t>
+                      </a:r>
+                      <a:r>
+                        <a:rPr lang="en-GB" dirty="0" smtClean="0"/>
+                        <a:t>.</a:t>
+                      </a:r>
+                    </a:p>
+                  </a:txBody>
+                  <a:tcPr marL="44870" marR="44870"/>
+                </a:tc>
+              </a:tr>
+              <a:tr h="1238637">
+                <a:tc>
+                  <a:txBody>
+                    <a:bodyPr/>
+                    <a:lstStyle/>
+                    <a:p>
+                      <a:pPr marL="0" marR="0" indent="0" algn="l" defTabSz="914400" rtl="0" eaLnBrk="1" fontAlgn="auto" latinLnBrk="0" hangingPunct="1">
+                        <a:lnSpc>
+                          <a:spcPct val="100000"/>
+                        </a:lnSpc>
+                        <a:spcBef>
+                          <a:spcPts val="0"/>
+                        </a:spcBef>
+                        <a:spcAft>
+                          <a:spcPts val="0"/>
+                        </a:spcAft>
+                        <a:buClrTx/>
+                        <a:buSzTx/>
+                        <a:buFontTx/>
+                        <a:buNone/>
+                        <a:tabLst/>
+                        <a:defRPr/>
+                      </a:pPr>
+                      <a:r>
+                        <a:rPr lang="en-GB" dirty="0" smtClean="0"/>
+                        <a:t>Can be used with passivation to store the evicted entries to the persistent store.</a:t>
+                      </a:r>
+                    </a:p>
+                  </a:txBody>
+                  <a:tcPr marL="44870" marR="44870"/>
+                </a:tc>
+                <a:tc>
+                  <a:txBody>
+                    <a:bodyPr/>
+                    <a:lstStyle/>
+                    <a:p>
+                      <a:pPr marL="0" marR="0" indent="0" algn="l" defTabSz="914400" rtl="0" eaLnBrk="1" fontAlgn="auto" latinLnBrk="0" hangingPunct="1">
+                        <a:lnSpc>
+                          <a:spcPct val="100000"/>
+                        </a:lnSpc>
+                        <a:spcBef>
+                          <a:spcPts val="0"/>
+                        </a:spcBef>
+                        <a:spcAft>
+                          <a:spcPts val="0"/>
+                        </a:spcAft>
+                        <a:buClrTx/>
+                        <a:buSzTx/>
+                        <a:buFontTx/>
+                        <a:buNone/>
+                        <a:tabLst/>
+                        <a:defRPr/>
+                      </a:pPr>
+                      <a:r>
+                        <a:rPr lang="en-GB" dirty="0" smtClean="0"/>
+                        <a:t>Expired entries cannot be stored to the persistent store.</a:t>
+                      </a:r>
+                    </a:p>
+                  </a:txBody>
+                  <a:tcPr marL="44870" marR="44870"/>
+                </a:tc>
+              </a:tr>
+            </a:tbl>
+          </a:graphicData>
+        </a:graphic>
+      </p:graphicFrame>
+      <p:sp>
+        <p:nvSpPr>
+          <p:cNvPr id="15" name="Content Placeholder 14"/>
           <p:cNvSpPr>
             <a:spLocks noGrp="1"/>
           </p:cNvSpPr>
           <p:nvPr>
-            <p:ph type="title"/>
-          </p:nvPr>
-        </p:nvSpPr>
-        <p:spPr/>
+            <p:ph sz="half" idx="2"/>
+          </p:nvPr>
+        </p:nvSpPr>
+        <p:spPr>
+          <a:xfrm>
+            <a:off x="424260" y="1239839"/>
+            <a:ext cx="8289528" cy="960201"/>
+          </a:xfrm>
+        </p:spPr>
         <p:txBody>
           <a:bodyPr/>
           <a:lstStyle/>
           <a:p>
-            <a:r>
-              <a:rPr lang="en-GB" dirty="0" smtClean="0"/>
-              <a:t>Features</a:t>
-            </a:r>
+            <a:pPr marL="0" indent="0">
+              <a:buNone/>
+            </a:pPr>
+            <a:r>
+              <a:rPr lang="en-GB" sz="1800" dirty="0"/>
+              <a:t>Used to avoid </a:t>
+            </a:r>
+            <a:r>
+              <a:rPr lang="en-GB" sz="1800" dirty="0" err="1"/>
+              <a:t>OutOfMemory</a:t>
+            </a:r>
+            <a:r>
+              <a:rPr lang="en-GB" sz="1800" dirty="0"/>
+              <a:t> exceptions, to keep really necessary entries in cache.</a:t>
+            </a:r>
+          </a:p>
+          <a:p>
             <a:endParaRPr lang="en-GB" dirty="0"/>
           </a:p>
         </p:txBody>
       </p:sp>
       <p:sp>
         <p:nvSpPr>
-          <p:cNvPr id="3" name="Content Placeholder 2"/>
+          <p:cNvPr id="10" name="Title 9"/>
           <p:cNvSpPr>
             <a:spLocks noGrp="1"/>
           </p:cNvSpPr>
           <p:nvPr>
-            <p:ph idx="1"/>
+            <p:ph type="title"/>
           </p:nvPr>
         </p:nvSpPr>
         <p:spPr/>
@@ -5639,47 +5990,14 @@
           <a:p>
             <a:r>
               <a:rPr lang="en-GB" dirty="0"/>
-              <a:t>In-memory local and clustered cache</a:t>
-            </a:r>
-          </a:p>
-          <a:p>
-            <a:r>
-              <a:rPr lang="en-GB" dirty="0"/>
-              <a:t>Clustering</a:t>
-            </a:r>
-          </a:p>
-          <a:p>
-            <a:r>
-              <a:rPr lang="en-GB" dirty="0"/>
-              <a:t>Transactions</a:t>
-            </a:r>
-          </a:p>
-          <a:p>
-            <a:r>
-              <a:rPr lang="en-GB" dirty="0"/>
-              <a:t>Persistence</a:t>
-            </a:r>
-          </a:p>
-          <a:p>
-            <a:r>
-              <a:rPr lang="en-GB" dirty="0"/>
-              <a:t>Configuration / Development</a:t>
-            </a:r>
-          </a:p>
-          <a:p>
-            <a:r>
-              <a:rPr lang="en-GB" dirty="0"/>
-              <a:t>Integrations</a:t>
-            </a:r>
-          </a:p>
-          <a:p>
-            <a:endParaRPr lang="en-GB" dirty="0"/>
-          </a:p>
-        </p:txBody>
-      </p:sp>
-      <p:sp>
-        <p:nvSpPr>
-          <p:cNvPr id="4" name="Text Placeholder 3"/>
+              <a:t>Eviction/Expiration</a:t>
+            </a:r>
+          </a:p>
+        </p:txBody>
+      </p:sp>
+      <p:sp>
+        <p:nvSpPr>
+          <p:cNvPr id="16" name="Text Placeholder 15"/>
           <p:cNvSpPr>
             <a:spLocks noGrp="1"/>
           </p:cNvSpPr>
@@ -5698,12 +6016,12 @@
       </p:sp>
       <p:sp>
         <p:nvSpPr>
-          <p:cNvPr id="5" name="Date Placeholder 4"/>
+          <p:cNvPr id="8" name="Date Placeholder 7"/>
           <p:cNvSpPr>
             <a:spLocks noGrp="1"/>
           </p:cNvSpPr>
           <p:nvPr>
-            <p:ph type="dt" sz="half" idx="14"/>
+            <p:ph type="dt" sz="half" idx="10"/>
           </p:nvPr>
         </p:nvSpPr>
         <p:spPr/>
@@ -5714,12 +6032,12 @@
             <a:pPr>
               <a:defRPr/>
             </a:pPr>
-            <a:fld id="{D95CFEC9-DCDE-483F-9C62-EBF9D31C73AA}" type="datetime3">
+            <a:fld id="{61D66853-4EE4-4A1F-A0BA-21107A99656D}" type="datetime3">
               <a:rPr lang="en-US" smtClean="0"/>
               <a:pPr>
                 <a:defRPr/>
               </a:pPr>
-              <a:t>16 July 2015</a:t>
+              <a:t>24 July 2015</a:t>
             </a:fld>
             <a:endParaRPr lang="en-US" dirty="0"/>
           </a:p>
@@ -5727,12 +6045,12 @@
       </p:sp>
       <p:sp>
         <p:nvSpPr>
-          <p:cNvPr id="6" name="Slide Number Placeholder 5"/>
+          <p:cNvPr id="9" name="Slide Number Placeholder 8"/>
           <p:cNvSpPr>
             <a:spLocks noGrp="1"/>
           </p:cNvSpPr>
           <p:nvPr>
-            <p:ph type="sldNum" sz="quarter" idx="15"/>
+            <p:ph type="sldNum" sz="quarter" idx="12"/>
           </p:nvPr>
         </p:nvSpPr>
         <p:spPr/>
@@ -5743,21 +6061,21 @@
             <a:pPr>
               <a:defRPr/>
             </a:pPr>
-            <a:fld id="{90600ADF-17AC-4085-9C50-2A0435A05455}" type="slidenum">
+            <a:fld id="{62FEDF8E-5B0F-4A65-9F05-A41FA81134FA}" type="slidenum">
               <a:rPr lang="en-US" smtClean="0"/>
               <a:pPr>
                 <a:defRPr/>
               </a:pPr>
               <a:t>10</a:t>
             </a:fld>
-            <a:endParaRPr lang="en-US" dirty="0"/>
+            <a:endParaRPr lang="en-US"/>
           </a:p>
         </p:txBody>
       </p:sp>
     </p:spTree>
     <p:extLst>
       <p:ext uri="{BB962C8B-B14F-4D97-AF65-F5344CB8AC3E}">
-        <p14:creationId xmlns:p14="http://schemas.microsoft.com/office/powerpoint/2010/main" val="1007208415"/>
+        <p14:creationId xmlns:p14="http://schemas.microsoft.com/office/powerpoint/2010/main" val="2815848963"/>
       </p:ext>
     </p:extLst>
   </p:cSld>
@@ -5807,93 +6125,64 @@
           <a:lstStyle/>
           <a:p>
             <a:r>
+              <a:rPr lang="en-GB" dirty="0" smtClean="0"/>
+              <a:t>Features</a:t>
+            </a:r>
+            <a:endParaRPr lang="en-GB" dirty="0"/>
+          </a:p>
+        </p:txBody>
+      </p:sp>
+      <p:sp>
+        <p:nvSpPr>
+          <p:cNvPr id="3" name="Content Placeholder 2"/>
+          <p:cNvSpPr>
+            <a:spLocks noGrp="1"/>
+          </p:cNvSpPr>
+          <p:nvPr>
+            <p:ph idx="1"/>
+          </p:nvPr>
+        </p:nvSpPr>
+        <p:spPr/>
+        <p:txBody>
+          <a:bodyPr/>
+          <a:lstStyle/>
+          <a:p>
+            <a:r>
+              <a:rPr lang="en-GB" dirty="0"/>
+              <a:t>In-memory local and clustered cache</a:t>
+            </a:r>
+          </a:p>
+          <a:p>
+            <a:r>
+              <a:rPr lang="en-GB" dirty="0"/>
+              <a:t>Clustering</a:t>
+            </a:r>
+          </a:p>
+          <a:p>
+            <a:r>
+              <a:rPr lang="en-GB" dirty="0"/>
+              <a:t>Transactions</a:t>
+            </a:r>
+          </a:p>
+          <a:p>
+            <a:r>
               <a:rPr lang="en-GB" dirty="0"/>
               <a:t>Persistence</a:t>
             </a:r>
           </a:p>
-        </p:txBody>
-      </p:sp>
-      <p:sp>
-        <p:nvSpPr>
-          <p:cNvPr id="3" name="Content Placeholder 2"/>
-          <p:cNvSpPr>
-            <a:spLocks noGrp="1"/>
-          </p:cNvSpPr>
-          <p:nvPr>
-            <p:ph idx="1"/>
-          </p:nvPr>
-        </p:nvSpPr>
-        <p:spPr/>
-        <p:txBody>
-          <a:bodyPr/>
-          <a:lstStyle/>
           <a:p>
             <a:r>
               <a:rPr lang="en-GB" dirty="0"/>
-              <a:t>U</a:t>
-            </a:r>
-            <a:r>
-              <a:rPr lang="en-GB" smtClean="0"/>
-              <a:t>se </a:t>
-            </a:r>
+              <a:t>Configuration / Development</a:t>
+            </a:r>
+          </a:p>
+          <a:p>
             <a:r>
               <a:rPr lang="en-GB" dirty="0"/>
-              <a:t>a </a:t>
-            </a:r>
-            <a:r>
-              <a:rPr lang="en-GB" dirty="0" err="1"/>
-              <a:t>CacheLoader</a:t>
-            </a:r>
-            <a:r>
-              <a:rPr lang="en-GB" dirty="0"/>
-              <a:t> interface to save the in-memory cache data to a persistent cache </a:t>
-            </a:r>
-            <a:r>
-              <a:rPr lang="en-GB" dirty="0" smtClean="0"/>
-              <a:t>store</a:t>
-            </a:r>
-          </a:p>
-          <a:p>
-            <a:r>
-              <a:rPr lang="en-GB" dirty="0"/>
-              <a:t>An external persistent storage might be useful </a:t>
-            </a:r>
-            <a:r>
-              <a:rPr lang="en-GB" dirty="0" smtClean="0"/>
-              <a:t>for:</a:t>
-            </a:r>
-          </a:p>
-          <a:p>
-            <a:pPr lvl="1"/>
-            <a:r>
-              <a:rPr lang="en-GB" dirty="0"/>
-              <a:t>Increased </a:t>
-            </a:r>
-            <a:r>
-              <a:rPr lang="en-GB" dirty="0" smtClean="0"/>
-              <a:t>Durability</a:t>
-            </a:r>
-          </a:p>
-          <a:p>
-            <a:pPr lvl="1"/>
-            <a:r>
-              <a:rPr lang="en-GB" dirty="0" smtClean="0"/>
-              <a:t>Write-through</a:t>
-            </a:r>
-          </a:p>
-          <a:p>
-            <a:pPr lvl="1"/>
-            <a:r>
-              <a:rPr lang="en-GB" dirty="0"/>
-              <a:t>Overflow </a:t>
-            </a:r>
-            <a:r>
-              <a:rPr lang="en-GB" dirty="0" smtClean="0"/>
-              <a:t>Data</a:t>
-            </a:r>
-          </a:p>
-          <a:p>
-            <a:pPr lvl="1"/>
+              <a:t>Integrations</a:t>
+            </a:r>
+          </a:p>
+          <a:p>
             <a:endParaRPr lang="en-GB" dirty="0"/>
           </a:p>
         </p:txBody>
@@ -5940,7 +6229,7 @@
               <a:pPr>
                 <a:defRPr/>
               </a:pPr>
-              <a:t>16 July 2015</a:t>
+              <a:t>24 July 2015</a:t>
             </a:fld>
             <a:endParaRPr lang="en-US" dirty="0"/>
           </a:p>
@@ -5975,64 +6264,10 @@
           </a:p>
         </p:txBody>
       </p:sp>
-      <p:pic>
-        <p:nvPicPr>
-          <p:cNvPr id="3074" name="Picture 2"/>
-          <p:cNvPicPr>
-            <a:picLocks noChangeAspect="1" noChangeArrowheads="1"/>
-          </p:cNvPicPr>
-          <p:nvPr/>
-        </p:nvPicPr>
-        <p:blipFill>
-          <a:blip r:embed="rId2">
-            <a:extLst>
-              <a:ext uri="{28A0092B-C50C-407E-A947-70E740481C1C}">
-                <a14:useLocalDpi xmlns:a14="http://schemas.microsoft.com/office/drawing/2010/main" val="0"/>
-              </a:ext>
-            </a:extLst>
-          </a:blip>
-          <a:srcRect/>
-          <a:stretch>
-            <a:fillRect/>
-          </a:stretch>
-        </p:blipFill>
-        <p:spPr bwMode="auto">
-          <a:xfrm>
-            <a:off x="5822340" y="2545685"/>
-            <a:ext cx="2476500" cy="3733800"/>
-          </a:xfrm>
-          <a:prstGeom prst="rect">
-            <a:avLst/>
-          </a:prstGeom>
-          <a:noFill/>
-          <a:ln>
-            <a:noFill/>
-          </a:ln>
-          <a:extLst>
-            <a:ext uri="{909E8E84-426E-40DD-AFC4-6F175D3DCCD1}">
-              <a14:hiddenFill xmlns:a14="http://schemas.microsoft.com/office/drawing/2010/main">
-                <a:solidFill>
-                  <a:schemeClr val="accent1"/>
-                </a:solidFill>
-              </a14:hiddenFill>
-            </a:ext>
-            <a:ext uri="{91240B29-F687-4F45-9708-019B960494DF}">
-              <a14:hiddenLine xmlns:a14="http://schemas.microsoft.com/office/drawing/2010/main" w="9525">
-                <a:solidFill>
-                  <a:schemeClr val="tx1"/>
-                </a:solidFill>
-                <a:miter lim="800000"/>
-                <a:headEnd/>
-                <a:tailEnd/>
-              </a14:hiddenLine>
-            </a:ext>
-          </a:extLst>
-        </p:spPr>
-      </p:pic>
     </p:spTree>
     <p:extLst>
       <p:ext uri="{BB962C8B-B14F-4D97-AF65-F5344CB8AC3E}">
-        <p14:creationId xmlns:p14="http://schemas.microsoft.com/office/powerpoint/2010/main" val="479859234"/>
+        <p14:creationId xmlns:p14="http://schemas.microsoft.com/office/powerpoint/2010/main" val="1007208415"/>
       </p:ext>
     </p:extLst>
   </p:cSld>
@@ -6068,12 +6303,12 @@
       </p:grpSpPr>
       <p:sp>
         <p:nvSpPr>
-          <p:cNvPr id="2" name="Title 1"/>
+          <p:cNvPr id="3" name="Content Placeholder 2"/>
           <p:cNvSpPr>
             <a:spLocks noGrp="1"/>
           </p:cNvSpPr>
           <p:nvPr>
-            <p:ph type="title"/>
+            <p:ph sz="half" idx="1"/>
           </p:nvPr>
         </p:nvSpPr>
         <p:spPr/>
@@ -6082,20 +6317,236 @@
           <a:lstStyle/>
           <a:p>
             <a:r>
-              <a:rPr lang="en-GB" dirty="0"/>
-              <a:t>Clustering</a:t>
-            </a:r>
-          </a:p>
-        </p:txBody>
-      </p:sp>
-      <p:sp>
-        <p:nvSpPr>
-          <p:cNvPr id="3" name="Content Placeholder 2"/>
+              <a:rPr lang="en-GB" sz="1800" dirty="0" smtClean="0"/>
+              <a:t>Allows </a:t>
+            </a:r>
+            <a:r>
+              <a:rPr lang="en-GB" sz="1800" dirty="0"/>
+              <a:t>configuring persistent </a:t>
+            </a:r>
+            <a:r>
+              <a:rPr lang="en-GB" sz="1800" dirty="0" smtClean="0"/>
+              <a:t>storage</a:t>
+            </a:r>
+          </a:p>
+          <a:p>
+            <a:r>
+              <a:rPr lang="en-GB" sz="1800" dirty="0"/>
+              <a:t>E</a:t>
+            </a:r>
+            <a:r>
+              <a:rPr lang="en-GB" sz="1800" dirty="0" smtClean="0"/>
+              <a:t>xternal </a:t>
+            </a:r>
+            <a:r>
+              <a:rPr lang="en-GB" sz="1800" dirty="0"/>
+              <a:t>persistent storage </a:t>
+            </a:r>
+            <a:r>
+              <a:rPr lang="en-GB" sz="1800" dirty="0" smtClean="0"/>
+              <a:t>is </a:t>
+            </a:r>
+            <a:r>
+              <a:rPr lang="en-GB" sz="1800" dirty="0"/>
+              <a:t>useful </a:t>
+            </a:r>
+            <a:r>
+              <a:rPr lang="en-GB" sz="1800" dirty="0" smtClean="0"/>
+              <a:t>for:</a:t>
+            </a:r>
+          </a:p>
+          <a:p>
+            <a:pPr lvl="1"/>
+            <a:r>
+              <a:rPr lang="en-GB" sz="1600" dirty="0"/>
+              <a:t>Increased </a:t>
+            </a:r>
+            <a:r>
+              <a:rPr lang="en-GB" sz="1600" dirty="0" smtClean="0"/>
+              <a:t>Durability</a:t>
+            </a:r>
+          </a:p>
+          <a:p>
+            <a:pPr lvl="1"/>
+            <a:r>
+              <a:rPr lang="en-GB" sz="1600" dirty="0" smtClean="0"/>
+              <a:t>Write-through</a:t>
+            </a:r>
+          </a:p>
+          <a:p>
+            <a:pPr lvl="1"/>
+            <a:r>
+              <a:rPr lang="en-GB" sz="1600" dirty="0"/>
+              <a:t>Overflow </a:t>
+            </a:r>
+            <a:r>
+              <a:rPr lang="en-GB" sz="1600" dirty="0" smtClean="0"/>
+              <a:t>Data</a:t>
+            </a:r>
+          </a:p>
+          <a:p>
+            <a:pPr marL="195263" lvl="1" indent="-195263">
+              <a:buClr>
+                <a:srgbClr val="009FDA"/>
+              </a:buClr>
+              <a:buSzPct val="130000"/>
+              <a:buFont typeface="Arial" charset="0"/>
+              <a:buChar char="•"/>
+            </a:pPr>
+            <a:r>
+              <a:rPr lang="en-GB" sz="1800" dirty="0" smtClean="0">
+                <a:ea typeface="+mn-ea"/>
+                <a:cs typeface="+mn-cs"/>
+              </a:rPr>
+              <a:t>Uses </a:t>
+            </a:r>
+            <a:r>
+              <a:rPr lang="en-GB" sz="1800" dirty="0" err="1" smtClean="0">
+                <a:ea typeface="+mn-ea"/>
+                <a:cs typeface="+mn-cs"/>
+              </a:rPr>
+              <a:t>CacheLoader</a:t>
+            </a:r>
+            <a:r>
+              <a:rPr lang="en-GB" sz="1800" dirty="0" smtClean="0">
+                <a:ea typeface="+mn-ea"/>
+                <a:cs typeface="+mn-cs"/>
+              </a:rPr>
+              <a:t> and </a:t>
+            </a:r>
+            <a:r>
+              <a:rPr lang="en-GB" sz="1800" dirty="0" err="1" smtClean="0">
+                <a:ea typeface="+mn-ea"/>
+                <a:cs typeface="+mn-cs"/>
+              </a:rPr>
+              <a:t>CacheWriter</a:t>
+            </a:r>
+            <a:r>
+              <a:rPr lang="en-GB" sz="1800" dirty="0" smtClean="0">
+                <a:ea typeface="+mn-ea"/>
+                <a:cs typeface="+mn-cs"/>
+              </a:rPr>
+              <a:t> </a:t>
+            </a:r>
+            <a:r>
+              <a:rPr lang="en-GB" sz="1800" dirty="0">
+                <a:ea typeface="+mn-ea"/>
+                <a:cs typeface="+mn-cs"/>
+              </a:rPr>
+              <a:t>to save </a:t>
+            </a:r>
+            <a:r>
+              <a:rPr lang="en-GB" sz="1800" dirty="0" smtClean="0">
+                <a:ea typeface="+mn-ea"/>
+                <a:cs typeface="+mn-cs"/>
+              </a:rPr>
+              <a:t>and load data to and from </a:t>
+            </a:r>
+            <a:r>
+              <a:rPr lang="en-GB" sz="1800" dirty="0" smtClean="0"/>
+              <a:t>persistent </a:t>
+            </a:r>
+            <a:r>
+              <a:rPr lang="en-GB" sz="1800" dirty="0"/>
+              <a:t>cache store </a:t>
+            </a:r>
+            <a:r>
+              <a:rPr lang="en-GB" sz="1800" dirty="0" smtClean="0"/>
+              <a:t>in cache</a:t>
+            </a:r>
+          </a:p>
+          <a:p>
+            <a:pPr marL="195263" lvl="1" indent="-195263">
+              <a:buClr>
+                <a:srgbClr val="009FDA"/>
+              </a:buClr>
+              <a:buSzPct val="130000"/>
+              <a:buFont typeface="Arial" charset="0"/>
+              <a:buChar char="•"/>
+            </a:pPr>
+            <a:r>
+              <a:rPr lang="en-GB" sz="1800" dirty="0" smtClean="0"/>
+              <a:t>Available cache loaders/stores:</a:t>
+            </a:r>
+            <a:endParaRPr lang="en-GB" sz="1000" dirty="0" smtClean="0"/>
+          </a:p>
+          <a:p>
+            <a:pPr lvl="1"/>
+            <a:r>
+              <a:rPr lang="en-GB" sz="1600" dirty="0" err="1"/>
+              <a:t>Filesystem</a:t>
+            </a:r>
+            <a:r>
+              <a:rPr lang="en-GB" sz="1600" dirty="0"/>
+              <a:t>-based Cache Loaders</a:t>
+            </a:r>
+          </a:p>
+          <a:p>
+            <a:pPr lvl="2"/>
+            <a:r>
+              <a:rPr lang="en-GB" sz="1400" dirty="0" err="1" smtClean="0"/>
+              <a:t>SingleFileStore</a:t>
+            </a:r>
+            <a:endParaRPr lang="en-GB" sz="1400" dirty="0"/>
+          </a:p>
+          <a:p>
+            <a:pPr lvl="1"/>
+            <a:r>
+              <a:rPr lang="en-GB" sz="1600" dirty="0"/>
+              <a:t>JDBC-based Cache Loaders</a:t>
+            </a:r>
+          </a:p>
+          <a:p>
+            <a:pPr lvl="2"/>
+            <a:r>
+              <a:rPr lang="en-GB" sz="1400" dirty="0" err="1" smtClean="0"/>
+              <a:t>JdbcBinaryCacheStore</a:t>
+            </a:r>
+            <a:endParaRPr lang="en-GB" sz="1400" dirty="0" smtClean="0"/>
+          </a:p>
+          <a:p>
+            <a:pPr lvl="2"/>
+            <a:r>
+              <a:rPr lang="en-GB" sz="1400" dirty="0" err="1" smtClean="0"/>
+              <a:t>JdbcStringBasedCacheStore</a:t>
+            </a:r>
+            <a:endParaRPr lang="en-GB" sz="1400" dirty="0" smtClean="0"/>
+          </a:p>
+          <a:p>
+            <a:pPr lvl="2"/>
+            <a:r>
+              <a:rPr lang="en-GB" sz="1400" dirty="0" err="1" smtClean="0"/>
+              <a:t>JdbcMixedCacheStore</a:t>
+            </a:r>
+            <a:endParaRPr lang="en-GB" sz="1400" dirty="0"/>
+          </a:p>
+          <a:p>
+            <a:pPr lvl="1"/>
+            <a:r>
+              <a:rPr lang="en-GB" sz="1600" dirty="0"/>
+              <a:t>Others</a:t>
+            </a:r>
+          </a:p>
+          <a:p>
+            <a:pPr marL="1046163" lvl="2" indent="0">
+              <a:buNone/>
+            </a:pPr>
+            <a:endParaRPr lang="en-GB" sz="1400" dirty="0"/>
+          </a:p>
+          <a:p>
+            <a:pPr lvl="1"/>
+            <a:endParaRPr lang="en-GB" dirty="0"/>
+          </a:p>
+        </p:txBody>
+      </p:sp>
+      <p:sp>
+        <p:nvSpPr>
+          <p:cNvPr id="2" name="Title 1"/>
           <p:cNvSpPr>
             <a:spLocks noGrp="1"/>
           </p:cNvSpPr>
           <p:nvPr>
-            <p:ph idx="1"/>
+            <p:ph type="title"/>
           </p:nvPr>
         </p:nvSpPr>
         <p:spPr/>
@@ -6103,13 +6554,16 @@
           <a:bodyPr/>
           <a:lstStyle/>
           <a:p>
-            <a:endParaRPr lang="en-GB" dirty="0"/>
-          </a:p>
-        </p:txBody>
-      </p:sp>
-      <p:sp>
-        <p:nvSpPr>
-          <p:cNvPr id="4" name="Text Placeholder 3"/>
+            <a:r>
+              <a:rPr lang="en-GB" dirty="0"/>
+              <a:t>Persistence</a:t>
+            </a:r>
+          </a:p>
+        </p:txBody>
+      </p:sp>
+      <p:sp>
+        <p:nvSpPr>
+          <p:cNvPr id="8" name="Text Placeholder 7"/>
           <p:cNvSpPr>
             <a:spLocks noGrp="1"/>
           </p:cNvSpPr>
@@ -6133,7 +6587,7 @@
             <a:spLocks noGrp="1"/>
           </p:cNvSpPr>
           <p:nvPr>
-            <p:ph type="dt" sz="half" idx="14"/>
+            <p:ph type="dt" sz="half" idx="10"/>
           </p:nvPr>
         </p:nvSpPr>
         <p:spPr/>
@@ -6149,7 +6603,7 @@
               <a:pPr>
                 <a:defRPr/>
               </a:pPr>
-              <a:t>16 July 2015</a:t>
+              <a:t>24 July 2015</a:t>
             </a:fld>
             <a:endParaRPr lang="en-US" dirty="0"/>
           </a:p>
@@ -6162,7 +6616,7 @@
             <a:spLocks noGrp="1"/>
           </p:cNvSpPr>
           <p:nvPr>
-            <p:ph type="sldNum" sz="quarter" idx="15"/>
+            <p:ph type="sldNum" sz="quarter" idx="12"/>
           </p:nvPr>
         </p:nvSpPr>
         <p:spPr/>
@@ -6184,16 +6638,332 @@
           </a:p>
         </p:txBody>
       </p:sp>
+      <p:pic>
+        <p:nvPicPr>
+          <p:cNvPr id="1026" name="Picture 2"/>
+          <p:cNvPicPr>
+            <a:picLocks noGrp="1" noChangeAspect="1" noChangeArrowheads="1"/>
+          </p:cNvPicPr>
+          <p:nvPr>
+            <p:ph sz="half" idx="2"/>
+          </p:nvPr>
+        </p:nvPicPr>
+        <p:blipFill>
+          <a:blip r:embed="rId2">
+            <a:extLst>
+              <a:ext uri="{28A0092B-C50C-407E-A947-70E740481C1C}">
+                <a14:useLocalDpi xmlns:a14="http://schemas.microsoft.com/office/drawing/2010/main" val="0"/>
+              </a:ext>
+            </a:extLst>
+          </a:blip>
+          <a:srcRect/>
+          <a:stretch>
+            <a:fillRect/>
+          </a:stretch>
+        </p:blipFill>
+        <p:spPr bwMode="auto">
+          <a:xfrm>
+            <a:off x="5443398" y="1947638"/>
+            <a:ext cx="2475191" cy="3731075"/>
+          </a:xfrm>
+          <a:prstGeom prst="rect">
+            <a:avLst/>
+          </a:prstGeom>
+          <a:noFill/>
+          <a:ln>
+            <a:noFill/>
+          </a:ln>
+          <a:effectLst/>
+          <a:extLst>
+            <a:ext uri="{909E8E84-426E-40DD-AFC4-6F175D3DCCD1}">
+              <a14:hiddenFill xmlns:a14="http://schemas.microsoft.com/office/drawing/2010/main">
+                <a:solidFill>
+                  <a:schemeClr val="accent1"/>
+                </a:solidFill>
+              </a14:hiddenFill>
+            </a:ext>
+            <a:ext uri="{91240B29-F687-4F45-9708-019B960494DF}">
+              <a14:hiddenLine xmlns:a14="http://schemas.microsoft.com/office/drawing/2010/main" w="9525">
+                <a:solidFill>
+                  <a:schemeClr val="tx1"/>
+                </a:solidFill>
+                <a:miter lim="800000"/>
+                <a:headEnd/>
+                <a:tailEnd/>
+              </a14:hiddenLine>
+            </a:ext>
+            <a:ext uri="{AF507438-7753-43E0-B8FC-AC1667EBCBE1}">
+              <a14:hiddenEffects xmlns:a14="http://schemas.microsoft.com/office/drawing/2010/main">
+                <a:effectLst>
+                  <a:outerShdw dist="35921" dir="2700000" algn="ctr" rotWithShape="0">
+                    <a:schemeClr val="bg2"/>
+                  </a:outerShdw>
+                </a:effectLst>
+              </a14:hiddenEffects>
+            </a:ext>
+          </a:extLst>
+        </p:spPr>
+      </p:pic>
     </p:spTree>
     <p:extLst>
       <p:ext uri="{BB962C8B-B14F-4D97-AF65-F5344CB8AC3E}">
-        <p14:creationId xmlns:p14="http://schemas.microsoft.com/office/powerpoint/2010/main" val="3515555941"/>
+        <p14:creationId xmlns:p14="http://schemas.microsoft.com/office/powerpoint/2010/main" val="479859234"/>
       </p:ext>
     </p:extLst>
   </p:cSld>
   <p:clrMapOvr>
     <a:masterClrMapping/>
   </p:clrMapOvr>
+  <p:timing>
+    <p:tnLst>
+      <p:par>
+        <p:cTn id="1" dur="indefinite" restart="never" nodeType="tmRoot"/>
+      </p:par>
+    </p:tnLst>
+  </p:timing>
+</p:sld>
+</file>
+
+<file path=ppt/slides/slide14.xml><?xml version="1.0" encoding="utf-8"?>
+<p:sld xmlns:a="http://schemas.openxmlformats.org/drawingml/2006/main" xmlns:r="http://schemas.openxmlformats.org/officeDocument/2006/relationships" xmlns:p="http://schemas.openxmlformats.org/presentationml/2006/main">
+  <p:cSld>
+    <p:spTree>
+      <p:nvGrpSpPr>
+        <p:cNvPr id="1" name=""/>
+        <p:cNvGrpSpPr/>
+        <p:nvPr/>
+      </p:nvGrpSpPr>
+      <p:grpSpPr>
+        <a:xfrm>
+          <a:off x="0" y="0"/>
+          <a:ext cx="0" cy="0"/>
+          <a:chOff x="0" y="0"/>
+          <a:chExt cx="0" cy="0"/>
+        </a:xfrm>
+      </p:grpSpPr>
+      <p:sp>
+        <p:nvSpPr>
+          <p:cNvPr id="8" name="Title 7"/>
+          <p:cNvSpPr>
+            <a:spLocks noGrp="1"/>
+          </p:cNvSpPr>
+          <p:nvPr>
+            <p:ph type="title"/>
+          </p:nvPr>
+        </p:nvSpPr>
+        <p:spPr/>
+        <p:txBody>
+          <a:bodyPr/>
+          <a:lstStyle/>
+          <a:p>
+            <a:r>
+              <a:rPr lang="en-GB" dirty="0" smtClean="0"/>
+              <a:t>Listener API</a:t>
+            </a:r>
+            <a:endParaRPr lang="en-GB" dirty="0"/>
+          </a:p>
+        </p:txBody>
+      </p:sp>
+      <p:sp>
+        <p:nvSpPr>
+          <p:cNvPr id="9" name="Content Placeholder 8"/>
+          <p:cNvSpPr>
+            <a:spLocks noGrp="1"/>
+          </p:cNvSpPr>
+          <p:nvPr>
+            <p:ph idx="1"/>
+          </p:nvPr>
+        </p:nvSpPr>
+        <p:spPr/>
+        <p:txBody>
+          <a:bodyPr/>
+          <a:lstStyle/>
+          <a:p>
+            <a:r>
+              <a:rPr lang="en-GB" dirty="0" smtClean="0"/>
+              <a:t>Application can get notification about some events that occur inside the grid.</a:t>
+            </a:r>
+          </a:p>
+          <a:p>
+            <a:r>
+              <a:rPr lang="en-GB" dirty="0" smtClean="0"/>
+              <a:t>API is annotation driven</a:t>
+            </a:r>
+          </a:p>
+          <a:p>
+            <a:r>
+              <a:rPr lang="en-GB" dirty="0" smtClean="0"/>
+              <a:t>Cache Level Events</a:t>
+            </a:r>
+          </a:p>
+          <a:p>
+            <a:pPr lvl="1"/>
+            <a:r>
+              <a:rPr lang="en-GB" dirty="0" err="1" smtClean="0"/>
+              <a:t>CacheEntryAddedEvent</a:t>
+            </a:r>
+            <a:r>
+              <a:rPr lang="en-GB" dirty="0" smtClean="0"/>
+              <a:t>/Modified/Removed</a:t>
+            </a:r>
+          </a:p>
+          <a:p>
+            <a:pPr lvl="1"/>
+            <a:r>
+              <a:rPr lang="en-GB" dirty="0" err="1" smtClean="0"/>
+              <a:t>CacheEntryInvalidatedEvent</a:t>
+            </a:r>
+            <a:r>
+              <a:rPr lang="en-GB" dirty="0" smtClean="0"/>
+              <a:t>/Evicted</a:t>
+            </a:r>
+          </a:p>
+          <a:p>
+            <a:pPr lvl="1"/>
+            <a:r>
+              <a:rPr lang="en-GB" dirty="0" err="1" smtClean="0"/>
+              <a:t>CacheEntryActivatedEvent</a:t>
+            </a:r>
+            <a:r>
+              <a:rPr lang="en-GB" dirty="0" smtClean="0"/>
+              <a:t>/Passivated etc.</a:t>
+            </a:r>
+          </a:p>
+          <a:p>
+            <a:r>
+              <a:rPr lang="en-GB" dirty="0" smtClean="0"/>
+              <a:t>Cache Manager Level Events</a:t>
+            </a:r>
+          </a:p>
+          <a:p>
+            <a:pPr lvl="1"/>
+            <a:r>
+              <a:rPr lang="en-GB" dirty="0" err="1" smtClean="0"/>
+              <a:t>CacheStartedEvent</a:t>
+            </a:r>
+            <a:r>
+              <a:rPr lang="en-GB" dirty="0" smtClean="0"/>
+              <a:t>/Stopped</a:t>
+            </a:r>
+          </a:p>
+          <a:p>
+            <a:pPr lvl="1"/>
+            <a:r>
+              <a:rPr lang="en-GB" dirty="0" err="1" smtClean="0"/>
+              <a:t>ViewChanged</a:t>
+            </a:r>
+            <a:endParaRPr lang="en-GB" dirty="0" smtClean="0"/>
+          </a:p>
+          <a:p>
+            <a:pPr lvl="1"/>
+            <a:r>
+              <a:rPr lang="en-GB" dirty="0" smtClean="0"/>
+              <a:t>Merged</a:t>
+            </a:r>
+            <a:endParaRPr lang="en-GB" dirty="0"/>
+          </a:p>
+          <a:p>
+            <a:r>
+              <a:rPr lang="en-GB" dirty="0" smtClean="0"/>
+              <a:t>Cluster Listener (@Listener(clustered=yes))</a:t>
+            </a:r>
+          </a:p>
+        </p:txBody>
+      </p:sp>
+      <p:sp>
+        <p:nvSpPr>
+          <p:cNvPr id="10" name="Text Placeholder 9"/>
+          <p:cNvSpPr>
+            <a:spLocks noGrp="1"/>
+          </p:cNvSpPr>
+          <p:nvPr>
+            <p:ph type="body" sz="quarter" idx="13"/>
+          </p:nvPr>
+        </p:nvSpPr>
+        <p:spPr/>
+        <p:txBody>
+          <a:bodyPr/>
+          <a:lstStyle/>
+          <a:p>
+            <a:endParaRPr lang="en-GB"/>
+          </a:p>
+        </p:txBody>
+      </p:sp>
+      <p:sp>
+        <p:nvSpPr>
+          <p:cNvPr id="6" name="Date Placeholder 5"/>
+          <p:cNvSpPr>
+            <a:spLocks noGrp="1"/>
+          </p:cNvSpPr>
+          <p:nvPr>
+            <p:ph type="dt" sz="half" idx="14"/>
+          </p:nvPr>
+        </p:nvSpPr>
+        <p:spPr/>
+        <p:txBody>
+          <a:bodyPr/>
+          <a:lstStyle/>
+          <a:p>
+            <a:pPr>
+              <a:defRPr/>
+            </a:pPr>
+            <a:fld id="{262EFB65-E16C-451A-8365-0EA1441EB5B7}" type="datetime3">
+              <a:rPr lang="en-US" smtClean="0"/>
+              <a:pPr>
+                <a:defRPr/>
+              </a:pPr>
+              <a:t>24 July 2015</a:t>
+            </a:fld>
+            <a:endParaRPr lang="en-US" dirty="0"/>
+          </a:p>
+        </p:txBody>
+      </p:sp>
+      <p:sp>
+        <p:nvSpPr>
+          <p:cNvPr id="7" name="Slide Number Placeholder 6"/>
+          <p:cNvSpPr>
+            <a:spLocks noGrp="1"/>
+          </p:cNvSpPr>
+          <p:nvPr>
+            <p:ph type="sldNum" sz="quarter" idx="15"/>
+          </p:nvPr>
+        </p:nvSpPr>
+        <p:spPr/>
+        <p:txBody>
+          <a:bodyPr/>
+          <a:lstStyle/>
+          <a:p>
+            <a:pPr>
+              <a:defRPr/>
+            </a:pPr>
+            <a:fld id="{62FEDF8E-5B0F-4A65-9F05-A41FA81134FA}" type="slidenum">
+              <a:rPr lang="en-US" smtClean="0"/>
+              <a:pPr>
+                <a:defRPr/>
+              </a:pPr>
+              <a:t>13</a:t>
+            </a:fld>
+            <a:endParaRPr lang="en-US"/>
+          </a:p>
+        </p:txBody>
+      </p:sp>
+    </p:spTree>
+    <p:extLst>
+      <p:ext uri="{BB962C8B-B14F-4D97-AF65-F5344CB8AC3E}">
+        <p14:creationId xmlns:p14="http://schemas.microsoft.com/office/powerpoint/2010/main" val="2740023244"/>
+      </p:ext>
+    </p:extLst>
+  </p:cSld>
+  <p:clrMapOvr>
+    <a:masterClrMapping/>
+  </p:clrMapOvr>
+  <p:timing>
+    <p:tnLst>
+      <p:par>
+        <p:cTn id="1" dur="indefinite" restart="never" nodeType="tmRoot"/>
+      </p:par>
+    </p:tnLst>
+  </p:timing>
 </p:sld>
 </file>
 
@@ -6284,6 +7054,12 @@
           </a:p>
           <a:p>
             <a:r>
+              <a:rPr lang="en-GB" dirty="0" smtClean="0"/>
+              <a:t>Eviction/Expiration</a:t>
+            </a:r>
+          </a:p>
+          <a:p>
+            <a:r>
               <a:rPr lang="en-GB" dirty="0" err="1" smtClean="0"/>
               <a:t>Transcations</a:t>
             </a:r>
@@ -6342,7 +7118,7 @@
               <a:pPr>
                 <a:defRPr/>
               </a:pPr>
-              <a:t>16 July 2015</a:t>
+              <a:t>24 July 2015</a:t>
             </a:fld>
             <a:endParaRPr lang="en-US" dirty="0"/>
           </a:p>
@@ -6467,18 +7243,21 @@
             <a:pPr lvl="1"/>
             <a:r>
               <a:rPr lang="en-GB" dirty="0" smtClean="0"/>
-              <a:t>Distributed Cache</a:t>
+              <a:t>Distributed</a:t>
             </a:r>
           </a:p>
           <a:p>
             <a:pPr lvl="1"/>
             <a:r>
-              <a:rPr lang="en-GB" dirty="0"/>
-              <a:t>NoSQL key/value </a:t>
-            </a:r>
-            <a:r>
               <a:rPr lang="en-GB" dirty="0" smtClean="0"/>
-              <a:t>store</a:t>
+              <a:t>In-memory</a:t>
+            </a:r>
+          </a:p>
+          <a:p>
+            <a:pPr lvl="1"/>
+            <a:r>
+              <a:rPr lang="en-GB" dirty="0" smtClean="0"/>
+              <a:t>key/value store</a:t>
             </a:r>
           </a:p>
           <a:p>
@@ -6496,21 +7275,18 @@
             <a:pPr lvl="1"/>
             <a:r>
               <a:rPr lang="en-GB" dirty="0" smtClean="0"/>
-              <a:t>In-memory cache</a:t>
+              <a:t>Highly available</a:t>
             </a:r>
           </a:p>
           <a:p>
             <a:pPr lvl="1"/>
             <a:r>
+              <a:rPr lang="en-GB" dirty="0"/>
+              <a:t>Open </a:t>
+            </a:r>
+            <a:r>
               <a:rPr lang="en-GB" dirty="0" smtClean="0"/>
-              <a:t>Open Source</a:t>
-            </a:r>
-          </a:p>
-          <a:p>
-            <a:pPr lvl="1"/>
-            <a:r>
-              <a:rPr lang="en-GB" dirty="0" smtClean="0"/>
-              <a:t>Highly available</a:t>
+              <a:t>Source</a:t>
             </a:r>
             <a:endParaRPr lang="en-GB" dirty="0"/>
           </a:p>
@@ -6564,7 +7340,7 @@
               <a:pPr>
                 <a:defRPr/>
               </a:pPr>
-              <a:t>16 July 2015</a:t>
+              <a:t>24 July 2015</a:t>
             </a:fld>
             <a:endParaRPr lang="en-US" dirty="0"/>
           </a:p>
@@ -6661,6 +7437,12 @@
             </a:r>
           </a:p>
           <a:p>
+            <a:pPr marL="0" indent="0">
+              <a:buNone/>
+            </a:pPr>
+            <a:endParaRPr lang="en-GB" sz="1800" dirty="0" smtClean="0"/>
+          </a:p>
+          <a:p>
             <a:r>
               <a:rPr lang="en-GB" sz="1800" dirty="0" smtClean="0"/>
               <a:t>exist </a:t>
@@ -6685,8 +7467,18 @@
             </a:r>
             <a:r>
               <a:rPr lang="en-GB" sz="1800" dirty="0" smtClean="0"/>
-              <a:t>scalable.</a:t>
-            </a:r>
+              <a:t>scalable</a:t>
+            </a:r>
+            <a:r>
+              <a:rPr lang="en-GB" sz="1800" dirty="0" smtClean="0"/>
+              <a:t>.</a:t>
+            </a:r>
+          </a:p>
+          <a:p>
+            <a:pPr marL="0" indent="0">
+              <a:buNone/>
+            </a:pPr>
+            <a:endParaRPr lang="en-GB" sz="1800" dirty="0" smtClean="0"/>
           </a:p>
           <a:p>
             <a:r>
@@ -6711,6 +7503,12 @@
             </a:r>
           </a:p>
           <a:p>
+            <a:pPr marL="0" indent="0">
+              <a:buNone/>
+            </a:pPr>
+            <a:endParaRPr lang="en-GB" sz="1800" dirty="0" smtClean="0"/>
+          </a:p>
+          <a:p>
             <a:r>
               <a:rPr lang="en-GB" sz="1800" dirty="0" smtClean="0"/>
               <a:t>Used </a:t>
@@ -6731,6 +7529,12 @@
               <a:rPr lang="en-GB" sz="1800" dirty="0" smtClean="0"/>
               <a:t>source</a:t>
             </a:r>
+          </a:p>
+          <a:p>
+            <a:pPr marL="0" indent="0">
+              <a:buNone/>
+            </a:pPr>
+            <a:endParaRPr lang="en-GB" sz="1800" dirty="0" smtClean="0"/>
           </a:p>
           <a:p>
             <a:r>
@@ -6874,12 +7678,8 @@
           <a:lstStyle/>
           <a:p>
             <a:r>
-              <a:rPr lang="en-GB" i="1" dirty="0"/>
-              <a:t>Embedded</a:t>
-            </a:r>
-            <a:r>
               <a:rPr lang="en-GB" dirty="0"/>
-              <a:t> (P2P)</a:t>
+              <a:t>Embedded (P2P)</a:t>
             </a:r>
           </a:p>
           <a:p>
@@ -6910,7 +7710,7 @@
               <a:pPr>
                 <a:defRPr/>
               </a:pPr>
-              <a:t>16 July 2015</a:t>
+              <a:t>24 July 2015</a:t>
             </a:fld>
             <a:endParaRPr lang="en-US" dirty="0"/>
           </a:p>
@@ -7016,6 +7816,12 @@
             </a:r>
           </a:p>
           <a:p>
+            <a:pPr marL="0" indent="0">
+              <a:buNone/>
+            </a:pPr>
+            <a:endParaRPr lang="en-GB" sz="1800" dirty="0" smtClean="0"/>
+          </a:p>
+          <a:p>
             <a:r>
               <a:rPr lang="en-GB" sz="1800" dirty="0" smtClean="0"/>
               <a:t>Supported </a:t>
@@ -7034,8 +7840,18 @@
             </a:r>
             <a:r>
               <a:rPr lang="en-GB" sz="1800" dirty="0" smtClean="0"/>
-              <a:t>, Hot Rod</a:t>
-            </a:r>
+              <a:t>, Hot </a:t>
+            </a:r>
+            <a:r>
+              <a:rPr lang="en-GB" sz="1800" dirty="0" smtClean="0"/>
+              <a:t>Rod</a:t>
+            </a:r>
+          </a:p>
+          <a:p>
+            <a:pPr marL="0" indent="0">
+              <a:buNone/>
+            </a:pPr>
+            <a:endParaRPr lang="en-GB" sz="1800" dirty="0" smtClean="0"/>
           </a:p>
           <a:p>
             <a:r>
@@ -7048,14 +7864,34 @@
             </a:r>
             <a:r>
               <a:rPr lang="en-GB" sz="1800" dirty="0" smtClean="0"/>
-              <a:t> AS 7.2</a:t>
-            </a:r>
-          </a:p>
-          <a:p>
+              <a:t> AS </a:t>
+            </a:r>
             <a:r>
               <a:rPr lang="en-GB" sz="1800" dirty="0" smtClean="0"/>
-              <a:t>Provide external access to data grid.</a:t>
-            </a:r>
+              <a:t>7.2</a:t>
+            </a:r>
+          </a:p>
+          <a:p>
+            <a:pPr marL="0" indent="0">
+              <a:buNone/>
+            </a:pPr>
+            <a:endParaRPr lang="en-GB" sz="1800" dirty="0" smtClean="0"/>
+          </a:p>
+          <a:p>
+            <a:r>
+              <a:rPr lang="en-GB" sz="1800" dirty="0" smtClean="0"/>
+              <a:t>Provide external access to data grid</a:t>
+            </a:r>
+            <a:r>
+              <a:rPr lang="en-GB" sz="1800" dirty="0" smtClean="0"/>
+              <a:t>.</a:t>
+            </a:r>
+          </a:p>
+          <a:p>
+            <a:pPr marL="0" indent="0">
+              <a:buNone/>
+            </a:pPr>
+            <a:endParaRPr lang="en-GB" sz="1800" dirty="0" smtClean="0"/>
           </a:p>
           <a:p>
             <a:r>
@@ -7068,8 +7904,18 @@
             </a:r>
             <a:r>
               <a:rPr lang="en-GB" sz="1800" dirty="0" smtClean="0"/>
-              <a:t>non-JVM environment</a:t>
-            </a:r>
+              <a:t>non-JVM </a:t>
+            </a:r>
+            <a:r>
+              <a:rPr lang="en-GB" sz="1800" dirty="0" smtClean="0"/>
+              <a:t>environment</a:t>
+            </a:r>
+          </a:p>
+          <a:p>
+            <a:pPr marL="0" indent="0">
+              <a:buNone/>
+            </a:pPr>
+            <a:endParaRPr lang="en-GB" sz="1800" dirty="0" smtClean="0"/>
           </a:p>
           <a:p>
             <a:r>
@@ -7158,15 +8004,7 @@
           <a:p>
             <a:r>
               <a:rPr lang="en-GB" dirty="0"/>
-              <a:t>As a </a:t>
-            </a:r>
-            <a:r>
-              <a:rPr lang="en-GB" i="1" dirty="0"/>
-              <a:t>Remote</a:t>
-            </a:r>
-            <a:r>
-              <a:rPr lang="en-GB" dirty="0"/>
-              <a:t> server</a:t>
+              <a:t>As a Remote server</a:t>
             </a:r>
           </a:p>
           <a:p>
@@ -7197,7 +8035,7 @@
               <a:pPr>
                 <a:defRPr/>
               </a:pPr>
-              <a:t>16 July 2015</a:t>
+              <a:t>24 July 2015</a:t>
             </a:fld>
             <a:endParaRPr lang="en-US" dirty="0"/>
           </a:p>
@@ -7314,12 +8152,12 @@
       </p:grpSpPr>
       <p:sp>
         <p:nvSpPr>
-          <p:cNvPr id="15" name="Content Placeholder 14"/>
+          <p:cNvPr id="8" name="Title 7"/>
           <p:cNvSpPr>
             <a:spLocks noGrp="1"/>
           </p:cNvSpPr>
           <p:nvPr>
-            <p:ph sz="half" idx="1"/>
+            <p:ph type="title"/>
           </p:nvPr>
         </p:nvSpPr>
         <p:spPr/>
@@ -7328,59 +8166,24 @@
           <a:lstStyle/>
           <a:p>
             <a:r>
-              <a:rPr lang="en-GB" dirty="0" smtClean="0"/>
-              <a:t>acts </a:t>
-            </a:r>
-            <a:r>
               <a:rPr lang="en-GB" dirty="0"/>
-              <a:t>as a simple, in-memory data cache </a:t>
-            </a:r>
-          </a:p>
-          <a:p>
-            <a:r>
-              <a:rPr lang="en-GB" dirty="0" smtClean="0"/>
-              <a:t>entries </a:t>
-            </a:r>
-            <a:r>
+              <a:t>Caching Modes</a:t>
+            </a:r>
+            <a:br>
               <a:rPr lang="en-GB" dirty="0"/>
-              <a:t>are stored on the local node </a:t>
-            </a:r>
-            <a:r>
-              <a:rPr lang="en-GB" dirty="0" smtClean="0"/>
-              <a:t>only</a:t>
-            </a:r>
-          </a:p>
-          <a:p>
-            <a:r>
-              <a:rPr lang="en-GB" dirty="0" smtClean="0"/>
-              <a:t>More features than a map:</a:t>
-            </a:r>
-          </a:p>
-          <a:p>
-            <a:pPr lvl="1"/>
-            <a:r>
-              <a:rPr lang="en-GB" dirty="0" smtClean="0"/>
-              <a:t>Eviction</a:t>
-            </a:r>
+            </a:br>
             <a:endParaRPr lang="en-GB" dirty="0"/>
           </a:p>
-          <a:p>
-            <a:pPr lvl="1"/>
-            <a:r>
-              <a:rPr lang="en-GB" dirty="0" smtClean="0"/>
-              <a:t>Write-through and Write-behind</a:t>
-            </a:r>
-          </a:p>
-        </p:txBody>
-      </p:sp>
-      <p:sp>
-        <p:nvSpPr>
-          <p:cNvPr id="14" name="Title 13"/>
+        </p:txBody>
+      </p:sp>
+      <p:sp>
+        <p:nvSpPr>
+          <p:cNvPr id="9" name="Text Placeholder 8"/>
           <p:cNvSpPr>
             <a:spLocks noGrp="1"/>
           </p:cNvSpPr>
           <p:nvPr>
-            <p:ph type="title"/>
+            <p:ph type="body" sz="quarter" idx="13"/>
           </p:nvPr>
         </p:nvSpPr>
         <p:spPr/>
@@ -7390,7 +8193,7 @@
           <a:p>
             <a:r>
               <a:rPr lang="en-GB" dirty="0" smtClean="0"/>
-              <a:t>Modes</a:t>
+              <a:t>Local Mode</a:t>
             </a:r>
             <a:endParaRPr lang="en-GB" dirty="0"/>
           </a:p>
@@ -7398,12 +8201,12 @@
       </p:sp>
       <p:sp>
         <p:nvSpPr>
-          <p:cNvPr id="16" name="Text Placeholder 15"/>
+          <p:cNvPr id="6" name="Date Placeholder 5"/>
           <p:cNvSpPr>
             <a:spLocks noGrp="1"/>
           </p:cNvSpPr>
           <p:nvPr>
-            <p:ph type="body" sz="quarter" idx="13"/>
+            <p:ph type="dt" sz="half" idx="10"/>
           </p:nvPr>
         </p:nvSpPr>
         <p:spPr/>
@@ -7411,22 +8214,28 @@
           <a:bodyPr/>
           <a:lstStyle/>
           <a:p>
-            <a:r>
-              <a:rPr lang="en-GB" dirty="0" smtClean="0"/>
-              <a:t>LOCAL MODE</a:t>
-            </a:r>
-            <a:endParaRPr lang="en-GB" dirty="0"/>
-          </a:p>
-        </p:txBody>
-      </p:sp>
-      <p:sp>
-        <p:nvSpPr>
-          <p:cNvPr id="6" name="Date Placeholder 5"/>
+            <a:pPr>
+              <a:defRPr/>
+            </a:pPr>
+            <a:fld id="{262EFB65-E16C-451A-8365-0EA1441EB5B7}" type="datetime3">
+              <a:rPr lang="en-US" smtClean="0"/>
+              <a:pPr>
+                <a:defRPr/>
+              </a:pPr>
+              <a:t>24 July 2015</a:t>
+            </a:fld>
+            <a:endParaRPr lang="en-US" dirty="0"/>
+          </a:p>
+        </p:txBody>
+      </p:sp>
+      <p:sp>
+        <p:nvSpPr>
+          <p:cNvPr id="7" name="Slide Number Placeholder 6"/>
           <p:cNvSpPr>
             <a:spLocks noGrp="1"/>
           </p:cNvSpPr>
           <p:nvPr>
-            <p:ph type="dt" sz="half" idx="10"/>
+            <p:ph type="sldNum" sz="quarter" idx="12"/>
           </p:nvPr>
         </p:nvSpPr>
         <p:spPr/>
@@ -7434,48 +8243,278 @@
           <a:bodyPr/>
           <a:lstStyle/>
           <a:p>
-            <a:fld id="{262EFB65-E16C-451A-8365-0EA1441EB5B7}" type="datetime3">
-              <a:rPr lang="en-US" smtClean="0"/>
-              <a:pPr/>
-              <a:t>16 July 2015</a:t>
-            </a:fld>
-            <a:endParaRPr lang="en-US" dirty="0"/>
-          </a:p>
-        </p:txBody>
-      </p:sp>
-      <p:sp>
-        <p:nvSpPr>
-          <p:cNvPr id="7" name="Slide Number Placeholder 6"/>
-          <p:cNvSpPr>
-            <a:spLocks noGrp="1"/>
-          </p:cNvSpPr>
-          <p:nvPr>
-            <p:ph type="sldNum" sz="quarter" idx="12"/>
-          </p:nvPr>
-        </p:nvSpPr>
-        <p:spPr/>
-        <p:txBody>
-          <a:bodyPr/>
-          <a:lstStyle/>
-          <a:p>
+            <a:pPr>
+              <a:defRPr/>
+            </a:pPr>
             <a:fld id="{62FEDF8E-5B0F-4A65-9F05-A41FA81134FA}" type="slidenum">
               <a:rPr lang="en-US" smtClean="0"/>
-              <a:pPr/>
+              <a:pPr>
+                <a:defRPr/>
+              </a:pPr>
               <a:t>5</a:t>
             </a:fld>
             <a:endParaRPr lang="en-US"/>
           </a:p>
         </p:txBody>
       </p:sp>
+      <p:sp>
+        <p:nvSpPr>
+          <p:cNvPr id="10" name="Content Placeholder 14"/>
+          <p:cNvSpPr txBox="1">
+            <a:spLocks/>
+          </p:cNvSpPr>
+          <p:nvPr/>
+        </p:nvSpPr>
+        <p:spPr>
+          <a:xfrm>
+            <a:off x="431800" y="1239839"/>
+            <a:ext cx="4064000" cy="3955791"/>
+          </a:xfrm>
+          <a:prstGeom prst="rect">
+            <a:avLst/>
+          </a:prstGeom>
+        </p:spPr>
+        <p:txBody>
+          <a:bodyPr/>
+          <a:lstStyle>
+            <a:lvl1pPr marL="195263" indent="-195263" algn="l" rtl="0" eaLnBrk="0" fontAlgn="base" hangingPunct="0">
+              <a:spcBef>
+                <a:spcPct val="20000"/>
+              </a:spcBef>
+              <a:spcAft>
+                <a:spcPct val="0"/>
+              </a:spcAft>
+              <a:buClr>
+                <a:srgbClr val="009FDA"/>
+              </a:buClr>
+              <a:buSzPct val="130000"/>
+              <a:buFont typeface="Arial" charset="0"/>
+              <a:buChar char="•"/>
+              <a:defRPr sz="2200">
+                <a:solidFill>
+                  <a:schemeClr val="tx1"/>
+                </a:solidFill>
+                <a:latin typeface="+mn-lt"/>
+                <a:ea typeface="+mn-ea"/>
+                <a:cs typeface="+mn-cs"/>
+              </a:defRPr>
+            </a:lvl1pPr>
+            <a:lvl2pPr marL="762000" indent="-190500" algn="l" rtl="0" eaLnBrk="0" fontAlgn="base" hangingPunct="0">
+              <a:spcBef>
+                <a:spcPct val="20000"/>
+              </a:spcBef>
+              <a:spcAft>
+                <a:spcPct val="0"/>
+              </a:spcAft>
+              <a:buSzPct val="100000"/>
+              <a:buChar char="–"/>
+              <a:defRPr sz="2000">
+                <a:solidFill>
+                  <a:schemeClr val="tx1"/>
+                </a:solidFill>
+                <a:latin typeface="+mn-lt"/>
+              </a:defRPr>
+            </a:lvl2pPr>
+            <a:lvl3pPr marL="1236663" indent="-188913" algn="l" rtl="0" eaLnBrk="0" fontAlgn="base" hangingPunct="0">
+              <a:spcBef>
+                <a:spcPct val="20000"/>
+              </a:spcBef>
+              <a:spcAft>
+                <a:spcPct val="0"/>
+              </a:spcAft>
+              <a:buClr>
+                <a:srgbClr val="009FDA"/>
+              </a:buClr>
+              <a:buSzPct val="130000"/>
+              <a:buFont typeface="Times" pitchFamily="18" charset="0"/>
+              <a:buChar char="•"/>
+              <a:defRPr sz="1800">
+                <a:solidFill>
+                  <a:schemeClr val="tx1"/>
+                </a:solidFill>
+                <a:latin typeface="+mn-lt"/>
+              </a:defRPr>
+            </a:lvl3pPr>
+            <a:lvl4pPr marL="1719263" indent="-252413" algn="l" rtl="0" eaLnBrk="0" fontAlgn="base" hangingPunct="0">
+              <a:spcBef>
+                <a:spcPct val="20000"/>
+              </a:spcBef>
+              <a:spcAft>
+                <a:spcPct val="0"/>
+              </a:spcAft>
+              <a:buChar char="–"/>
+              <a:defRPr sz="1600">
+                <a:solidFill>
+                  <a:schemeClr val="tx1"/>
+                </a:solidFill>
+                <a:latin typeface="+mn-lt"/>
+              </a:defRPr>
+            </a:lvl4pPr>
+            <a:lvl5pPr marL="2138363" indent="-228600" algn="l" rtl="0" eaLnBrk="0" fontAlgn="base" hangingPunct="0">
+              <a:spcBef>
+                <a:spcPct val="20000"/>
+              </a:spcBef>
+              <a:spcAft>
+                <a:spcPct val="0"/>
+              </a:spcAft>
+              <a:buClr>
+                <a:srgbClr val="009FDA"/>
+              </a:buClr>
+              <a:buSzPct val="130000"/>
+              <a:buFont typeface="Times" pitchFamily="18" charset="0"/>
+              <a:buChar char="•"/>
+              <a:defRPr sz="1600">
+                <a:solidFill>
+                  <a:schemeClr val="tx1"/>
+                </a:solidFill>
+                <a:latin typeface="+mn-lt"/>
+              </a:defRPr>
+            </a:lvl5pPr>
+            <a:lvl6pPr marL="2595563" indent="-228600" algn="l" rtl="0" eaLnBrk="1" fontAlgn="base" hangingPunct="1">
+              <a:spcBef>
+                <a:spcPct val="20000"/>
+              </a:spcBef>
+              <a:spcAft>
+                <a:spcPct val="0"/>
+              </a:spcAft>
+              <a:buClr>
+                <a:srgbClr val="009FDA"/>
+              </a:buClr>
+              <a:buSzPct val="130000"/>
+              <a:buFont typeface="Times" pitchFamily="18" charset="0"/>
+              <a:buChar char="•"/>
+              <a:defRPr sz="1400">
+                <a:solidFill>
+                  <a:schemeClr val="tx1"/>
+                </a:solidFill>
+                <a:latin typeface="+mn-lt"/>
+              </a:defRPr>
+            </a:lvl6pPr>
+            <a:lvl7pPr marL="3052763" indent="-228600" algn="l" rtl="0" eaLnBrk="1" fontAlgn="base" hangingPunct="1">
+              <a:spcBef>
+                <a:spcPct val="20000"/>
+              </a:spcBef>
+              <a:spcAft>
+                <a:spcPct val="0"/>
+              </a:spcAft>
+              <a:buClr>
+                <a:srgbClr val="009FDA"/>
+              </a:buClr>
+              <a:buSzPct val="130000"/>
+              <a:buFont typeface="Times" pitchFamily="18" charset="0"/>
+              <a:buChar char="•"/>
+              <a:defRPr sz="1400">
+                <a:solidFill>
+                  <a:schemeClr val="tx1"/>
+                </a:solidFill>
+                <a:latin typeface="+mn-lt"/>
+              </a:defRPr>
+            </a:lvl7pPr>
+            <a:lvl8pPr marL="3509963" indent="-228600" algn="l" rtl="0" eaLnBrk="1" fontAlgn="base" hangingPunct="1">
+              <a:spcBef>
+                <a:spcPct val="20000"/>
+              </a:spcBef>
+              <a:spcAft>
+                <a:spcPct val="0"/>
+              </a:spcAft>
+              <a:buClr>
+                <a:srgbClr val="009FDA"/>
+              </a:buClr>
+              <a:buSzPct val="130000"/>
+              <a:buFont typeface="Times" pitchFamily="18" charset="0"/>
+              <a:buChar char="•"/>
+              <a:defRPr sz="1400">
+                <a:solidFill>
+                  <a:schemeClr val="tx1"/>
+                </a:solidFill>
+                <a:latin typeface="+mn-lt"/>
+              </a:defRPr>
+            </a:lvl8pPr>
+            <a:lvl9pPr marL="3967163" indent="-228600" algn="l" rtl="0" eaLnBrk="1" fontAlgn="base" hangingPunct="1">
+              <a:spcBef>
+                <a:spcPct val="20000"/>
+              </a:spcBef>
+              <a:spcAft>
+                <a:spcPct val="0"/>
+              </a:spcAft>
+              <a:buClr>
+                <a:srgbClr val="009FDA"/>
+              </a:buClr>
+              <a:buSzPct val="130000"/>
+              <a:buFont typeface="Times" pitchFamily="18" charset="0"/>
+              <a:buChar char="•"/>
+              <a:defRPr sz="1400">
+                <a:solidFill>
+                  <a:schemeClr val="tx1"/>
+                </a:solidFill>
+                <a:latin typeface="+mn-lt"/>
+              </a:defRPr>
+            </a:lvl9pPr>
+          </a:lstStyle>
+          <a:p>
+            <a:r>
+              <a:rPr lang="en-GB" sz="1800" kern="0" dirty="0" smtClean="0"/>
+              <a:t>acts as a simple, in-memory data cache </a:t>
+            </a:r>
+          </a:p>
+          <a:p>
+            <a:pPr marL="0" indent="0">
+              <a:buFont typeface="Arial" charset="0"/>
+              <a:buNone/>
+            </a:pPr>
+            <a:endParaRPr lang="en-GB" sz="1800" kern="0" dirty="0" smtClean="0"/>
+          </a:p>
+          <a:p>
+            <a:r>
+              <a:rPr lang="en-GB" sz="1800" kern="0" dirty="0" smtClean="0"/>
+              <a:t>entries are stored on the local node only</a:t>
+            </a:r>
+          </a:p>
+          <a:p>
+            <a:endParaRPr lang="en-GB" sz="1800" kern="0" dirty="0" smtClean="0"/>
+          </a:p>
+          <a:p>
+            <a:r>
+              <a:rPr lang="en-GB" sz="1800" kern="0" dirty="0" smtClean="0"/>
+              <a:t>limited by the maximum size of JVM heap</a:t>
+            </a:r>
+          </a:p>
+          <a:p>
+            <a:pPr marL="0" indent="0">
+              <a:buFont typeface="Arial" charset="0"/>
+              <a:buNone/>
+            </a:pPr>
+            <a:endParaRPr lang="en-GB" sz="1800" kern="0" dirty="0" smtClean="0"/>
+          </a:p>
+          <a:p>
+            <a:r>
+              <a:rPr lang="en-GB" sz="1800" kern="0" dirty="0" smtClean="0"/>
+              <a:t>More features than a map:</a:t>
+            </a:r>
+          </a:p>
+          <a:p>
+            <a:pPr lvl="1"/>
+            <a:r>
+              <a:rPr lang="en-GB" sz="1600" kern="0" dirty="0" smtClean="0"/>
+              <a:t>Eviction</a:t>
+            </a:r>
+          </a:p>
+          <a:p>
+            <a:pPr lvl="1"/>
+            <a:r>
+              <a:rPr lang="en-GB" sz="1600" kern="0" dirty="0" smtClean="0"/>
+              <a:t>Write-through and Write-behind</a:t>
+            </a:r>
+          </a:p>
+        </p:txBody>
+      </p:sp>
       <p:pic>
         <p:nvPicPr>
-          <p:cNvPr id="1026" name="Picture 2"/>
+          <p:cNvPr id="11" name="Picture 2"/>
           <p:cNvPicPr>
-            <a:picLocks noGrp="1" noChangeAspect="1" noChangeArrowheads="1"/>
+            <a:picLocks noChangeAspect="1" noChangeArrowheads="1"/>
           </p:cNvPicPr>
-          <p:nvPr>
-            <p:ph sz="half" idx="2"/>
-          </p:nvPr>
+          <p:nvPr/>
         </p:nvPicPr>
         <p:blipFill>
           <a:blip r:embed="rId2">
@@ -7492,7 +8531,7 @@
         </p:blipFill>
         <p:spPr bwMode="auto">
           <a:xfrm>
-            <a:off x="4687215" y="1815990"/>
+            <a:off x="4879240" y="2185197"/>
             <a:ext cx="3960451" cy="2857500"/>
           </a:xfrm>
           <a:prstGeom prst="rect">
@@ -7533,16 +8572,93 @@
           </a:extLst>
         </p:spPr>
       </p:pic>
+      <p:sp>
+        <p:nvSpPr>
+          <p:cNvPr id="12" name="TextBox 11"/>
+          <p:cNvSpPr txBox="1"/>
+          <p:nvPr/>
+        </p:nvSpPr>
+        <p:spPr>
+          <a:xfrm>
+            <a:off x="539475" y="5195628"/>
+            <a:ext cx="8141860" cy="1008000"/>
+          </a:xfrm>
+          <a:prstGeom prst="rect">
+            <a:avLst/>
+          </a:prstGeom>
+        </p:spPr>
+        <p:style>
+          <a:lnRef idx="1">
+            <a:schemeClr val="accent1"/>
+          </a:lnRef>
+          <a:fillRef idx="2">
+            <a:schemeClr val="accent1"/>
+          </a:fillRef>
+          <a:effectRef idx="1">
+            <a:schemeClr val="accent1"/>
+          </a:effectRef>
+          <a:fontRef idx="minor">
+            <a:schemeClr val="dk1"/>
+          </a:fontRef>
+        </p:style>
+        <p:txBody>
+          <a:bodyPr wrap="square" rtlCol="0">
+            <a:spAutoFit/>
+          </a:bodyPr>
+          <a:lstStyle/>
+          <a:p>
+            <a:pPr algn="ctr">
+              <a:buClr>
+                <a:srgbClr val="00A4F2"/>
+              </a:buClr>
+              <a:buNone/>
+            </a:pPr>
+            <a:endParaRPr lang="en-GB" sz="1800" dirty="0" smtClean="0"/>
+          </a:p>
+          <a:p>
+            <a:pPr algn="ctr">
+              <a:buClr>
+                <a:srgbClr val="00A4F2"/>
+              </a:buClr>
+              <a:buNone/>
+            </a:pPr>
+            <a:r>
+              <a:rPr lang="en-GB" sz="1600" dirty="0" smtClean="0"/>
+              <a:t>&lt;</a:t>
+            </a:r>
+            <a:r>
+              <a:rPr lang="en-GB" sz="1600" dirty="0"/>
+              <a:t>local-cache name="</a:t>
+            </a:r>
+            <a:r>
+              <a:rPr lang="en-GB" sz="1600" dirty="0" err="1"/>
+              <a:t>DefaultLocalCache</a:t>
+            </a:r>
+            <a:r>
+              <a:rPr lang="en-GB" sz="1600" dirty="0"/>
+              <a:t>" /&gt;</a:t>
+            </a:r>
+            <a:endParaRPr lang="en-GB" sz="1600" dirty="0" smtClean="0"/>
+          </a:p>
+        </p:txBody>
+      </p:sp>
     </p:spTree>
     <p:extLst>
       <p:ext uri="{BB962C8B-B14F-4D97-AF65-F5344CB8AC3E}">
-        <p14:creationId xmlns:p14="http://schemas.microsoft.com/office/powerpoint/2010/main" val="1562823553"/>
+        <p14:creationId xmlns:p14="http://schemas.microsoft.com/office/powerpoint/2010/main" val="3014825139"/>
       </p:ext>
     </p:extLst>
   </p:cSld>
   <p:clrMapOvr>
     <a:masterClrMapping/>
   </p:clrMapOvr>
+  <p:timing>
+    <p:tnLst>
+      <p:par>
+        <p:cTn id="1" dur="indefinite" restart="never" nodeType="tmRoot"/>
+      </p:par>
+    </p:tnLst>
+  </p:timing>
 </p:sld>
 </file>
 
@@ -7563,101 +8679,38 @@
           <a:chExt cx="0" cy="0"/>
         </a:xfrm>
       </p:grpSpPr>
-      <p:pic>
-        <p:nvPicPr>
-          <p:cNvPr id="1026" name="Picture 2"/>
-          <p:cNvPicPr>
-            <a:picLocks noGrp="1" noChangeAspect="1" noChangeArrowheads="1"/>
-          </p:cNvPicPr>
+      <p:sp>
+        <p:nvSpPr>
+          <p:cNvPr id="20" name="Content Placeholder 19"/>
+          <p:cNvSpPr>
+            <a:spLocks noGrp="1"/>
+          </p:cNvSpPr>
           <p:nvPr>
             <p:ph sz="half" idx="1"/>
-          </p:nvPr>
-        </p:nvPicPr>
-        <p:blipFill>
-          <a:blip r:embed="rId2">
-            <a:extLst>
-              <a:ext uri="{28A0092B-C50C-407E-A947-70E740481C1C}">
-                <a14:useLocalDpi xmlns:a14="http://schemas.microsoft.com/office/drawing/2010/main" val="0"/>
-              </a:ext>
-            </a:extLst>
-          </a:blip>
-          <a:stretch>
-            <a:fillRect/>
-          </a:stretch>
-        </p:blipFill>
-        <p:spPr bwMode="auto">
-          <a:xfrm>
-            <a:off x="4840835" y="1777585"/>
-            <a:ext cx="4064000" cy="3302830"/>
-          </a:xfrm>
-          <a:prstGeom prst="rect">
-            <a:avLst/>
-          </a:prstGeom>
-          <a:noFill/>
-          <a:ln>
-            <a:noFill/>
-          </a:ln>
-          <a:extLst>
-            <a:ext uri="{909E8E84-426E-40DD-AFC4-6F175D3DCCD1}">
-              <a14:hiddenFill xmlns:a14="http://schemas.microsoft.com/office/drawing/2010/main">
-                <a:solidFill>
-                  <a:schemeClr val="accent1"/>
-                </a:solidFill>
-              </a14:hiddenFill>
-            </a:ext>
-            <a:ext uri="{91240B29-F687-4F45-9708-019B960494DF}">
-              <a14:hiddenLine xmlns:a14="http://schemas.microsoft.com/office/drawing/2010/main" w="9525">
-                <a:solidFill>
-                  <a:schemeClr val="tx1"/>
-                </a:solidFill>
-                <a:miter lim="800000"/>
-                <a:headEnd/>
-                <a:tailEnd/>
-              </a14:hiddenLine>
-            </a:ext>
-          </a:extLst>
-        </p:spPr>
-      </p:pic>
-      <p:sp>
-        <p:nvSpPr>
-          <p:cNvPr id="20" name="Content Placeholder 19"/>
-          <p:cNvSpPr>
-            <a:spLocks noGrp="1"/>
-          </p:cNvSpPr>
-          <p:nvPr>
-            <p:ph sz="half" idx="2"/>
           </p:nvPr>
         </p:nvSpPr>
         <p:spPr>
           <a:xfrm>
-            <a:off x="347450" y="1201510"/>
-            <a:ext cx="4065588" cy="5146675"/>
+            <a:off x="431799" y="1239840"/>
+            <a:ext cx="4447441" cy="3456525"/>
           </a:xfrm>
         </p:spPr>
         <p:txBody>
           <a:bodyPr/>
           <a:lstStyle/>
           <a:p>
-            <a:endParaRPr lang="en-GB" sz="1800" dirty="0" smtClean="0"/>
-          </a:p>
-          <a:p>
             <a:r>
               <a:rPr lang="en-GB" sz="1800" dirty="0" smtClean="0"/>
-              <a:t>Entries replicated </a:t>
-            </a:r>
-            <a:r>
-              <a:rPr lang="en-GB" sz="1800" dirty="0"/>
-              <a:t>to all </a:t>
+              <a:t>Does </a:t>
             </a:r>
             <a:r>
               <a:rPr lang="en-GB" sz="1800" dirty="0" smtClean="0"/>
-              <a:t>cache </a:t>
-            </a:r>
-            <a:r>
-              <a:rPr lang="en-GB" sz="1800" dirty="0"/>
-              <a:t>instances </a:t>
-            </a:r>
-            <a:endParaRPr lang="en-GB" sz="1800" dirty="0" smtClean="0"/>
+              <a:t>not share </a:t>
+            </a:r>
+            <a:r>
+              <a:rPr lang="en-GB" sz="1800" dirty="0" smtClean="0"/>
+              <a:t>data</a:t>
+            </a:r>
           </a:p>
           <a:p>
             <a:pPr marL="0" indent="0">
@@ -7668,7 +8721,15 @@
           <a:p>
             <a:r>
               <a:rPr lang="en-GB" sz="1800" dirty="0" smtClean="0"/>
-              <a:t>Does not offer increased heap space</a:t>
+              <a:t>Removes </a:t>
+            </a:r>
+            <a:r>
+              <a:rPr lang="en-GB" sz="1800" dirty="0" smtClean="0"/>
+              <a:t>data that may be stale from remote </a:t>
+            </a:r>
+            <a:r>
+              <a:rPr lang="en-GB" sz="1800" dirty="0" smtClean="0"/>
+              <a:t>cache</a:t>
             </a:r>
           </a:p>
           <a:p>
@@ -7679,73 +8740,52 @@
           </a:p>
           <a:p>
             <a:r>
+              <a:rPr lang="en-GB" sz="1800" dirty="0" smtClean="0"/>
+              <a:t>Used </a:t>
+            </a:r>
+            <a:r>
+              <a:rPr lang="en-GB" sz="1800" dirty="0" smtClean="0"/>
+              <a:t>for optimization with other permanent </a:t>
+            </a:r>
+            <a:r>
+              <a:rPr lang="en-GB" sz="1800" dirty="0" smtClean="0"/>
+              <a:t>store</a:t>
+            </a:r>
+          </a:p>
+          <a:p>
+            <a:endParaRPr lang="en-GB" sz="1800" dirty="0" smtClean="0"/>
+          </a:p>
+          <a:p>
+            <a:r>
+              <a:rPr lang="en-GB" sz="1800" dirty="0" smtClean="0"/>
+              <a:t>Minimized </a:t>
+            </a:r>
+            <a:r>
               <a:rPr lang="en-GB" sz="1800" dirty="0"/>
-              <a:t>S</a:t>
+              <a:t>network </a:t>
             </a:r>
             <a:r>
               <a:rPr lang="en-GB" sz="1800" dirty="0" smtClean="0"/>
-              <a:t>ynchronous </a:t>
+              <a:t>traffic</a:t>
+            </a:r>
+          </a:p>
+          <a:p>
+            <a:endParaRPr lang="en-GB" sz="1800" dirty="0"/>
+          </a:p>
+          <a:p>
+            <a:r>
+              <a:rPr lang="en-GB" sz="1800" dirty="0" smtClean="0"/>
+              <a:t>Modified </a:t>
             </a:r>
             <a:r>
               <a:rPr lang="en-GB" sz="1800" dirty="0"/>
-              <a:t>replication requires acknowledgments from </a:t>
+              <a:t>data </a:t>
             </a:r>
             <a:r>
               <a:rPr lang="en-GB" sz="1800" dirty="0" smtClean="0"/>
-              <a:t>all </a:t>
-            </a:r>
-          </a:p>
-          <a:p>
-            <a:pPr marL="0" indent="0">
-              <a:buNone/>
-            </a:pPr>
-            <a:endParaRPr lang="en-GB" sz="1800" dirty="0" smtClean="0"/>
-          </a:p>
-          <a:p>
-            <a:r>
-              <a:rPr lang="en-GB" sz="1800" dirty="0" smtClean="0"/>
-              <a:t>Asynchronous </a:t>
-            </a:r>
-            <a:r>
-              <a:rPr lang="en-GB" sz="1800" dirty="0"/>
-              <a:t>replication </a:t>
-            </a:r>
-            <a:r>
-              <a:rPr lang="en-GB" sz="1800" dirty="0" smtClean="0"/>
-              <a:t>works </a:t>
-            </a:r>
-            <a:r>
-              <a:rPr lang="en-GB" sz="1800" dirty="0"/>
-              <a:t>in a </a:t>
-            </a:r>
-            <a:r>
-              <a:rPr lang="en-GB" sz="1800" i="1" dirty="0"/>
-              <a:t>fire-and-forget</a:t>
-            </a:r>
-            <a:r>
-              <a:rPr lang="en-GB" sz="1800" dirty="0"/>
-              <a:t> mode</a:t>
-            </a:r>
-            <a:r>
-              <a:rPr lang="en-GB" sz="1800" dirty="0" smtClean="0"/>
-              <a:t>.</a:t>
-            </a:r>
-          </a:p>
-          <a:p>
-            <a:pPr marL="0" indent="0">
-              <a:buNone/>
-            </a:pPr>
-            <a:endParaRPr lang="en-GB" sz="1800" dirty="0" smtClean="0"/>
-          </a:p>
-          <a:p>
-            <a:r>
-              <a:rPr lang="en-GB" sz="1800" dirty="0" smtClean="0"/>
-              <a:t>Practically performs </a:t>
-            </a:r>
-            <a:r>
-              <a:rPr lang="en-GB" sz="1800" dirty="0"/>
-              <a:t>well in small clusters (under 10 nodes)</a:t>
-            </a:r>
+              <a:t>looked up in lazily manner.</a:t>
+            </a:r>
+            <a:endParaRPr lang="en-GB" sz="1800" dirty="0"/>
           </a:p>
         </p:txBody>
       </p:sp>
@@ -7766,7 +8806,11 @@
           <a:p>
             <a:r>
               <a:rPr lang="en-GB" dirty="0"/>
-              <a:t>Modes</a:t>
+              <a:t>Caching Modes</a:t>
+            </a:r>
+            <a:r>
+              <a:rPr lang="en-GB" dirty="0"/>
+              <a:t/>
             </a:r>
             <a:br>
               <a:rPr lang="en-GB" dirty="0"/>
@@ -7792,7 +8836,7 @@
           <a:p>
             <a:r>
               <a:rPr lang="en-GB" dirty="0" smtClean="0"/>
-              <a:t>Replication Mode</a:t>
+              <a:t>Invalidation Mode</a:t>
             </a:r>
             <a:endParaRPr lang="en-GB" dirty="0"/>
           </a:p>
@@ -7821,7 +8865,7 @@
               <a:pPr>
                 <a:defRPr/>
               </a:pPr>
-              <a:t>16 July 2015</a:t>
+              <a:t>24 July 2015</a:t>
             </a:fld>
             <a:endParaRPr lang="en-US" dirty="0"/>
           </a:p>
@@ -7856,10 +8900,190 @@
           </a:p>
         </p:txBody>
       </p:sp>
+      <p:pic>
+        <p:nvPicPr>
+          <p:cNvPr id="11" name="Content Placeholder 10" descr="Figure2 5"/>
+          <p:cNvPicPr>
+            <a:picLocks noGrp="1" noChangeAspect="1" noChangeArrowheads="1"/>
+          </p:cNvPicPr>
+          <p:nvPr>
+            <p:ph sz="half" idx="2"/>
+          </p:nvPr>
+        </p:nvPicPr>
+        <p:blipFill>
+          <a:blip r:embed="rId2">
+            <a:extLst>
+              <a:ext uri="{28A0092B-C50C-407E-A947-70E740481C1C}">
+                <a14:useLocalDpi xmlns:a14="http://schemas.microsoft.com/office/drawing/2010/main" val="0"/>
+              </a:ext>
+            </a:extLst>
+          </a:blip>
+          <a:srcRect/>
+          <a:stretch>
+            <a:fillRect/>
+          </a:stretch>
+        </p:blipFill>
+        <p:spPr bwMode="auto">
+          <a:xfrm>
+            <a:off x="4840835" y="1700775"/>
+            <a:ext cx="4065588" cy="2435486"/>
+          </a:xfrm>
+          <a:prstGeom prst="rect">
+            <a:avLst/>
+          </a:prstGeom>
+          <a:noFill/>
+          <a:extLst>
+            <a:ext uri="{909E8E84-426E-40DD-AFC4-6F175D3DCCD1}">
+              <a14:hiddenFill xmlns:a14="http://schemas.microsoft.com/office/drawing/2010/main">
+                <a:solidFill>
+                  <a:srgbClr val="FFFFFF"/>
+                </a:solidFill>
+              </a14:hiddenFill>
+            </a:ext>
+          </a:extLst>
+        </p:spPr>
+      </p:pic>
+      <p:sp>
+        <p:nvSpPr>
+          <p:cNvPr id="2" name="TextBox 1"/>
+          <p:cNvSpPr txBox="1"/>
+          <p:nvPr/>
+        </p:nvSpPr>
+        <p:spPr>
+          <a:xfrm>
+            <a:off x="396504" y="4849985"/>
+            <a:ext cx="8372291" cy="1520416"/>
+          </a:xfrm>
+          <a:prstGeom prst="rect">
+            <a:avLst/>
+          </a:prstGeom>
+        </p:spPr>
+        <p:style>
+          <a:lnRef idx="1">
+            <a:schemeClr val="accent1"/>
+          </a:lnRef>
+          <a:fillRef idx="2">
+            <a:schemeClr val="accent1"/>
+          </a:fillRef>
+          <a:effectRef idx="1">
+            <a:schemeClr val="accent1"/>
+          </a:effectRef>
+          <a:fontRef idx="minor">
+            <a:schemeClr val="dk1"/>
+          </a:fontRef>
+        </p:style>
+        <p:txBody>
+          <a:bodyPr wrap="square" rtlCol="0">
+            <a:spAutoFit/>
+          </a:bodyPr>
+          <a:lstStyle/>
+          <a:p>
+            <a:pPr>
+              <a:buClr>
+                <a:srgbClr val="00A4F2"/>
+              </a:buClr>
+              <a:buNone/>
+            </a:pPr>
+            <a:r>
+              <a:rPr lang="en-GB" sz="1600" dirty="0"/>
+              <a:t>&lt;invalidation-cache name="</a:t>
+            </a:r>
+            <a:r>
+              <a:rPr lang="en-GB" sz="1600" dirty="0" err="1" smtClean="0"/>
+              <a:t>invalidatedCache</a:t>
+            </a:r>
+            <a:r>
+              <a:rPr lang="en-GB" sz="1600" dirty="0"/>
+              <a:t>" mode="SYNC</a:t>
+            </a:r>
+            <a:r>
+              <a:rPr lang="en-GB" sz="1600" dirty="0" smtClean="0"/>
+              <a:t>"&gt; </a:t>
+            </a:r>
+          </a:p>
+          <a:p>
+            <a:pPr>
+              <a:buClr>
+                <a:srgbClr val="00A4F2"/>
+              </a:buClr>
+              <a:buNone/>
+            </a:pPr>
+            <a:r>
+              <a:rPr lang="en-GB" sz="1600" dirty="0" smtClean="0"/>
+              <a:t>	&lt;</a:t>
+            </a:r>
+            <a:r>
+              <a:rPr lang="en-GB" sz="1600" dirty="0"/>
+              <a:t>persistence</a:t>
+            </a:r>
+            <a:r>
+              <a:rPr lang="en-GB" sz="1600" dirty="0" smtClean="0"/>
+              <a:t>&gt;</a:t>
+            </a:r>
+          </a:p>
+          <a:p>
+            <a:pPr>
+              <a:buClr>
+                <a:srgbClr val="00A4F2"/>
+              </a:buClr>
+              <a:buNone/>
+            </a:pPr>
+            <a:r>
+              <a:rPr lang="en-GB" sz="1600" dirty="0" smtClean="0"/>
+              <a:t>		&lt;</a:t>
+            </a:r>
+            <a:r>
+              <a:rPr lang="en-GB" sz="1600" dirty="0"/>
+              <a:t>cluster-loader remote-timeout="20000" preload="false" </a:t>
+            </a:r>
+            <a:r>
+              <a:rPr lang="en-GB" sz="1600" dirty="0" smtClean="0"/>
+              <a:t>/&gt;</a:t>
+            </a:r>
+          </a:p>
+          <a:p>
+            <a:pPr>
+              <a:buClr>
+                <a:srgbClr val="00A4F2"/>
+              </a:buClr>
+              <a:buNone/>
+            </a:pPr>
+            <a:r>
+              <a:rPr lang="en-GB" sz="1600" dirty="0" smtClean="0"/>
+              <a:t>	&lt;/</a:t>
+            </a:r>
+            <a:r>
+              <a:rPr lang="en-GB" sz="1600" dirty="0"/>
+              <a:t>persistence</a:t>
+            </a:r>
+            <a:r>
+              <a:rPr lang="en-GB" sz="1600" dirty="0" smtClean="0"/>
+              <a:t>&gt;</a:t>
+            </a:r>
+          </a:p>
+          <a:p>
+            <a:pPr>
+              <a:buClr>
+                <a:srgbClr val="00A4F2"/>
+              </a:buClr>
+              <a:buNone/>
+            </a:pPr>
+            <a:r>
+              <a:rPr lang="en-GB" sz="1600" dirty="0" smtClean="0"/>
+              <a:t>&lt;/</a:t>
+            </a:r>
+            <a:r>
+              <a:rPr lang="en-GB" sz="1600" dirty="0"/>
+              <a:t>invalidation-cache&gt;</a:t>
+            </a:r>
+            <a:endParaRPr lang="en-GB" sz="1600" dirty="0" smtClean="0"/>
+          </a:p>
+        </p:txBody>
+      </p:sp>
     </p:spTree>
     <p:extLst>
       <p:ext uri="{BB962C8B-B14F-4D97-AF65-F5344CB8AC3E}">
-        <p14:creationId xmlns:p14="http://schemas.microsoft.com/office/powerpoint/2010/main" val="1749713803"/>
+        <p14:creationId xmlns:p14="http://schemas.microsoft.com/office/powerpoint/2010/main" val="1524566408"/>
       </p:ext>
     </p:extLst>
   </p:cSld>
@@ -7893,6 +9117,61 @@
           <a:chExt cx="0" cy="0"/>
         </a:xfrm>
       </p:grpSpPr>
+      <p:pic>
+        <p:nvPicPr>
+          <p:cNvPr id="1026" name="Picture 2"/>
+          <p:cNvPicPr>
+            <a:picLocks noGrp="1" noChangeAspect="1" noChangeArrowheads="1"/>
+          </p:cNvPicPr>
+          <p:nvPr>
+            <p:ph sz="half" idx="1"/>
+          </p:nvPr>
+        </p:nvPicPr>
+        <p:blipFill>
+          <a:blip r:embed="rId2">
+            <a:extLst>
+              <a:ext uri="{28A0092B-C50C-407E-A947-70E740481C1C}">
+                <a14:useLocalDpi xmlns:a14="http://schemas.microsoft.com/office/drawing/2010/main" val="0"/>
+              </a:ext>
+            </a:extLst>
+          </a:blip>
+          <a:stretch>
+            <a:fillRect/>
+          </a:stretch>
+        </p:blipFill>
+        <p:spPr bwMode="auto">
+          <a:xfrm>
+            <a:off x="4956050" y="1777585"/>
+            <a:ext cx="4064000" cy="3302830"/>
+          </a:xfrm>
+          <a:prstGeom prst="rect">
+            <a:avLst/>
+          </a:prstGeom>
+          <a:noFill/>
+          <a:ln>
+            <a:noFill/>
+          </a:ln>
+          <a:extLst>
+            <a:ext uri="{909E8E84-426E-40DD-AFC4-6F175D3DCCD1}">
+              <a14:hiddenFill xmlns:a14="http://schemas.microsoft.com/office/drawing/2010/main">
+                <a:solidFill>
+                  <a:schemeClr val="accent1"/>
+                </a:solidFill>
+              </a14:hiddenFill>
+            </a:ext>
+            <a:ext uri="{91240B29-F687-4F45-9708-019B960494DF}">
+              <a14:hiddenLine xmlns:a14="http://schemas.microsoft.com/office/drawing/2010/main" w="9525">
+                <a:solidFill>
+                  <a:schemeClr val="tx1"/>
+                </a:solidFill>
+                <a:miter lim="800000"/>
+                <a:headEnd/>
+                <a:tailEnd/>
+              </a14:hiddenLine>
+            </a:ext>
+          </a:extLst>
+        </p:spPr>
+      </p:pic>
       <p:sp>
         <p:nvSpPr>
           <p:cNvPr id="20" name="Content Placeholder 19"/>
@@ -7900,21 +9179,40 @@
             <a:spLocks noGrp="1"/>
           </p:cNvSpPr>
           <p:nvPr>
-            <p:ph sz="half" idx="1"/>
-          </p:nvPr>
-        </p:nvSpPr>
-        <p:spPr/>
+            <p:ph sz="half" idx="2"/>
+          </p:nvPr>
+        </p:nvSpPr>
+        <p:spPr>
+          <a:xfrm>
+            <a:off x="347450" y="1201510"/>
+            <a:ext cx="4762220" cy="4301360"/>
+          </a:xfrm>
+        </p:spPr>
         <p:txBody>
           <a:bodyPr/>
           <a:lstStyle/>
           <a:p>
+            <a:r>
+              <a:rPr lang="en-GB" sz="1800" dirty="0" smtClean="0"/>
+              <a:t>Entries </a:t>
+            </a:r>
+            <a:r>
+              <a:rPr lang="en-GB" sz="1800" dirty="0" smtClean="0"/>
+              <a:t>replicated </a:t>
+            </a:r>
+            <a:r>
+              <a:rPr lang="en-GB" sz="1800" dirty="0"/>
+              <a:t>to all </a:t>
+            </a:r>
+            <a:r>
+              <a:rPr lang="en-GB" sz="1800" dirty="0" smtClean="0"/>
+              <a:t>cache </a:t>
+            </a:r>
+            <a:r>
+              <a:rPr lang="en-GB" sz="1800" dirty="0" smtClean="0"/>
+              <a:t>instances, high availability</a:t>
+            </a:r>
             <a:endParaRPr lang="en-GB" sz="1800" dirty="0" smtClean="0"/>
-          </a:p>
-          <a:p>
-            <a:r>
-              <a:rPr lang="en-GB" sz="1800" dirty="0" smtClean="0"/>
-              <a:t>Does not share data</a:t>
-            </a:r>
           </a:p>
           <a:p>
             <a:pPr marL="0" indent="0">
@@ -7925,8 +9223,13 @@
           <a:p>
             <a:r>
               <a:rPr lang="en-GB" sz="1800" dirty="0" smtClean="0"/>
-              <a:t>Removes data that may be stale from remote cache</a:t>
-            </a:r>
+              <a:t>Does not offer increased heap </a:t>
+            </a:r>
+            <a:r>
+              <a:rPr lang="en-GB" sz="1800" dirty="0" smtClean="0"/>
+              <a:t>space</a:t>
+            </a:r>
+            <a:endParaRPr lang="en-GB" sz="1800" dirty="0" smtClean="0"/>
           </a:p>
           <a:p>
             <a:pPr marL="0" indent="0">
@@ -7936,40 +9239,84 @@
           </a:p>
           <a:p>
             <a:r>
+              <a:rPr lang="en-GB" sz="1800" dirty="0"/>
+              <a:t>S</a:t>
+            </a:r>
+            <a:r>
               <a:rPr lang="en-GB" sz="1800" dirty="0" smtClean="0"/>
-              <a:t>Used for optimization with other permanent store</a:t>
+              <a:t>ynchronous </a:t>
+            </a:r>
+            <a:r>
+              <a:rPr lang="en-GB" sz="1800" dirty="0"/>
+              <a:t>replication requires acknowledgments from </a:t>
+            </a:r>
+            <a:r>
+              <a:rPr lang="en-GB" sz="1800" dirty="0" smtClean="0"/>
+              <a:t>all, guarantee success </a:t>
+            </a:r>
+            <a:endParaRPr lang="en-GB" sz="1800" dirty="0" smtClean="0"/>
+          </a:p>
+          <a:p>
+            <a:pPr marL="0" indent="0">
+              <a:buNone/>
+            </a:pPr>
+            <a:endParaRPr lang="en-GB" sz="1800" dirty="0" smtClean="0"/>
+          </a:p>
+          <a:p>
+            <a:r>
+              <a:rPr lang="en-GB" sz="1800" dirty="0" smtClean="0"/>
+              <a:t>Asynchronous </a:t>
+            </a:r>
+            <a:r>
+              <a:rPr lang="en-GB" sz="1800" dirty="0"/>
+              <a:t>replication </a:t>
+            </a:r>
+            <a:r>
+              <a:rPr lang="en-GB" sz="1800" dirty="0" smtClean="0"/>
+              <a:t>works </a:t>
+            </a:r>
+            <a:r>
+              <a:rPr lang="en-GB" sz="1800" dirty="0"/>
+              <a:t>in a </a:t>
+            </a:r>
+            <a:r>
+              <a:rPr lang="en-GB" sz="1800" i="1" dirty="0"/>
+              <a:t>fire-and-forget</a:t>
+            </a:r>
+            <a:r>
+              <a:rPr lang="en-GB" sz="1800" dirty="0"/>
+              <a:t> </a:t>
+            </a:r>
+            <a:r>
+              <a:rPr lang="en-GB" sz="1800" dirty="0" smtClean="0"/>
+              <a:t>mode</a:t>
+            </a:r>
+            <a:r>
+              <a:rPr lang="en-GB" sz="1800" dirty="0" smtClean="0"/>
+              <a:t>, can have data inconsistency</a:t>
+            </a:r>
+            <a:endParaRPr lang="en-GB" sz="1800" dirty="0" smtClean="0"/>
+          </a:p>
+          <a:p>
+            <a:pPr marL="0" indent="0">
+              <a:buNone/>
+            </a:pPr>
+            <a:endParaRPr lang="en-GB" sz="1800" dirty="0" smtClean="0"/>
+          </a:p>
+          <a:p>
+            <a:r>
+              <a:rPr lang="en-GB" sz="1800" dirty="0" smtClean="0"/>
+              <a:t>Practically performs </a:t>
+            </a:r>
+            <a:r>
+              <a:rPr lang="en-GB" sz="1800" dirty="0"/>
+              <a:t>well in small </a:t>
+            </a:r>
+            <a:r>
+              <a:rPr lang="en-GB" sz="1800" dirty="0" smtClean="0"/>
+              <a:t>clusters, due to no of replication messages</a:t>
             </a:r>
             <a:endParaRPr lang="en-GB" sz="1800" dirty="0"/>
-          </a:p>
-          <a:p>
-            <a:endParaRPr lang="en-GB" sz="1800" dirty="0" smtClean="0"/>
-          </a:p>
-          <a:p>
-            <a:r>
-              <a:rPr lang="en-GB" sz="1800" dirty="0"/>
-              <a:t>Minimized network </a:t>
-            </a:r>
-            <a:r>
-              <a:rPr lang="en-GB" sz="1800" dirty="0" smtClean="0"/>
-              <a:t>traffic</a:t>
-            </a:r>
-          </a:p>
-          <a:p>
-            <a:endParaRPr lang="en-GB" sz="1800" dirty="0"/>
-          </a:p>
-          <a:p>
-            <a:r>
-              <a:rPr lang="en-GB" sz="1800" dirty="0"/>
-              <a:t>Modified data is </a:t>
-            </a:r>
-            <a:r>
-              <a:rPr lang="en-GB" sz="1800" dirty="0" smtClean="0"/>
-              <a:t>looked up </a:t>
-            </a:r>
-            <a:r>
-              <a:rPr lang="en-GB" sz="1800" dirty="0"/>
-              <a:t>in lazy manner.</a:t>
-            </a:r>
           </a:p>
         </p:txBody>
       </p:sp>
@@ -7990,7 +9337,11 @@
           <a:p>
             <a:r>
               <a:rPr lang="en-GB" dirty="0"/>
-              <a:t>Modes</a:t>
+              <a:t>Caching Modes</a:t>
+            </a:r>
+            <a:r>
+              <a:rPr lang="en-GB" dirty="0"/>
+              <a:t/>
             </a:r>
             <a:br>
               <a:rPr lang="en-GB" dirty="0"/>
@@ -8016,7 +9367,7 @@
           <a:p>
             <a:r>
               <a:rPr lang="en-GB" dirty="0" smtClean="0"/>
-              <a:t>Invalidation Mode</a:t>
+              <a:t>Replication Mode</a:t>
             </a:r>
             <a:endParaRPr lang="en-GB" dirty="0"/>
           </a:p>
@@ -8045,7 +9396,7 @@
               <a:pPr>
                 <a:defRPr/>
               </a:pPr>
-              <a:t>16 July 2015</a:t>
+              <a:t>24 July 2015</a:t>
             </a:fld>
             <a:endParaRPr lang="en-US" dirty="0"/>
           </a:p>
@@ -8080,53 +9431,75 @@
           </a:p>
         </p:txBody>
       </p:sp>
-      <p:pic>
-        <p:nvPicPr>
-          <p:cNvPr id="11" name="Content Placeholder 10" descr="Figure2 5"/>
-          <p:cNvPicPr>
-            <a:picLocks noGrp="1" noChangeAspect="1" noChangeArrowheads="1"/>
-          </p:cNvPicPr>
-          <p:nvPr>
-            <p:ph sz="half" idx="2"/>
-          </p:nvPr>
-        </p:nvPicPr>
-        <p:blipFill>
-          <a:blip r:embed="rId2">
-            <a:extLst>
-              <a:ext uri="{28A0092B-C50C-407E-A947-70E740481C1C}">
-                <a14:useLocalDpi xmlns:a14="http://schemas.microsoft.com/office/drawing/2010/main" val="0"/>
-              </a:ext>
-            </a:extLst>
-          </a:blip>
-          <a:srcRect/>
-          <a:stretch>
-            <a:fillRect/>
-          </a:stretch>
-        </p:blipFill>
-        <p:spPr bwMode="auto">
+      <p:sp>
+        <p:nvSpPr>
+          <p:cNvPr id="7" name="TextBox 6"/>
+          <p:cNvSpPr txBox="1"/>
+          <p:nvPr/>
+        </p:nvSpPr>
+        <p:spPr>
           <a:xfrm>
-            <a:off x="4648200" y="2595432"/>
-            <a:ext cx="4065588" cy="2435486"/>
+            <a:off x="417941" y="5656490"/>
+            <a:ext cx="8333884" cy="792000"/>
           </a:xfrm>
           <a:prstGeom prst="rect">
             <a:avLst/>
           </a:prstGeom>
-          <a:noFill/>
-          <a:extLst>
-            <a:ext uri="{909E8E84-426E-40DD-AFC4-6F175D3DCCD1}">
-              <a14:hiddenFill xmlns:a14="http://schemas.microsoft.com/office/drawing/2010/main">
-                <a:solidFill>
-                  <a:srgbClr val="FFFFFF"/>
-                </a:solidFill>
-              </a14:hiddenFill>
-            </a:ext>
-          </a:extLst>
         </p:spPr>
-      </p:pic>
+        <p:style>
+          <a:lnRef idx="1">
+            <a:schemeClr val="accent1"/>
+          </a:lnRef>
+          <a:fillRef idx="2">
+            <a:schemeClr val="accent1"/>
+          </a:fillRef>
+          <a:effectRef idx="1">
+            <a:schemeClr val="accent1"/>
+          </a:effectRef>
+          <a:fontRef idx="minor">
+            <a:schemeClr val="dk1"/>
+          </a:fontRef>
+        </p:style>
+        <p:txBody>
+          <a:bodyPr wrap="square" rtlCol="0">
+            <a:spAutoFit/>
+          </a:bodyPr>
+          <a:lstStyle/>
+          <a:p>
+            <a:pPr>
+              <a:buClr>
+                <a:srgbClr val="00A4F2"/>
+              </a:buClr>
+              <a:buNone/>
+            </a:pPr>
+            <a:r>
+              <a:rPr lang="en-GB" sz="1600" dirty="0"/>
+              <a:t>&lt;replicated-cache name="</a:t>
+            </a:r>
+            <a:r>
+              <a:rPr lang="en-GB" sz="1600" dirty="0" err="1"/>
+              <a:t>replicationCache</a:t>
+            </a:r>
+            <a:r>
+              <a:rPr lang="en-GB" sz="1600" dirty="0"/>
+              <a:t>" mode="SYNC" remote-timeout="20000"&gt; </a:t>
+            </a:r>
+            <a:r>
+              <a:rPr lang="en-GB" sz="1600" dirty="0" smtClean="0"/>
+              <a:t>	&lt;</a:t>
+            </a:r>
+            <a:r>
+              <a:rPr lang="en-GB" sz="1600" dirty="0"/>
+              <a:t>state-transfer enabled="false" timeout="240000" chunk-size="0" /&gt; &lt;/replicated-cache&gt;</a:t>
+            </a:r>
+            <a:endParaRPr lang="en-GB" sz="1600" dirty="0" smtClean="0"/>
+          </a:p>
+        </p:txBody>
+      </p:sp>
     </p:spTree>
     <p:extLst>
       <p:ext uri="{BB962C8B-B14F-4D97-AF65-F5344CB8AC3E}">
-        <p14:creationId xmlns:p14="http://schemas.microsoft.com/office/powerpoint/2010/main" val="1524566408"/>
+        <p14:creationId xmlns:p14="http://schemas.microsoft.com/office/powerpoint/2010/main" val="1749713803"/>
       </p:ext>
     </p:extLst>
   </p:cSld>
@@ -8184,7 +9557,7 @@
         </p:blipFill>
         <p:spPr bwMode="auto">
           <a:xfrm>
-            <a:off x="4648810" y="2200040"/>
+            <a:off x="4956050" y="1815990"/>
             <a:ext cx="4064000" cy="3003826"/>
           </a:xfrm>
           <a:prstGeom prst="rect">
@@ -8217,46 +9590,26 @@
       </p:pic>
       <p:sp>
         <p:nvSpPr>
-          <p:cNvPr id="7" name="Content Placeholder 6"/>
+          <p:cNvPr id="2" name="Title 1"/>
           <p:cNvSpPr>
             <a:spLocks noGrp="1"/>
           </p:cNvSpPr>
           <p:nvPr>
-            <p:ph sz="half" idx="2"/>
-          </p:nvPr>
-        </p:nvSpPr>
-        <p:spPr>
-          <a:xfrm>
-            <a:off x="193830" y="1239915"/>
-            <a:ext cx="4065588" cy="5146675"/>
-          </a:xfrm>
-        </p:spPr>
+            <p:ph type="title"/>
+          </p:nvPr>
+        </p:nvSpPr>
+        <p:spPr/>
         <p:txBody>
           <a:bodyPr/>
           <a:lstStyle/>
           <a:p>
-            <a:endParaRPr lang="en-GB" sz="1400" dirty="0"/>
-          </a:p>
-        </p:txBody>
-      </p:sp>
-      <p:sp>
-        <p:nvSpPr>
-          <p:cNvPr id="2" name="Title 1"/>
-          <p:cNvSpPr>
-            <a:spLocks noGrp="1"/>
-          </p:cNvSpPr>
-          <p:nvPr>
-            <p:ph type="title"/>
-          </p:nvPr>
-        </p:nvSpPr>
-        <p:spPr/>
-        <p:txBody>
-          <a:bodyPr/>
-          <a:lstStyle/>
-          <a:p>
             <a:r>
               <a:rPr lang="en-GB" dirty="0"/>
-              <a:t>Modes</a:t>
+              <a:t>Caching Modes</a:t>
+            </a:r>
+            <a:r>
+              <a:rPr lang="en-GB" dirty="0"/>
+              <a:t/>
             </a:r>
             <a:br>
               <a:rPr lang="en-GB" dirty="0"/>
@@ -8310,7 +9663,7 @@
               <a:pPr>
                 <a:defRPr/>
               </a:pPr>
-              <a:t>16 July 2015</a:t>
+              <a:t>24 July 2015</a:t>
             </a:fld>
             <a:endParaRPr lang="en-US" dirty="0"/>
           </a:p>
@@ -8345,6 +9698,164 @@
           </a:p>
         </p:txBody>
       </p:sp>
+      <p:sp>
+        <p:nvSpPr>
+          <p:cNvPr id="11" name="Content Placeholder 19"/>
+          <p:cNvSpPr>
+            <a:spLocks noGrp="1"/>
+          </p:cNvSpPr>
+          <p:nvPr>
+            <p:ph sz="half" idx="2"/>
+          </p:nvPr>
+        </p:nvSpPr>
+        <p:spPr>
+          <a:xfrm>
+            <a:off x="347450" y="1201510"/>
+            <a:ext cx="4762220" cy="4070930"/>
+          </a:xfrm>
+        </p:spPr>
+        <p:txBody>
+          <a:bodyPr/>
+          <a:lstStyle/>
+          <a:p>
+            <a:r>
+              <a:rPr lang="en-GB" sz="1800" dirty="0" smtClean="0"/>
+              <a:t>Entries distributed to a subset of nodes, high scalability</a:t>
+            </a:r>
+            <a:endParaRPr lang="en-GB" sz="1800" dirty="0" smtClean="0"/>
+          </a:p>
+          <a:p>
+            <a:pPr marL="0" indent="0">
+              <a:buNone/>
+            </a:pPr>
+            <a:endParaRPr lang="en-GB" sz="1800" dirty="0" smtClean="0"/>
+          </a:p>
+          <a:p>
+            <a:r>
+              <a:rPr lang="en-GB" sz="1800" dirty="0" smtClean="0"/>
+              <a:t>Working as in-memory data grid and provide increased </a:t>
+            </a:r>
+            <a:r>
+              <a:rPr lang="en-GB" sz="1800" dirty="0" smtClean="0"/>
+              <a:t>heap </a:t>
+            </a:r>
+            <a:r>
+              <a:rPr lang="en-GB" sz="1800" dirty="0" smtClean="0"/>
+              <a:t>space</a:t>
+            </a:r>
+            <a:endParaRPr lang="en-GB" sz="1800" dirty="0" smtClean="0"/>
+          </a:p>
+          <a:p>
+            <a:pPr marL="0" indent="0">
+              <a:buNone/>
+            </a:pPr>
+            <a:endParaRPr lang="en-GB" sz="1800" dirty="0" smtClean="0"/>
+          </a:p>
+          <a:p>
+            <a:r>
+              <a:rPr lang="en-GB" sz="1800" dirty="0" smtClean="0"/>
+              <a:t>No of copies represent trade-off between performance and durability</a:t>
+            </a:r>
+            <a:endParaRPr lang="en-GB" sz="1800" dirty="0" smtClean="0"/>
+          </a:p>
+          <a:p>
+            <a:pPr marL="0" indent="0">
+              <a:buNone/>
+            </a:pPr>
+            <a:endParaRPr lang="en-GB" sz="1800" dirty="0" smtClean="0"/>
+          </a:p>
+          <a:p>
+            <a:r>
+              <a:rPr lang="en-GB" sz="1800" dirty="0" smtClean="0"/>
+              <a:t>No of copies for a entry is configurable</a:t>
+            </a:r>
+          </a:p>
+          <a:p>
+            <a:endParaRPr lang="en-GB" sz="1800" dirty="0"/>
+          </a:p>
+          <a:p>
+            <a:r>
+              <a:rPr lang="en-GB" sz="1800" dirty="0" smtClean="0"/>
+              <a:t>Uses Consistent Hash algorithm to determine nodes to store entries</a:t>
+            </a:r>
+            <a:endParaRPr lang="en-GB" sz="1800" dirty="0" smtClean="0"/>
+          </a:p>
+          <a:p>
+            <a:pPr marL="0" indent="0">
+              <a:buNone/>
+            </a:pPr>
+            <a:endParaRPr lang="en-GB" sz="1800" dirty="0" smtClean="0"/>
+          </a:p>
+          <a:p>
+            <a:endParaRPr lang="en-GB" sz="1800" dirty="0"/>
+          </a:p>
+        </p:txBody>
+      </p:sp>
+      <p:sp>
+        <p:nvSpPr>
+          <p:cNvPr id="12" name="TextBox 11"/>
+          <p:cNvSpPr txBox="1"/>
+          <p:nvPr/>
+        </p:nvSpPr>
+        <p:spPr>
+          <a:xfrm>
+            <a:off x="417941" y="5656490"/>
+            <a:ext cx="8333884" cy="584775"/>
+          </a:xfrm>
+          <a:prstGeom prst="rect">
+            <a:avLst/>
+          </a:prstGeom>
+        </p:spPr>
+        <p:style>
+          <a:lnRef idx="1">
+            <a:schemeClr val="accent1"/>
+          </a:lnRef>
+          <a:fillRef idx="2">
+            <a:schemeClr val="accent1"/>
+          </a:fillRef>
+          <a:effectRef idx="1">
+            <a:schemeClr val="accent1"/>
+          </a:effectRef>
+          <a:fontRef idx="minor">
+            <a:schemeClr val="dk1"/>
+          </a:fontRef>
+        </p:style>
+        <p:txBody>
+          <a:bodyPr wrap="square" rtlCol="0">
+            <a:spAutoFit/>
+          </a:bodyPr>
+          <a:lstStyle/>
+          <a:p>
+            <a:pPr>
+              <a:buClr>
+                <a:srgbClr val="00A4F2"/>
+              </a:buClr>
+              <a:buNone/>
+            </a:pPr>
+            <a:r>
+              <a:rPr lang="en-GB" sz="1600" dirty="0"/>
+              <a:t>&lt;distributed-cache name="</a:t>
+            </a:r>
+            <a:r>
+              <a:rPr lang="en-GB" sz="1600" dirty="0" err="1" smtClean="0"/>
+              <a:t>distributedCache</a:t>
+            </a:r>
+            <a:r>
+              <a:rPr lang="en-GB" sz="1600" dirty="0"/>
+              <a:t>" mode="SYNC" owners="2" segments="80</a:t>
+            </a:r>
+            <a:r>
+              <a:rPr lang="en-GB" sz="1600" dirty="0" smtClean="0"/>
+              <a:t>" </a:t>
+            </a:r>
+            <a:r>
+              <a:rPr lang="en-GB" sz="1600" dirty="0"/>
+              <a:t>/&gt;</a:t>
+            </a:r>
+            <a:endParaRPr lang="en-GB" sz="1600" dirty="0" smtClean="0"/>
+          </a:p>
+        </p:txBody>
+      </p:sp>
     </p:spTree>
     <p:extLst>
       <p:ext uri="{BB962C8B-B14F-4D97-AF65-F5344CB8AC3E}">
@@ -8355,6 +9866,13 @@
   <p:clrMapOvr>
     <a:masterClrMapping/>
   </p:clrMapOvr>
+  <p:timing>
+    <p:tnLst>
+      <p:par>
+        <p:cTn id="1" dur="indefinite" restart="never" nodeType="tmRoot"/>
+      </p:par>
+    </p:tnLst>
+  </p:timing>
 </p:sld>
 </file>
 
@@ -9766,6 +11284,21 @@
 </file>
 
 <file path=customXml/item1.xml><?xml version="1.0" encoding="utf-8"?>
+<?mso-contentType ?>
+<FormTemplates xmlns="http://schemas.microsoft.com/sharepoint/v3/contenttype/forms">
+  <Display>DocumentLibraryForm</Display>
+  <Edit>DocumentLibraryForm</Edit>
+  <New>DocumentLibraryForm</New>
+</FormTemplates>
+</file>
+
+<file path=customXml/item2.xml><?xml version="1.0" encoding="utf-8"?>
+<p:properties xmlns:p="http://schemas.microsoft.com/office/2006/metadata/properties" xmlns:xsi="http://www.w3.org/2001/XMLSchema-instance">
+  <documentManagement/>
+</p:properties>
+</file>
+
+<file path=customXml/item3.xml><?xml version="1.0" encoding="utf-8"?>
 <ct:contentTypeSchema xmlns:ct="http://schemas.microsoft.com/office/2006/metadata/contentType" xmlns:ma="http://schemas.microsoft.com/office/2006/metadata/properties/metaAttributes" ct:_="" ma:_="" ma:contentTypeName="Document" ma:contentTypeID="0x01010052A6242B10924A4DBFB6124D54A27815" ma:contentTypeVersion="0" ma:contentTypeDescription="Create a new document." ma:contentTypeScope="" ma:versionID="b57ed8ccf37977ae283eeff73d3b9890">
   <xsd:schema xmlns:xsd="http://www.w3.org/2001/XMLSchema" xmlns:xs="http://www.w3.org/2001/XMLSchema" xmlns:p="http://schemas.microsoft.com/office/2006/metadata/properties" targetNamespace="http://schemas.microsoft.com/office/2006/metadata/properties" ma:root="true" ma:fieldsID="c64490b4aec6201516c3a874156f37b2">
     <xsd:element name="properties">
@@ -9879,33 +11412,10 @@
 </ct:contentTypeSchema>
 </file>
 
-<file path=customXml/item2.xml><?xml version="1.0" encoding="utf-8"?>
-<p:properties xmlns:p="http://schemas.microsoft.com/office/2006/metadata/properties" xmlns:xsi="http://www.w3.org/2001/XMLSchema-instance">
-  <documentManagement/>
-</p:properties>
-</file>
-
-<file path=customXml/item3.xml><?xml version="1.0" encoding="utf-8"?>
-<?mso-contentType ?>
-<FormTemplates xmlns="http://schemas.microsoft.com/sharepoint/v3/contenttype/forms">
-  <Display>DocumentLibraryForm</Display>
-  <Edit>DocumentLibraryForm</Edit>
-  <New>DocumentLibraryForm</New>
-</FormTemplates>
-</file>
-
 <file path=customXml/itemProps1.xml><?xml version="1.0" encoding="utf-8"?>
-<ds:datastoreItem xmlns:ds="http://schemas.openxmlformats.org/officeDocument/2006/customXml" ds:itemID="{6A646D34-48B1-41EF-AFA6-EB967E20351F}">
+<ds:datastoreItem xmlns:ds="http://schemas.openxmlformats.org/officeDocument/2006/customXml" ds:itemID="{5DF3DE8E-7DF2-4573-85BC-A64B51AF200C}">
   <ds:schemaRefs>
-    <ds:schemaRef ds:uri="http://schemas.microsoft.com/office/2006/metadata/contentType"/>
-    <ds:schemaRef ds:uri="http://schemas.microsoft.com/office/2006/metadata/properties/metaAttributes"/>
-    <ds:schemaRef ds:uri="http://www.w3.org/2001/XMLSchema"/>
-    <ds:schemaRef ds:uri="http://schemas.microsoft.com/office/2006/metadata/properties"/>
-    <ds:schemaRef ds:uri="http://schemas.openxmlformats.org/package/2006/metadata/core-properties"/>
-    <ds:schemaRef ds:uri="http://purl.org/dc/elements/1.1/"/>
-    <ds:schemaRef ds:uri="http://purl.org/dc/terms/"/>
-    <ds:schemaRef ds:uri="http://schemas.microsoft.com/internal/obd"/>
-    <ds:schemaRef ds:uri="http://schemas.microsoft.com/office/infopath/2007/PartnerControls"/>
+    <ds:schemaRef ds:uri="http://schemas.microsoft.com/sharepoint/v3/contenttype/forms"/>
   </ds:schemaRefs>
 </ds:datastoreItem>
 </file>
@@ -9926,9 +11436,17 @@
 </file>
 
 <file path=customXml/itemProps3.xml><?xml version="1.0" encoding="utf-8"?>
-<ds:datastoreItem xmlns:ds="http://schemas.openxmlformats.org/officeDocument/2006/customXml" ds:itemID="{5DF3DE8E-7DF2-4573-85BC-A64B51AF200C}">
+<ds:datastoreItem xmlns:ds="http://schemas.openxmlformats.org/officeDocument/2006/customXml" ds:itemID="{6A646D34-48B1-41EF-AFA6-EB967E20351F}">
   <ds:schemaRefs>
-    <ds:schemaRef ds:uri="http://schemas.microsoft.com/sharepoint/v3/contenttype/forms"/>
+    <ds:schemaRef ds:uri="http://schemas.microsoft.com/office/2006/metadata/contentType"/>
+    <ds:schemaRef ds:uri="http://schemas.microsoft.com/office/2006/metadata/properties/metaAttributes"/>
+    <ds:schemaRef ds:uri="http://www.w3.org/2001/XMLSchema"/>
+    <ds:schemaRef ds:uri="http://schemas.microsoft.com/office/2006/metadata/properties"/>
+    <ds:schemaRef ds:uri="http://schemas.openxmlformats.org/package/2006/metadata/core-properties"/>
+    <ds:schemaRef ds:uri="http://purl.org/dc/elements/1.1/"/>
+    <ds:schemaRef ds:uri="http://purl.org/dc/terms/"/>
+    <ds:schemaRef ds:uri="http://schemas.microsoft.com/internal/obd"/>
+    <ds:schemaRef ds:uri="http://schemas.microsoft.com/office/infopath/2007/PartnerControls"/>
   </ds:schemaRefs>
 </ds:datastoreItem>
 </file>
</xml_diff>